<commit_message>
Simplified Install. Improved presentation.
</commit_message>
<xml_diff>
--- a/Part 1/WiX Part 1.pptx
+++ b/Part 1/WiX Part 1.pptx
@@ -5,10 +5,10 @@
     <p:sldMasterId id="2147483660" r:id="rId2"/>
   </p:sldMasterIdLst>
   <p:notesMasterIdLst>
-    <p:notesMasterId r:id="rId13"/>
+    <p:notesMasterId r:id="rId16"/>
   </p:notesMasterIdLst>
   <p:handoutMasterIdLst>
-    <p:handoutMasterId r:id="rId14"/>
+    <p:handoutMasterId r:id="rId17"/>
   </p:handoutMasterIdLst>
   <p:sldIdLst>
     <p:sldId id="256" r:id="rId3"/>
@@ -19,8 +19,11 @@
     <p:sldId id="260" r:id="rId8"/>
     <p:sldId id="262" r:id="rId9"/>
     <p:sldId id="263" r:id="rId10"/>
-    <p:sldId id="264" r:id="rId11"/>
-    <p:sldId id="265" r:id="rId12"/>
+    <p:sldId id="266" r:id="rId11"/>
+    <p:sldId id="264" r:id="rId12"/>
+    <p:sldId id="267" r:id="rId13"/>
+    <p:sldId id="268" r:id="rId14"/>
+    <p:sldId id="265" r:id="rId15"/>
   </p:sldIdLst>
   <p:sldSz cx="12192000" cy="6858000"/>
   <p:notesSz cx="6858000" cy="9144000"/>
@@ -212,7 +215,7 @@
           <a:p>
             <a:fld id="{BE6FE14A-16AB-4C40-A7D8-3F677DBFF089}" type="datetimeFigureOut">
               <a:rPr lang="ru-RU" smtClean="0"/>
-              <a:t>22.12.2015</a:t>
+              <a:t>03.01.2016</a:t>
             </a:fld>
             <a:endParaRPr lang="ru-RU" dirty="0"/>
           </a:p>
@@ -377,7 +380,7 @@
           <a:p>
             <a:fld id="{C15A5BB7-EDD2-4B8D-93DB-AF0055258AEF}" type="datetimeFigureOut">
               <a:rPr lang="ru-RU" smtClean="0"/>
-              <a:t>22.12.2015</a:t>
+              <a:t>03.01.2016</a:t>
             </a:fld>
             <a:endParaRPr lang="ru-RU" dirty="0"/>
           </a:p>
@@ -1714,7 +1717,7 @@
           <a:p>
             <a:fld id="{FF11F0EC-4F60-4544-9956-271209A740FE}" type="datetimeFigureOut">
               <a:rPr lang="ru-RU" smtClean="0"/>
-              <a:t>22.12.2015</a:t>
+              <a:t>03.01.2016</a:t>
             </a:fld>
             <a:endParaRPr lang="ru-RU" dirty="0"/>
           </a:p>
@@ -1965,7 +1968,7 @@
           <a:p>
             <a:fld id="{FF11F0EC-4F60-4544-9956-271209A740FE}" type="datetimeFigureOut">
               <a:rPr lang="ru-RU" smtClean="0"/>
-              <a:t>22.12.2015</a:t>
+              <a:t>03.01.2016</a:t>
             </a:fld>
             <a:endParaRPr lang="ru-RU" dirty="0"/>
           </a:p>
@@ -2216,7 +2219,7 @@
           <a:p>
             <a:fld id="{FF11F0EC-4F60-4544-9956-271209A740FE}" type="datetimeFigureOut">
               <a:rPr lang="ru-RU" smtClean="0"/>
-              <a:t>22.12.2015</a:t>
+              <a:t>03.01.2016</a:t>
             </a:fld>
             <a:endParaRPr lang="ru-RU" dirty="0"/>
           </a:p>
@@ -2794,7 +2797,7 @@
           <a:p>
             <a:fld id="{FF11F0EC-4F60-4544-9956-271209A740FE}" type="datetimeFigureOut">
               <a:rPr lang="ru-RU" smtClean="0"/>
-              <a:t>22.12.2015</a:t>
+              <a:t>03.01.2016</a:t>
             </a:fld>
             <a:endParaRPr lang="ru-RU" dirty="0"/>
           </a:p>
@@ -3045,7 +3048,7 @@
           <a:p>
             <a:fld id="{FF11F0EC-4F60-4544-9956-271209A740FE}" type="datetimeFigureOut">
               <a:rPr lang="ru-RU" smtClean="0"/>
-              <a:t>22.12.2015</a:t>
+              <a:t>03.01.2016</a:t>
             </a:fld>
             <a:endParaRPr lang="ru-RU" dirty="0"/>
           </a:p>
@@ -3623,7 +3626,7 @@
           <a:p>
             <a:fld id="{FF11F0EC-4F60-4544-9956-271209A740FE}" type="datetimeFigureOut">
               <a:rPr lang="ru-RU" smtClean="0"/>
-              <a:t>22.12.2015</a:t>
+              <a:t>03.01.2016</a:t>
             </a:fld>
             <a:endParaRPr lang="ru-RU" dirty="0"/>
           </a:p>
@@ -3853,7 +3856,7 @@
           <a:p>
             <a:fld id="{FF11F0EC-4F60-4544-9956-271209A740FE}" type="datetimeFigureOut">
               <a:rPr lang="ru-RU" smtClean="0"/>
-              <a:t>22.12.2015</a:t>
+              <a:t>03.01.2016</a:t>
             </a:fld>
             <a:endParaRPr lang="ru-RU" dirty="0"/>
           </a:p>
@@ -4033,7 +4036,7 @@
           <a:p>
             <a:fld id="{FF11F0EC-4F60-4544-9956-271209A740FE}" type="datetimeFigureOut">
               <a:rPr lang="ru-RU" smtClean="0"/>
-              <a:t>22.12.2015</a:t>
+              <a:t>03.01.2016</a:t>
             </a:fld>
             <a:endParaRPr lang="ru-RU" dirty="0"/>
           </a:p>
@@ -4209,7 +4212,7 @@
           <a:p>
             <a:fld id="{FF11F0EC-4F60-4544-9956-271209A740FE}" type="datetimeFigureOut">
               <a:rPr lang="ru-RU" smtClean="0"/>
-              <a:t>22.12.2015</a:t>
+              <a:t>03.01.2016</a:t>
             </a:fld>
             <a:endParaRPr lang="ru-RU" dirty="0"/>
           </a:p>
@@ -4456,7 +4459,7 @@
           <a:p>
             <a:fld id="{FF11F0EC-4F60-4544-9956-271209A740FE}" type="datetimeFigureOut">
               <a:rPr lang="ru-RU" smtClean="0"/>
-              <a:t>22.12.2015</a:t>
+              <a:t>03.01.2016</a:t>
             </a:fld>
             <a:endParaRPr lang="ru-RU" dirty="0"/>
           </a:p>
@@ -4688,7 +4691,7 @@
           <a:p>
             <a:fld id="{FF11F0EC-4F60-4544-9956-271209A740FE}" type="datetimeFigureOut">
               <a:rPr lang="ru-RU" smtClean="0"/>
-              <a:t>22.12.2015</a:t>
+              <a:t>03.01.2016</a:t>
             </a:fld>
             <a:endParaRPr lang="ru-RU" dirty="0"/>
           </a:p>
@@ -5062,7 +5065,7 @@
           <a:p>
             <a:fld id="{FF11F0EC-4F60-4544-9956-271209A740FE}" type="datetimeFigureOut">
               <a:rPr lang="ru-RU" smtClean="0"/>
-              <a:t>22.12.2015</a:t>
+              <a:t>03.01.2016</a:t>
             </a:fld>
             <a:endParaRPr lang="ru-RU" dirty="0"/>
           </a:p>
@@ -5185,7 +5188,7 @@
           <a:p>
             <a:fld id="{FF11F0EC-4F60-4544-9956-271209A740FE}" type="datetimeFigureOut">
               <a:rPr lang="ru-RU" smtClean="0"/>
-              <a:t>22.12.2015</a:t>
+              <a:t>03.01.2016</a:t>
             </a:fld>
             <a:endParaRPr lang="ru-RU" dirty="0"/>
           </a:p>
@@ -5280,7 +5283,7 @@
           <a:p>
             <a:fld id="{FF11F0EC-4F60-4544-9956-271209A740FE}" type="datetimeFigureOut">
               <a:rPr lang="ru-RU" smtClean="0"/>
-              <a:t>22.12.2015</a:t>
+              <a:t>03.01.2016</a:t>
             </a:fld>
             <a:endParaRPr lang="ru-RU" dirty="0"/>
           </a:p>
@@ -5535,7 +5538,7 @@
           <a:p>
             <a:fld id="{FF11F0EC-4F60-4544-9956-271209A740FE}" type="datetimeFigureOut">
               <a:rPr lang="ru-RU" smtClean="0"/>
-              <a:t>22.12.2015</a:t>
+              <a:t>03.01.2016</a:t>
             </a:fld>
             <a:endParaRPr lang="ru-RU" dirty="0"/>
           </a:p>
@@ -5798,7 +5801,7 @@
           <a:p>
             <a:fld id="{FF11F0EC-4F60-4544-9956-271209A740FE}" type="datetimeFigureOut">
               <a:rPr lang="ru-RU" smtClean="0"/>
-              <a:t>22.12.2015</a:t>
+              <a:t>03.01.2016</a:t>
             </a:fld>
             <a:endParaRPr lang="ru-RU" dirty="0"/>
           </a:p>
@@ -6882,7 +6885,7 @@
           <a:p>
             <a:fld id="{FF11F0EC-4F60-4544-9956-271209A740FE}" type="datetimeFigureOut">
               <a:rPr lang="ru-RU" smtClean="0"/>
-              <a:t>22.12.2015</a:t>
+              <a:t>03.01.2016</a:t>
             </a:fld>
             <a:endParaRPr lang="ru-RU" dirty="0"/>
           </a:p>
@@ -7579,43 +7582,14 @@
       </p:grpSpPr>
       <p:sp>
         <p:nvSpPr>
-          <p:cNvPr id="4" name="Прямоугольник 3"/>
-          <p:cNvSpPr/>
+          <p:cNvPr id="7" name="TextBox 6"/>
+          <p:cNvSpPr txBox="1"/>
           <p:nvPr/>
         </p:nvSpPr>
         <p:spPr>
           <a:xfrm>
-            <a:off x="2039740" y="1843904"/>
-            <a:ext cx="1798890" cy="369332"/>
-          </a:xfrm>
-          <a:prstGeom prst="rect">
-            <a:avLst/>
-          </a:prstGeom>
-        </p:spPr>
-        <p:txBody>
-          <a:bodyPr wrap="none">
-            <a:spAutoFit/>
-          </a:bodyPr>
-          <a:lstStyle/>
-          <a:p>
-            <a:r>
-              <a:rPr lang="en-US" dirty="0" smtClean="0"/>
-              <a:t>Main resources:</a:t>
-            </a:r>
-            <a:endParaRPr lang="ru-RU" dirty="0"/>
-          </a:p>
-        </p:txBody>
-      </p:sp>
-      <p:sp>
-        <p:nvSpPr>
-          <p:cNvPr id="5" name="TextBox 4"/>
-          <p:cNvSpPr txBox="1"/>
-          <p:nvPr/>
-        </p:nvSpPr>
-        <p:spPr>
-          <a:xfrm>
-            <a:off x="2463115" y="2213236"/>
-            <a:ext cx="5530681" cy="1754326"/>
+            <a:off x="1136824" y="867837"/>
+            <a:ext cx="4830168" cy="1703480"/>
           </a:xfrm>
           <a:prstGeom prst="rect">
             <a:avLst/>
@@ -7636,16 +7610,12 @@
               <a:buChar char="•"/>
             </a:pPr>
             <a:r>
-              <a:rPr lang="en-US" dirty="0" smtClean="0"/>
-              <a:t>Icon (.</a:t>
-            </a:r>
-            <a:r>
-              <a:rPr lang="en-US" dirty="0" err="1" smtClean="0"/>
-              <a:t>ico</a:t>
-            </a:r>
-            <a:r>
-              <a:rPr lang="en-US" dirty="0" smtClean="0"/>
-              <a:t>)</a:t>
+              <a:rPr lang="en-US" dirty="0">
+                <a:solidFill>
+                  <a:srgbClr val="FF0000"/>
+                </a:solidFill>
+              </a:rPr>
+              <a:t>Each file / action should be a component!</a:t>
             </a:r>
           </a:p>
           <a:p>
@@ -7657,22 +7627,9 @@
               <a:buChar char="•"/>
             </a:pPr>
             <a:r>
-              <a:rPr lang="en-US" dirty="0" smtClean="0"/>
-              <a:t>Banner (.bmp, .</a:t>
-            </a:r>
-            <a:r>
-              <a:rPr lang="en-US" dirty="0" err="1" smtClean="0"/>
-              <a:t>png</a:t>
-            </a:r>
-            <a:r>
-              <a:rPr lang="en-US" dirty="0" smtClean="0"/>
-              <a:t>, .jpg) - </a:t>
-            </a:r>
-            <a:r>
-              <a:rPr lang="ru-RU" dirty="0"/>
-              <a:t>493 × 58</a:t>
-            </a:r>
-            <a:endParaRPr lang="en-US" dirty="0" smtClean="0"/>
+              <a:rPr lang="en-US" dirty="0"/>
+              <a:t>Use variables</a:t>
+            </a:r>
           </a:p>
           <a:p>
             <a:pPr marL="285750" indent="-285750">
@@ -7684,29 +7641,8 @@
             </a:pPr>
             <a:r>
               <a:rPr lang="en-US" dirty="0"/>
-              <a:t>Dialog background (.bmp, .</a:t>
-            </a:r>
-            <a:r>
-              <a:rPr lang="en-US" dirty="0" err="1"/>
-              <a:t>png</a:t>
-            </a:r>
-            <a:r>
-              <a:rPr lang="en-US" dirty="0"/>
-              <a:t>, .jpg) </a:t>
-            </a:r>
-            <a:r>
-              <a:rPr lang="en-US" dirty="0" smtClean="0"/>
-              <a:t>- </a:t>
-            </a:r>
-            <a:r>
-              <a:rPr lang="ru-RU" dirty="0"/>
-              <a:t>493 × </a:t>
-            </a:r>
-            <a:r>
-              <a:rPr lang="ru-RU" dirty="0" smtClean="0"/>
-              <a:t>312</a:t>
-            </a:r>
-            <a:endParaRPr lang="en-US" dirty="0" smtClean="0"/>
+              <a:t>Use fragments</a:t>
+            </a:r>
           </a:p>
           <a:p>
             <a:pPr marL="285750" indent="-285750">
@@ -7717,9 +7653,817 @@
               <a:buChar char="•"/>
             </a:pPr>
             <a:r>
-              <a:rPr lang="en-US" dirty="0" smtClean="0"/>
+              <a:rPr lang="en-US" dirty="0"/>
+              <a:t>Use comments</a:t>
+            </a:r>
+          </a:p>
+        </p:txBody>
+      </p:sp>
+      <p:sp>
+        <p:nvSpPr>
+          <p:cNvPr id="6" name="Прямоугольник 5"/>
+          <p:cNvSpPr/>
+          <p:nvPr/>
+        </p:nvSpPr>
+        <p:spPr>
+          <a:xfrm>
+            <a:off x="713449" y="344617"/>
+            <a:ext cx="3231847" cy="523220"/>
+          </a:xfrm>
+          <a:prstGeom prst="rect">
+            <a:avLst/>
+          </a:prstGeom>
+        </p:spPr>
+        <p:txBody>
+          <a:bodyPr wrap="none">
+            <a:spAutoFit/>
+          </a:bodyPr>
+          <a:lstStyle/>
+          <a:p>
+            <a:r>
+              <a:rPr lang="en-US" sz="2800" dirty="0"/>
+              <a:t>Recommendations:</a:t>
+            </a:r>
+            <a:endParaRPr lang="ru-RU" sz="2800" dirty="0"/>
+          </a:p>
+        </p:txBody>
+      </p:sp>
+    </p:spTree>
+    <p:extLst>
+      <p:ext uri="{BB962C8B-B14F-4D97-AF65-F5344CB8AC3E}">
+        <p14:creationId xmlns:p14="http://schemas.microsoft.com/office/powerpoint/2010/main" val="913546643"/>
+      </p:ext>
+    </p:extLst>
+  </p:cSld>
+  <p:clrMapOvr>
+    <a:masterClrMapping/>
+  </p:clrMapOvr>
+</p:sld>
+</file>
+
+<file path=ppt/slides/slide11.xml><?xml version="1.0" encoding="utf-8"?>
+<p:sld xmlns:a="http://schemas.openxmlformats.org/drawingml/2006/main" xmlns:r="http://schemas.openxmlformats.org/officeDocument/2006/relationships" xmlns:p="http://schemas.openxmlformats.org/presentationml/2006/main">
+  <p:cSld>
+    <p:spTree>
+      <p:nvGrpSpPr>
+        <p:cNvPr id="1" name=""/>
+        <p:cNvGrpSpPr/>
+        <p:nvPr/>
+      </p:nvGrpSpPr>
+      <p:grpSpPr>
+        <a:xfrm>
+          <a:off x="0" y="0"/>
+          <a:ext cx="0" cy="0"/>
+          <a:chOff x="0" y="0"/>
+          <a:chExt cx="0" cy="0"/>
+        </a:xfrm>
+      </p:grpSpPr>
+      <p:sp>
+        <p:nvSpPr>
+          <p:cNvPr id="6" name="Прямоугольник 5"/>
+          <p:cNvSpPr/>
+          <p:nvPr/>
+        </p:nvSpPr>
+        <p:spPr>
+          <a:xfrm>
+            <a:off x="713449" y="344617"/>
+            <a:ext cx="3257623" cy="523220"/>
+          </a:xfrm>
+          <a:prstGeom prst="rect">
+            <a:avLst/>
+          </a:prstGeom>
+        </p:spPr>
+        <p:txBody>
+          <a:bodyPr wrap="none">
+            <a:spAutoFit/>
+          </a:bodyPr>
+          <a:lstStyle/>
+          <a:p>
+            <a:r>
+              <a:rPr lang="en-US" sz="2800" dirty="0" smtClean="0"/>
+              <a:t>Built-in UI wizards:</a:t>
+            </a:r>
+            <a:endParaRPr lang="ru-RU" sz="2800" dirty="0"/>
+          </a:p>
+        </p:txBody>
+      </p:sp>
+      <p:sp>
+        <p:nvSpPr>
+          <p:cNvPr id="7" name="TextBox 6"/>
+          <p:cNvSpPr txBox="1"/>
+          <p:nvPr/>
+        </p:nvSpPr>
+        <p:spPr>
+          <a:xfrm>
+            <a:off x="1136824" y="867837"/>
+            <a:ext cx="2440412" cy="2118978"/>
+          </a:xfrm>
+          <a:prstGeom prst="rect">
+            <a:avLst/>
+          </a:prstGeom>
+          <a:noFill/>
+        </p:spPr>
+        <p:txBody>
+          <a:bodyPr wrap="none" rtlCol="0">
+            <a:spAutoFit/>
+          </a:bodyPr>
+          <a:lstStyle/>
+          <a:p>
+            <a:pPr marL="285750" indent="-285750">
+              <a:lnSpc>
+                <a:spcPct val="150000"/>
+              </a:lnSpc>
+              <a:buFont typeface="Arial" panose="020B0604020202020204" pitchFamily="34" charset="0"/>
+              <a:buChar char="•"/>
+            </a:pPr>
+            <a:r>
+              <a:rPr lang="en-US" dirty="0" err="1"/>
+              <a:t>WixUI_Advanced</a:t>
+            </a:r>
+            <a:endParaRPr lang="en-US" dirty="0"/>
+          </a:p>
+          <a:p>
+            <a:pPr marL="285750" indent="-285750">
+              <a:lnSpc>
+                <a:spcPct val="150000"/>
+              </a:lnSpc>
+              <a:buFont typeface="Arial" panose="020B0604020202020204" pitchFamily="34" charset="0"/>
+              <a:buChar char="•"/>
+            </a:pPr>
+            <a:r>
+              <a:rPr lang="en-US" dirty="0" err="1"/>
+              <a:t>WixUI_FeatureTree</a:t>
+            </a:r>
+            <a:endParaRPr lang="en-US" dirty="0"/>
+          </a:p>
+          <a:p>
+            <a:pPr marL="285750" indent="-285750">
+              <a:lnSpc>
+                <a:spcPct val="150000"/>
+              </a:lnSpc>
+              <a:buFont typeface="Arial" panose="020B0604020202020204" pitchFamily="34" charset="0"/>
+              <a:buChar char="•"/>
+            </a:pPr>
+            <a:r>
+              <a:rPr lang="en-US" dirty="0" err="1"/>
+              <a:t>WixUI_InstallDir</a:t>
+            </a:r>
+            <a:endParaRPr lang="en-US" dirty="0"/>
+          </a:p>
+          <a:p>
+            <a:pPr marL="285750" indent="-285750">
+              <a:lnSpc>
+                <a:spcPct val="150000"/>
+              </a:lnSpc>
+              <a:buFont typeface="Arial" panose="020B0604020202020204" pitchFamily="34" charset="0"/>
+              <a:buChar char="•"/>
+            </a:pPr>
+            <a:r>
+              <a:rPr lang="en-US" dirty="0" err="1"/>
+              <a:t>WixUI_Minimal</a:t>
+            </a:r>
+            <a:endParaRPr lang="en-US" dirty="0"/>
+          </a:p>
+          <a:p>
+            <a:pPr marL="285750" indent="-285750">
+              <a:lnSpc>
+                <a:spcPct val="150000"/>
+              </a:lnSpc>
+              <a:buFont typeface="Arial" panose="020B0604020202020204" pitchFamily="34" charset="0"/>
+              <a:buChar char="•"/>
+            </a:pPr>
+            <a:r>
+              <a:rPr lang="en-US" dirty="0" err="1"/>
+              <a:t>WixUI_Mondo</a:t>
+            </a:r>
+            <a:endParaRPr lang="en-US" dirty="0"/>
+          </a:p>
+        </p:txBody>
+      </p:sp>
+    </p:spTree>
+    <p:extLst>
+      <p:ext uri="{BB962C8B-B14F-4D97-AF65-F5344CB8AC3E}">
+        <p14:creationId xmlns:p14="http://schemas.microsoft.com/office/powerpoint/2010/main" val="2213262725"/>
+      </p:ext>
+    </p:extLst>
+  </p:cSld>
+  <p:clrMapOvr>
+    <a:masterClrMapping/>
+  </p:clrMapOvr>
+</p:sld>
+</file>
+
+<file path=ppt/slides/slide12.xml><?xml version="1.0" encoding="utf-8"?>
+<p:sld xmlns:a="http://schemas.openxmlformats.org/drawingml/2006/main" xmlns:r="http://schemas.openxmlformats.org/officeDocument/2006/relationships" xmlns:p="http://schemas.openxmlformats.org/presentationml/2006/main">
+  <p:cSld>
+    <p:spTree>
+      <p:nvGrpSpPr>
+        <p:cNvPr id="1" name=""/>
+        <p:cNvGrpSpPr/>
+        <p:nvPr/>
+      </p:nvGrpSpPr>
+      <p:grpSpPr>
+        <a:xfrm>
+          <a:off x="0" y="0"/>
+          <a:ext cx="0" cy="0"/>
+          <a:chOff x="0" y="0"/>
+          <a:chExt cx="0" cy="0"/>
+        </a:xfrm>
+      </p:grpSpPr>
+      <p:sp>
+        <p:nvSpPr>
+          <p:cNvPr id="6" name="Прямоугольник 5"/>
+          <p:cNvSpPr/>
+          <p:nvPr/>
+        </p:nvSpPr>
+        <p:spPr>
+          <a:xfrm>
+            <a:off x="713449" y="344617"/>
+            <a:ext cx="3158237" cy="523220"/>
+          </a:xfrm>
+          <a:prstGeom prst="rect">
+            <a:avLst/>
+          </a:prstGeom>
+        </p:spPr>
+        <p:txBody>
+          <a:bodyPr wrap="none">
+            <a:spAutoFit/>
+          </a:bodyPr>
+          <a:lstStyle/>
+          <a:p>
+            <a:r>
+              <a:rPr lang="en-US" sz="2800" dirty="0">
+                <a:cs typeface="Consolas" panose="020B0609020204030204" pitchFamily="49" charset="0"/>
+              </a:rPr>
+              <a:t>Built-in </a:t>
+            </a:r>
+            <a:r>
+              <a:rPr lang="en-US" sz="2800" dirty="0" smtClean="0">
+                <a:cs typeface="Consolas" panose="020B0609020204030204" pitchFamily="49" charset="0"/>
+              </a:rPr>
+              <a:t>UI dialogs</a:t>
+            </a:r>
+            <a:r>
+              <a:rPr lang="en-US" sz="2800" dirty="0">
+                <a:cs typeface="Consolas" panose="020B0609020204030204" pitchFamily="49" charset="0"/>
+              </a:rPr>
+              <a:t>:</a:t>
+            </a:r>
+          </a:p>
+        </p:txBody>
+      </p:sp>
+      <p:sp>
+        <p:nvSpPr>
+          <p:cNvPr id="7" name="TextBox 6"/>
+          <p:cNvSpPr txBox="1"/>
+          <p:nvPr/>
+        </p:nvSpPr>
+        <p:spPr>
+          <a:xfrm>
+            <a:off x="1136824" y="867837"/>
+            <a:ext cx="2090637" cy="5262979"/>
+          </a:xfrm>
+          <a:prstGeom prst="rect">
+            <a:avLst/>
+          </a:prstGeom>
+          <a:noFill/>
+        </p:spPr>
+        <p:txBody>
+          <a:bodyPr wrap="none" rtlCol="0">
+            <a:spAutoFit/>
+          </a:bodyPr>
+          <a:lstStyle/>
+          <a:p>
+            <a:r>
+              <a:rPr lang="en-US" sz="1200" dirty="0" err="1">
+                <a:latin typeface="Consolas" panose="020B0609020204030204" pitchFamily="49" charset="0"/>
+                <a:cs typeface="Consolas" panose="020B0609020204030204" pitchFamily="49" charset="0"/>
+              </a:rPr>
+              <a:t>WelcomeDlg</a:t>
+            </a:r>
+            <a:endParaRPr lang="en-US" sz="1200" dirty="0">
+              <a:latin typeface="Consolas" panose="020B0609020204030204" pitchFamily="49" charset="0"/>
+              <a:cs typeface="Consolas" panose="020B0609020204030204" pitchFamily="49" charset="0"/>
+            </a:endParaRPr>
+          </a:p>
+          <a:p>
+            <a:r>
+              <a:rPr lang="en-US" sz="1200" dirty="0" err="1">
+                <a:latin typeface="Consolas" panose="020B0609020204030204" pitchFamily="49" charset="0"/>
+                <a:cs typeface="Consolas" panose="020B0609020204030204" pitchFamily="49" charset="0"/>
+              </a:rPr>
+              <a:t>WelcomeEulaDlg</a:t>
+            </a:r>
+            <a:endParaRPr lang="en-US" sz="1200" dirty="0">
+              <a:latin typeface="Consolas" panose="020B0609020204030204" pitchFamily="49" charset="0"/>
+              <a:cs typeface="Consolas" panose="020B0609020204030204" pitchFamily="49" charset="0"/>
+            </a:endParaRPr>
+          </a:p>
+          <a:p>
+            <a:r>
+              <a:rPr lang="en-US" sz="1200" dirty="0" err="1">
+                <a:latin typeface="Consolas" panose="020B0609020204030204" pitchFamily="49" charset="0"/>
+                <a:cs typeface="Consolas" panose="020B0609020204030204" pitchFamily="49" charset="0"/>
+              </a:rPr>
+              <a:t>AdvancedWelcomeEulaDlg</a:t>
+            </a:r>
+            <a:endParaRPr lang="en-US" sz="1200" dirty="0">
+              <a:latin typeface="Consolas" panose="020B0609020204030204" pitchFamily="49" charset="0"/>
+              <a:cs typeface="Consolas" panose="020B0609020204030204" pitchFamily="49" charset="0"/>
+            </a:endParaRPr>
+          </a:p>
+          <a:p>
+            <a:r>
+              <a:rPr lang="en-US" sz="1200" dirty="0" err="1">
+                <a:latin typeface="Consolas" panose="020B0609020204030204" pitchFamily="49" charset="0"/>
+                <a:cs typeface="Consolas" panose="020B0609020204030204" pitchFamily="49" charset="0"/>
+              </a:rPr>
+              <a:t>LicenseAgreementDlg</a:t>
+            </a:r>
+            <a:endParaRPr lang="en-US" sz="1200" dirty="0">
+              <a:latin typeface="Consolas" panose="020B0609020204030204" pitchFamily="49" charset="0"/>
+              <a:cs typeface="Consolas" panose="020B0609020204030204" pitchFamily="49" charset="0"/>
+            </a:endParaRPr>
+          </a:p>
+          <a:p>
+            <a:r>
+              <a:rPr lang="en-US" sz="1200" dirty="0" err="1">
+                <a:latin typeface="Consolas" panose="020B0609020204030204" pitchFamily="49" charset="0"/>
+                <a:cs typeface="Consolas" panose="020B0609020204030204" pitchFamily="49" charset="0"/>
+              </a:rPr>
+              <a:t>CustomizeDlg</a:t>
+            </a:r>
+            <a:endParaRPr lang="en-US" sz="1200" dirty="0">
+              <a:latin typeface="Consolas" panose="020B0609020204030204" pitchFamily="49" charset="0"/>
+              <a:cs typeface="Consolas" panose="020B0609020204030204" pitchFamily="49" charset="0"/>
+            </a:endParaRPr>
+          </a:p>
+          <a:p>
+            <a:r>
+              <a:rPr lang="en-US" sz="1200" dirty="0" err="1">
+                <a:latin typeface="Consolas" panose="020B0609020204030204" pitchFamily="49" charset="0"/>
+                <a:cs typeface="Consolas" panose="020B0609020204030204" pitchFamily="49" charset="0"/>
+              </a:rPr>
+              <a:t>SetupTypeDlg</a:t>
+            </a:r>
+            <a:endParaRPr lang="en-US" sz="1200" dirty="0">
+              <a:latin typeface="Consolas" panose="020B0609020204030204" pitchFamily="49" charset="0"/>
+              <a:cs typeface="Consolas" panose="020B0609020204030204" pitchFamily="49" charset="0"/>
+            </a:endParaRPr>
+          </a:p>
+          <a:p>
+            <a:r>
+              <a:rPr lang="en-US" sz="1200" dirty="0" err="1">
+                <a:latin typeface="Consolas" panose="020B0609020204030204" pitchFamily="49" charset="0"/>
+                <a:cs typeface="Consolas" panose="020B0609020204030204" pitchFamily="49" charset="0"/>
+              </a:rPr>
+              <a:t>BrowseDlg</a:t>
+            </a:r>
+            <a:endParaRPr lang="en-US" sz="1200" dirty="0">
+              <a:latin typeface="Consolas" panose="020B0609020204030204" pitchFamily="49" charset="0"/>
+              <a:cs typeface="Consolas" panose="020B0609020204030204" pitchFamily="49" charset="0"/>
+            </a:endParaRPr>
+          </a:p>
+          <a:p>
+            <a:r>
+              <a:rPr lang="en-US" sz="1200" dirty="0" err="1">
+                <a:latin typeface="Consolas" panose="020B0609020204030204" pitchFamily="49" charset="0"/>
+                <a:cs typeface="Consolas" panose="020B0609020204030204" pitchFamily="49" charset="0"/>
+              </a:rPr>
+              <a:t>DiskCostDlg</a:t>
+            </a:r>
+            <a:endParaRPr lang="en-US" sz="1200" dirty="0">
+              <a:latin typeface="Consolas" panose="020B0609020204030204" pitchFamily="49" charset="0"/>
+              <a:cs typeface="Consolas" panose="020B0609020204030204" pitchFamily="49" charset="0"/>
+            </a:endParaRPr>
+          </a:p>
+          <a:p>
+            <a:r>
+              <a:rPr lang="en-US" sz="1200" dirty="0" err="1">
+                <a:latin typeface="Consolas" panose="020B0609020204030204" pitchFamily="49" charset="0"/>
+                <a:cs typeface="Consolas" panose="020B0609020204030204" pitchFamily="49" charset="0"/>
+              </a:rPr>
+              <a:t>FeaturesDlg</a:t>
+            </a:r>
+            <a:endParaRPr lang="en-US" sz="1200" dirty="0">
+              <a:latin typeface="Consolas" panose="020B0609020204030204" pitchFamily="49" charset="0"/>
+              <a:cs typeface="Consolas" panose="020B0609020204030204" pitchFamily="49" charset="0"/>
+            </a:endParaRPr>
+          </a:p>
+          <a:p>
+            <a:r>
+              <a:rPr lang="en-US" sz="1200" dirty="0" err="1">
+                <a:latin typeface="Consolas" panose="020B0609020204030204" pitchFamily="49" charset="0"/>
+                <a:cs typeface="Consolas" panose="020B0609020204030204" pitchFamily="49" charset="0"/>
+              </a:rPr>
+              <a:t>InstallDirDlg</a:t>
+            </a:r>
+            <a:endParaRPr lang="en-US" sz="1200" dirty="0">
+              <a:latin typeface="Consolas" panose="020B0609020204030204" pitchFamily="49" charset="0"/>
+              <a:cs typeface="Consolas" panose="020B0609020204030204" pitchFamily="49" charset="0"/>
+            </a:endParaRPr>
+          </a:p>
+          <a:p>
+            <a:r>
+              <a:rPr lang="en-US" sz="1200" dirty="0" err="1">
+                <a:latin typeface="Consolas" panose="020B0609020204030204" pitchFamily="49" charset="0"/>
+                <a:cs typeface="Consolas" panose="020B0609020204030204" pitchFamily="49" charset="0"/>
+              </a:rPr>
+              <a:t>InstallScopeDlg</a:t>
+            </a:r>
+            <a:endParaRPr lang="en-US" sz="1200" dirty="0">
+              <a:latin typeface="Consolas" panose="020B0609020204030204" pitchFamily="49" charset="0"/>
+              <a:cs typeface="Consolas" panose="020B0609020204030204" pitchFamily="49" charset="0"/>
+            </a:endParaRPr>
+          </a:p>
+          <a:p>
+            <a:r>
+              <a:rPr lang="en-US" sz="1200" dirty="0" err="1">
+                <a:latin typeface="Consolas" panose="020B0609020204030204" pitchFamily="49" charset="0"/>
+                <a:cs typeface="Consolas" panose="020B0609020204030204" pitchFamily="49" charset="0"/>
+              </a:rPr>
+              <a:t>InvalidDirDlg</a:t>
+            </a:r>
+            <a:endParaRPr lang="en-US" sz="1200" dirty="0">
+              <a:latin typeface="Consolas" panose="020B0609020204030204" pitchFamily="49" charset="0"/>
+              <a:cs typeface="Consolas" panose="020B0609020204030204" pitchFamily="49" charset="0"/>
+            </a:endParaRPr>
+          </a:p>
+          <a:p>
+            <a:r>
+              <a:rPr lang="en-US" sz="1200" dirty="0" err="1">
+                <a:latin typeface="Consolas" panose="020B0609020204030204" pitchFamily="49" charset="0"/>
+                <a:cs typeface="Consolas" panose="020B0609020204030204" pitchFamily="49" charset="0"/>
+              </a:rPr>
+              <a:t>CancelDlg</a:t>
+            </a:r>
+            <a:endParaRPr lang="en-US" sz="1200" dirty="0">
+              <a:latin typeface="Consolas" panose="020B0609020204030204" pitchFamily="49" charset="0"/>
+              <a:cs typeface="Consolas" panose="020B0609020204030204" pitchFamily="49" charset="0"/>
+            </a:endParaRPr>
+          </a:p>
+          <a:p>
+            <a:r>
+              <a:rPr lang="en-US" sz="1200" dirty="0" err="1">
+                <a:latin typeface="Consolas" panose="020B0609020204030204" pitchFamily="49" charset="0"/>
+                <a:cs typeface="Consolas" panose="020B0609020204030204" pitchFamily="49" charset="0"/>
+              </a:rPr>
+              <a:t>ErrorDlg</a:t>
+            </a:r>
+            <a:endParaRPr lang="en-US" sz="1200" dirty="0">
+              <a:latin typeface="Consolas" panose="020B0609020204030204" pitchFamily="49" charset="0"/>
+              <a:cs typeface="Consolas" panose="020B0609020204030204" pitchFamily="49" charset="0"/>
+            </a:endParaRPr>
+          </a:p>
+          <a:p>
+            <a:r>
+              <a:rPr lang="en-US" sz="1200" dirty="0" err="1">
+                <a:latin typeface="Consolas" panose="020B0609020204030204" pitchFamily="49" charset="0"/>
+                <a:cs typeface="Consolas" panose="020B0609020204030204" pitchFamily="49" charset="0"/>
+              </a:rPr>
+              <a:t>ExitDlg</a:t>
+            </a:r>
+            <a:endParaRPr lang="en-US" sz="1200" dirty="0">
+              <a:latin typeface="Consolas" panose="020B0609020204030204" pitchFamily="49" charset="0"/>
+              <a:cs typeface="Consolas" panose="020B0609020204030204" pitchFamily="49" charset="0"/>
+            </a:endParaRPr>
+          </a:p>
+          <a:p>
+            <a:r>
+              <a:rPr lang="en-US" sz="1200" dirty="0" err="1">
+                <a:latin typeface="Consolas" panose="020B0609020204030204" pitchFamily="49" charset="0"/>
+                <a:cs typeface="Consolas" panose="020B0609020204030204" pitchFamily="49" charset="0"/>
+              </a:rPr>
+              <a:t>FatalError</a:t>
+            </a:r>
+            <a:endParaRPr lang="en-US" sz="1200" dirty="0">
+              <a:latin typeface="Consolas" panose="020B0609020204030204" pitchFamily="49" charset="0"/>
+              <a:cs typeface="Consolas" panose="020B0609020204030204" pitchFamily="49" charset="0"/>
+            </a:endParaRPr>
+          </a:p>
+          <a:p>
+            <a:r>
+              <a:rPr lang="en-US" sz="1200" dirty="0" err="1">
+                <a:latin typeface="Consolas" panose="020B0609020204030204" pitchFamily="49" charset="0"/>
+                <a:cs typeface="Consolas" panose="020B0609020204030204" pitchFamily="49" charset="0"/>
+              </a:rPr>
+              <a:t>FilesInUse</a:t>
+            </a:r>
+            <a:endParaRPr lang="en-US" sz="1200" dirty="0">
+              <a:latin typeface="Consolas" panose="020B0609020204030204" pitchFamily="49" charset="0"/>
+              <a:cs typeface="Consolas" panose="020B0609020204030204" pitchFamily="49" charset="0"/>
+            </a:endParaRPr>
+          </a:p>
+          <a:p>
+            <a:r>
+              <a:rPr lang="en-US" sz="1200" dirty="0" err="1">
+                <a:latin typeface="Consolas" panose="020B0609020204030204" pitchFamily="49" charset="0"/>
+                <a:cs typeface="Consolas" panose="020B0609020204030204" pitchFamily="49" charset="0"/>
+              </a:rPr>
+              <a:t>MaintenanceTypeDlg</a:t>
+            </a:r>
+            <a:endParaRPr lang="en-US" sz="1200" dirty="0">
+              <a:latin typeface="Consolas" panose="020B0609020204030204" pitchFamily="49" charset="0"/>
+              <a:cs typeface="Consolas" panose="020B0609020204030204" pitchFamily="49" charset="0"/>
+            </a:endParaRPr>
+          </a:p>
+          <a:p>
+            <a:r>
+              <a:rPr lang="en-US" sz="1200" dirty="0" err="1">
+                <a:latin typeface="Consolas" panose="020B0609020204030204" pitchFamily="49" charset="0"/>
+                <a:cs typeface="Consolas" panose="020B0609020204030204" pitchFamily="49" charset="0"/>
+              </a:rPr>
+              <a:t>MaintenanceWelcomeDlg</a:t>
+            </a:r>
+            <a:endParaRPr lang="en-US" sz="1200" dirty="0">
+              <a:latin typeface="Consolas" panose="020B0609020204030204" pitchFamily="49" charset="0"/>
+              <a:cs typeface="Consolas" panose="020B0609020204030204" pitchFamily="49" charset="0"/>
+            </a:endParaRPr>
+          </a:p>
+          <a:p>
+            <a:r>
+              <a:rPr lang="en-US" sz="1200" dirty="0" err="1">
+                <a:latin typeface="Consolas" panose="020B0609020204030204" pitchFamily="49" charset="0"/>
+                <a:cs typeface="Consolas" panose="020B0609020204030204" pitchFamily="49" charset="0"/>
+              </a:rPr>
+              <a:t>MsiRMFilesInUse</a:t>
+            </a:r>
+            <a:endParaRPr lang="en-US" sz="1200" dirty="0">
+              <a:latin typeface="Consolas" panose="020B0609020204030204" pitchFamily="49" charset="0"/>
+              <a:cs typeface="Consolas" panose="020B0609020204030204" pitchFamily="49" charset="0"/>
+            </a:endParaRPr>
+          </a:p>
+          <a:p>
+            <a:r>
+              <a:rPr lang="en-US" sz="1200" dirty="0" err="1">
+                <a:latin typeface="Consolas" panose="020B0609020204030204" pitchFamily="49" charset="0"/>
+                <a:cs typeface="Consolas" panose="020B0609020204030204" pitchFamily="49" charset="0"/>
+              </a:rPr>
+              <a:t>OutOfDiskDlg</a:t>
+            </a:r>
+            <a:endParaRPr lang="en-US" sz="1200" dirty="0">
+              <a:latin typeface="Consolas" panose="020B0609020204030204" pitchFamily="49" charset="0"/>
+              <a:cs typeface="Consolas" panose="020B0609020204030204" pitchFamily="49" charset="0"/>
+            </a:endParaRPr>
+          </a:p>
+          <a:p>
+            <a:r>
+              <a:rPr lang="en-US" sz="1200" dirty="0" err="1">
+                <a:latin typeface="Consolas" panose="020B0609020204030204" pitchFamily="49" charset="0"/>
+                <a:cs typeface="Consolas" panose="020B0609020204030204" pitchFamily="49" charset="0"/>
+              </a:rPr>
+              <a:t>OutOfRbDiskDlg</a:t>
+            </a:r>
+            <a:endParaRPr lang="en-US" sz="1200" dirty="0">
+              <a:latin typeface="Consolas" panose="020B0609020204030204" pitchFamily="49" charset="0"/>
+              <a:cs typeface="Consolas" panose="020B0609020204030204" pitchFamily="49" charset="0"/>
+            </a:endParaRPr>
+          </a:p>
+          <a:p>
+            <a:r>
+              <a:rPr lang="en-US" sz="1200" dirty="0" err="1">
+                <a:latin typeface="Consolas" panose="020B0609020204030204" pitchFamily="49" charset="0"/>
+                <a:cs typeface="Consolas" panose="020B0609020204030204" pitchFamily="49" charset="0"/>
+              </a:rPr>
+              <a:t>PrepareDlg</a:t>
+            </a:r>
+            <a:endParaRPr lang="en-US" sz="1200" dirty="0">
+              <a:latin typeface="Consolas" panose="020B0609020204030204" pitchFamily="49" charset="0"/>
+              <a:cs typeface="Consolas" panose="020B0609020204030204" pitchFamily="49" charset="0"/>
+            </a:endParaRPr>
+          </a:p>
+          <a:p>
+            <a:r>
+              <a:rPr lang="en-US" sz="1200" dirty="0" err="1">
+                <a:latin typeface="Consolas" panose="020B0609020204030204" pitchFamily="49" charset="0"/>
+                <a:cs typeface="Consolas" panose="020B0609020204030204" pitchFamily="49" charset="0"/>
+              </a:rPr>
+              <a:t>ProgressDlg</a:t>
+            </a:r>
+            <a:endParaRPr lang="en-US" sz="1200" dirty="0">
+              <a:latin typeface="Consolas" panose="020B0609020204030204" pitchFamily="49" charset="0"/>
+              <a:cs typeface="Consolas" panose="020B0609020204030204" pitchFamily="49" charset="0"/>
+            </a:endParaRPr>
+          </a:p>
+          <a:p>
+            <a:r>
+              <a:rPr lang="en-US" sz="1200" dirty="0" err="1">
+                <a:latin typeface="Consolas" panose="020B0609020204030204" pitchFamily="49" charset="0"/>
+                <a:cs typeface="Consolas" panose="020B0609020204030204" pitchFamily="49" charset="0"/>
+              </a:rPr>
+              <a:t>ResumeDlg</a:t>
+            </a:r>
+            <a:endParaRPr lang="en-US" sz="1200" dirty="0">
+              <a:latin typeface="Consolas" panose="020B0609020204030204" pitchFamily="49" charset="0"/>
+              <a:cs typeface="Consolas" panose="020B0609020204030204" pitchFamily="49" charset="0"/>
+            </a:endParaRPr>
+          </a:p>
+          <a:p>
+            <a:r>
+              <a:rPr lang="en-US" sz="1200" dirty="0" err="1">
+                <a:latin typeface="Consolas" panose="020B0609020204030204" pitchFamily="49" charset="0"/>
+                <a:cs typeface="Consolas" panose="020B0609020204030204" pitchFamily="49" charset="0"/>
+              </a:rPr>
+              <a:t>UserExit</a:t>
+            </a:r>
+            <a:endParaRPr lang="en-US" sz="1200" dirty="0">
+              <a:latin typeface="Consolas" panose="020B0609020204030204" pitchFamily="49" charset="0"/>
+              <a:cs typeface="Consolas" panose="020B0609020204030204" pitchFamily="49" charset="0"/>
+            </a:endParaRPr>
+          </a:p>
+          <a:p>
+            <a:r>
+              <a:rPr lang="en-US" sz="1200" dirty="0" err="1">
+                <a:latin typeface="Consolas" panose="020B0609020204030204" pitchFamily="49" charset="0"/>
+                <a:cs typeface="Consolas" panose="020B0609020204030204" pitchFamily="49" charset="0"/>
+              </a:rPr>
+              <a:t>VerifyReadyDlg</a:t>
+            </a:r>
+            <a:endParaRPr lang="en-US" sz="1200" dirty="0">
+              <a:latin typeface="Consolas" panose="020B0609020204030204" pitchFamily="49" charset="0"/>
+              <a:cs typeface="Consolas" panose="020B0609020204030204" pitchFamily="49" charset="0"/>
+            </a:endParaRPr>
+          </a:p>
+          <a:p>
+            <a:r>
+              <a:rPr lang="en-US" sz="1200" dirty="0" err="1">
+                <a:latin typeface="Consolas" panose="020B0609020204030204" pitchFamily="49" charset="0"/>
+                <a:cs typeface="Consolas" panose="020B0609020204030204" pitchFamily="49" charset="0"/>
+              </a:rPr>
+              <a:t>WaitForCostingDlg</a:t>
+            </a:r>
+            <a:endParaRPr lang="en-US" sz="1200" dirty="0">
+              <a:latin typeface="Consolas" panose="020B0609020204030204" pitchFamily="49" charset="0"/>
+              <a:cs typeface="Consolas" panose="020B0609020204030204" pitchFamily="49" charset="0"/>
+            </a:endParaRPr>
+          </a:p>
+        </p:txBody>
+      </p:sp>
+    </p:spTree>
+    <p:extLst>
+      <p:ext uri="{BB962C8B-B14F-4D97-AF65-F5344CB8AC3E}">
+        <p14:creationId xmlns:p14="http://schemas.microsoft.com/office/powerpoint/2010/main" val="2169062313"/>
+      </p:ext>
+    </p:extLst>
+  </p:cSld>
+  <p:clrMapOvr>
+    <a:masterClrMapping/>
+  </p:clrMapOvr>
+</p:sld>
+</file>
+
+<file path=ppt/slides/slide13.xml><?xml version="1.0" encoding="utf-8"?>
+<p:sld xmlns:a="http://schemas.openxmlformats.org/drawingml/2006/main" xmlns:r="http://schemas.openxmlformats.org/officeDocument/2006/relationships" xmlns:p="http://schemas.openxmlformats.org/presentationml/2006/main">
+  <p:cSld>
+    <p:spTree>
+      <p:nvGrpSpPr>
+        <p:cNvPr id="1" name=""/>
+        <p:cNvGrpSpPr/>
+        <p:nvPr/>
+      </p:nvGrpSpPr>
+      <p:grpSpPr>
+        <a:xfrm>
+          <a:off x="0" y="0"/>
+          <a:ext cx="0" cy="0"/>
+          <a:chOff x="0" y="0"/>
+          <a:chExt cx="0" cy="0"/>
+        </a:xfrm>
+      </p:grpSpPr>
+      <p:sp>
+        <p:nvSpPr>
+          <p:cNvPr id="6" name="TextBox 5"/>
+          <p:cNvSpPr txBox="1"/>
+          <p:nvPr/>
+        </p:nvSpPr>
+        <p:spPr>
+          <a:xfrm>
+            <a:off x="1136824" y="867837"/>
+            <a:ext cx="5530681" cy="1703480"/>
+          </a:xfrm>
+          <a:prstGeom prst="rect">
+            <a:avLst/>
+          </a:prstGeom>
+          <a:noFill/>
+        </p:spPr>
+        <p:txBody>
+          <a:bodyPr wrap="none" rtlCol="0">
+            <a:spAutoFit/>
+          </a:bodyPr>
+          <a:lstStyle/>
+          <a:p>
+            <a:pPr marL="285750" indent="-285750">
+              <a:lnSpc>
+                <a:spcPct val="150000"/>
+              </a:lnSpc>
+              <a:buFont typeface="Arial" panose="020B0604020202020204" pitchFamily="34" charset="0"/>
+              <a:buChar char="•"/>
+            </a:pPr>
+            <a:r>
+              <a:rPr lang="en-US" dirty="0"/>
+              <a:t>Icon (.</a:t>
+            </a:r>
+            <a:r>
+              <a:rPr lang="en-US" dirty="0" err="1"/>
+              <a:t>ico</a:t>
+            </a:r>
+            <a:r>
+              <a:rPr lang="en-US" dirty="0"/>
+              <a:t>)</a:t>
+            </a:r>
+          </a:p>
+          <a:p>
+            <a:pPr marL="285750" indent="-285750">
+              <a:lnSpc>
+                <a:spcPct val="150000"/>
+              </a:lnSpc>
+              <a:buFont typeface="Arial" panose="020B0604020202020204" pitchFamily="34" charset="0"/>
+              <a:buChar char="•"/>
+            </a:pPr>
+            <a:r>
+              <a:rPr lang="en-US" dirty="0"/>
+              <a:t>Banner (.bmp, .</a:t>
+            </a:r>
+            <a:r>
+              <a:rPr lang="en-US" dirty="0" err="1"/>
+              <a:t>png</a:t>
+            </a:r>
+            <a:r>
+              <a:rPr lang="en-US" dirty="0"/>
+              <a:t>, .jpg) - </a:t>
+            </a:r>
+            <a:r>
+              <a:rPr lang="ru-RU" dirty="0"/>
+              <a:t>493 × 58</a:t>
+            </a:r>
+            <a:endParaRPr lang="en-US" dirty="0"/>
+          </a:p>
+          <a:p>
+            <a:pPr marL="285750" indent="-285750">
+              <a:lnSpc>
+                <a:spcPct val="150000"/>
+              </a:lnSpc>
+              <a:buFont typeface="Arial" panose="020B0604020202020204" pitchFamily="34" charset="0"/>
+              <a:buChar char="•"/>
+            </a:pPr>
+            <a:r>
+              <a:rPr lang="en-US" dirty="0"/>
+              <a:t>Dialog background (.bmp, .</a:t>
+            </a:r>
+            <a:r>
+              <a:rPr lang="en-US" dirty="0" err="1"/>
+              <a:t>png</a:t>
+            </a:r>
+            <a:r>
+              <a:rPr lang="en-US" dirty="0"/>
+              <a:t>, .jpg) - </a:t>
+            </a:r>
+            <a:r>
+              <a:rPr lang="ru-RU" dirty="0"/>
+              <a:t>493 × 312</a:t>
+            </a:r>
+            <a:endParaRPr lang="en-US" dirty="0"/>
+          </a:p>
+          <a:p>
+            <a:pPr marL="285750" indent="-285750">
+              <a:lnSpc>
+                <a:spcPct val="150000"/>
+              </a:lnSpc>
+              <a:buFont typeface="Arial" panose="020B0604020202020204" pitchFamily="34" charset="0"/>
+              <a:buChar char="•"/>
+            </a:pPr>
+            <a:r>
+              <a:rPr lang="en-US" dirty="0"/>
               <a:t>License (.txt, .rtf)</a:t>
             </a:r>
+          </a:p>
+        </p:txBody>
+      </p:sp>
+      <p:sp>
+        <p:nvSpPr>
+          <p:cNvPr id="7" name="Прямоугольник 6"/>
+          <p:cNvSpPr/>
+          <p:nvPr/>
+        </p:nvSpPr>
+        <p:spPr>
+          <a:xfrm>
+            <a:off x="713449" y="344617"/>
+            <a:ext cx="2693366" cy="523220"/>
+          </a:xfrm>
+          <a:prstGeom prst="rect">
+            <a:avLst/>
+          </a:prstGeom>
+        </p:spPr>
+        <p:txBody>
+          <a:bodyPr wrap="none">
+            <a:spAutoFit/>
+          </a:bodyPr>
+          <a:lstStyle/>
+          <a:p>
+            <a:r>
+              <a:rPr lang="en-US" sz="2800" dirty="0"/>
+              <a:t>Main resources:</a:t>
+            </a:r>
+            <a:endParaRPr lang="ru-RU" sz="2800" dirty="0"/>
           </a:p>
         </p:txBody>
       </p:sp>
@@ -8364,7 +9108,7 @@
         <p:spPr>
           <a:xfrm>
             <a:off x="1828801" y="1150554"/>
-            <a:ext cx="6056530" cy="3831818"/>
+            <a:ext cx="6056530" cy="4478149"/>
           </a:xfrm>
           <a:prstGeom prst="rect">
             <a:avLst/>
@@ -8507,8 +9251,48 @@
             </a:pPr>
             <a:r>
               <a:rPr lang="en-US" dirty="0" smtClean="0"/>
-              <a:t>Large community</a:t>
-            </a:r>
+              <a:t>Large </a:t>
+            </a:r>
+            <a:r>
+              <a:rPr lang="en-US" dirty="0" smtClean="0"/>
+              <a:t>community</a:t>
+            </a:r>
+          </a:p>
+          <a:p>
+            <a:pPr marL="742950" lvl="1" indent="-285750">
+              <a:lnSpc>
+                <a:spcPct val="150000"/>
+              </a:lnSpc>
+              <a:buFont typeface="Arial" panose="020B0604020202020204" pitchFamily="34" charset="0"/>
+              <a:buChar char="•"/>
+            </a:pPr>
+            <a:r>
+              <a:rPr lang="en-US" sz="1400" dirty="0" smtClean="0"/>
+              <a:t>6 444 questions on </a:t>
+            </a:r>
+            <a:r>
+              <a:rPr lang="en-US" sz="1400" dirty="0" err="1" smtClean="0"/>
+              <a:t>StackOverflow</a:t>
+            </a:r>
+            <a:endParaRPr lang="en-US" sz="1400" dirty="0" smtClean="0"/>
+          </a:p>
+          <a:p>
+            <a:pPr marL="742950" lvl="1" indent="-285750">
+              <a:lnSpc>
+                <a:spcPct val="150000"/>
+              </a:lnSpc>
+              <a:buFont typeface="Arial" panose="020B0604020202020204" pitchFamily="34" charset="0"/>
+              <a:buChar char="•"/>
+            </a:pPr>
+            <a:r>
+              <a:rPr lang="en-US" sz="1400" dirty="0" smtClean="0"/>
+              <a:t>68 detailed guides on </a:t>
+            </a:r>
+            <a:r>
+              <a:rPr lang="en-US" sz="1400" dirty="0" err="1" smtClean="0"/>
+              <a:t>CodeProject</a:t>
+            </a:r>
+            <a:endParaRPr lang="en-US" sz="1400" dirty="0" smtClean="0"/>
           </a:p>
         </p:txBody>
       </p:sp>
@@ -9412,11 +10196,7 @@
           <a:p>
             <a:r>
               <a:rPr lang="en-US" dirty="0" smtClean="0"/>
-              <a:t>Each component is </a:t>
-            </a:r>
-            <a:r>
-              <a:rPr lang="en-US" dirty="0" smtClean="0"/>
-              <a:t>an </a:t>
+              <a:t>Each component is an </a:t>
             </a:r>
             <a:r>
               <a:rPr lang="en-US" dirty="0" smtClean="0">
@@ -9424,15 +10204,7 @@
                   <a:srgbClr val="FF0000"/>
                 </a:solidFill>
               </a:rPr>
-              <a:t>atomic </a:t>
-            </a:r>
-            <a:r>
-              <a:rPr lang="en-US" dirty="0" smtClean="0">
-                <a:solidFill>
-                  <a:srgbClr val="FF0000"/>
-                </a:solidFill>
-              </a:rPr>
-              <a:t>unit</a:t>
+              <a:t>atomic unit</a:t>
             </a:r>
             <a:r>
               <a:rPr lang="en-US" dirty="0" smtClean="0"/>
@@ -9543,14 +10315,14 @@
       </p:grpSpPr>
       <p:sp>
         <p:nvSpPr>
-          <p:cNvPr id="4" name="Прямоугольник 3"/>
+          <p:cNvPr id="6" name="Прямоугольник 5"/>
           <p:cNvSpPr/>
           <p:nvPr/>
         </p:nvSpPr>
         <p:spPr>
           <a:xfrm>
-            <a:off x="2402205" y="1572055"/>
-            <a:ext cx="2053832" cy="369332"/>
+            <a:off x="713449" y="344617"/>
+            <a:ext cx="3093539" cy="523220"/>
           </a:xfrm>
           <a:prstGeom prst="rect">
             <a:avLst/>
@@ -9563,23 +10335,23 @@
           <a:lstStyle/>
           <a:p>
             <a:r>
-              <a:rPr lang="en-US" dirty="0" smtClean="0"/>
+              <a:rPr lang="en-US" sz="2800" dirty="0"/>
               <a:t>A simple installer:</a:t>
             </a:r>
-            <a:endParaRPr lang="ru-RU" dirty="0"/>
-          </a:p>
-        </p:txBody>
-      </p:sp>
-      <p:sp>
-        <p:nvSpPr>
-          <p:cNvPr id="5" name="TextBox 4"/>
+            <a:endParaRPr lang="ru-RU" sz="2800" dirty="0"/>
+          </a:p>
+        </p:txBody>
+      </p:sp>
+      <p:sp>
+        <p:nvSpPr>
+          <p:cNvPr id="7" name="TextBox 6"/>
           <p:cNvSpPr txBox="1"/>
           <p:nvPr/>
         </p:nvSpPr>
         <p:spPr>
           <a:xfrm>
-            <a:off x="2825580" y="1941387"/>
-            <a:ext cx="3629520" cy="2585323"/>
+            <a:off x="1136824" y="867837"/>
+            <a:ext cx="3130985" cy="2585323"/>
           </a:xfrm>
           <a:prstGeom prst="rect">
             <a:avLst/>
@@ -9600,8 +10372,8 @@
               <a:buChar char="•"/>
             </a:pPr>
             <a:r>
-              <a:rPr lang="en-US" dirty="0" smtClean="0"/>
-              <a:t>Feature, components and files</a:t>
+              <a:rPr lang="en-US" dirty="0"/>
+              <a:t>Features and components</a:t>
             </a:r>
           </a:p>
           <a:p>
@@ -9613,8 +10385,8 @@
               <a:buChar char="•"/>
             </a:pPr>
             <a:r>
-              <a:rPr lang="en-US" dirty="0" smtClean="0"/>
-              <a:t>Variables</a:t>
+              <a:rPr lang="en-US" dirty="0"/>
+              <a:t>Directories and files</a:t>
             </a:r>
           </a:p>
           <a:p>
@@ -9626,8 +10398,8 @@
               <a:buChar char="•"/>
             </a:pPr>
             <a:r>
-              <a:rPr lang="en-US" dirty="0" smtClean="0"/>
-              <a:t>UI</a:t>
+              <a:rPr lang="en-US" dirty="0"/>
+              <a:t>Fragments</a:t>
             </a:r>
           </a:p>
           <a:p>
@@ -9639,8 +10411,8 @@
               <a:buChar char="•"/>
             </a:pPr>
             <a:r>
-              <a:rPr lang="en-US" dirty="0" smtClean="0"/>
-              <a:t>Custom resources</a:t>
+              <a:rPr lang="en-US" dirty="0"/>
+              <a:t>Variables</a:t>
             </a:r>
           </a:p>
           <a:p>
@@ -9653,8 +10425,9 @@
             </a:pPr>
             <a:r>
               <a:rPr lang="en-US" dirty="0" smtClean="0"/>
-              <a:t>Shortcuts</a:t>
-            </a:r>
+              <a:t>Built-in UI dialogs</a:t>
+            </a:r>
+            <a:endParaRPr lang="en-US" dirty="0"/>
           </a:p>
           <a:p>
             <a:pPr marL="285750" indent="-285750">
@@ -9665,8 +10438,8 @@
               <a:buChar char="•"/>
             </a:pPr>
             <a:r>
-              <a:rPr lang="en-US" dirty="0" smtClean="0"/>
-              <a:t>Readme.txt</a:t>
+              <a:rPr lang="en-US" dirty="0"/>
+              <a:t>Custom resources</a:t>
             </a:r>
           </a:p>
         </p:txBody>
@@ -9703,14 +10476,43 @@
       </p:grpSpPr>
       <p:sp>
         <p:nvSpPr>
-          <p:cNvPr id="4" name="TextBox 3"/>
+          <p:cNvPr id="4" name="Прямоугольник 3"/>
+          <p:cNvSpPr/>
+          <p:nvPr/>
+        </p:nvSpPr>
+        <p:spPr>
+          <a:xfrm>
+            <a:off x="713449" y="344617"/>
+            <a:ext cx="5022529" cy="523220"/>
+          </a:xfrm>
+          <a:prstGeom prst="rect">
+            <a:avLst/>
+          </a:prstGeom>
+        </p:spPr>
+        <p:txBody>
+          <a:bodyPr wrap="none">
+            <a:spAutoFit/>
+          </a:bodyPr>
+          <a:lstStyle/>
+          <a:p>
+            <a:r>
+              <a:rPr lang="en-US" sz="2800" dirty="0" smtClean="0"/>
+              <a:t>An installer project structure:</a:t>
+            </a:r>
+            <a:endParaRPr lang="ru-RU" sz="2800" dirty="0"/>
+          </a:p>
+        </p:txBody>
+      </p:sp>
+      <p:sp>
+        <p:nvSpPr>
+          <p:cNvPr id="5" name="TextBox 4"/>
           <p:cNvSpPr txBox="1"/>
           <p:nvPr/>
         </p:nvSpPr>
         <p:spPr>
           <a:xfrm>
-            <a:off x="2710249" y="2262664"/>
-            <a:ext cx="4830168" cy="1754326"/>
+            <a:off x="1136824" y="867837"/>
+            <a:ext cx="2489784" cy="5493812"/>
           </a:xfrm>
           <a:prstGeom prst="rect">
             <a:avLst/>
@@ -9723,96 +10525,177 @@
           </a:bodyPr>
           <a:lstStyle/>
           <a:p>
-            <a:pPr marL="285750" indent="-285750">
+            <a:pPr>
               <a:lnSpc>
                 <a:spcPct val="150000"/>
               </a:lnSpc>
-              <a:buFont typeface="Arial" panose="020B0604020202020204" pitchFamily="34" charset="0"/>
-              <a:buChar char="•"/>
             </a:pPr>
             <a:r>
-              <a:rPr lang="en-US" dirty="0" smtClean="0">
-                <a:solidFill>
-                  <a:srgbClr val="FF0000"/>
-                </a:solidFill>
-              </a:rPr>
-              <a:t>Each file / action should be a component!</a:t>
-            </a:r>
-          </a:p>
-          <a:p>
-            <a:pPr marL="285750" indent="-285750">
+              <a:rPr lang="en-US" dirty="0" err="1" smtClean="0"/>
+              <a:t>Product.wxs</a:t>
+            </a:r>
+            <a:endParaRPr lang="en-US" dirty="0" smtClean="0"/>
+          </a:p>
+          <a:p>
+            <a:pPr>
               <a:lnSpc>
                 <a:spcPct val="150000"/>
               </a:lnSpc>
-              <a:buFont typeface="Arial" panose="020B0604020202020204" pitchFamily="34" charset="0"/>
-              <a:buChar char="•"/>
             </a:pPr>
             <a:r>
-              <a:rPr lang="en-US" dirty="0" smtClean="0"/>
-              <a:t>Use variables</a:t>
-            </a:r>
-          </a:p>
-          <a:p>
-            <a:pPr marL="285750" indent="-285750">
+              <a:rPr lang="en-US" dirty="0" err="1" smtClean="0"/>
+              <a:t>Variables.wxi</a:t>
+            </a:r>
+            <a:endParaRPr lang="en-US" dirty="0" smtClean="0"/>
+          </a:p>
+          <a:p>
+            <a:pPr>
               <a:lnSpc>
                 <a:spcPct val="150000"/>
               </a:lnSpc>
-              <a:buFont typeface="Arial" panose="020B0604020202020204" pitchFamily="34" charset="0"/>
-              <a:buChar char="•"/>
             </a:pPr>
             <a:r>
-              <a:rPr lang="en-US" dirty="0" smtClean="0"/>
-              <a:t>Use fragments</a:t>
-            </a:r>
-          </a:p>
-          <a:p>
-            <a:pPr marL="285750" indent="-285750">
+              <a:rPr lang="en-US" dirty="0" err="1" smtClean="0"/>
+              <a:t>Wizard.wxs</a:t>
+            </a:r>
+            <a:endParaRPr lang="en-US" dirty="0" smtClean="0"/>
+          </a:p>
+          <a:p>
+            <a:pPr>
               <a:lnSpc>
                 <a:spcPct val="150000"/>
               </a:lnSpc>
-              <a:buFont typeface="Arial" panose="020B0604020202020204" pitchFamily="34" charset="0"/>
-              <a:buChar char="•"/>
             </a:pPr>
             <a:r>
+              <a:rPr lang="en-US" dirty="0" err="1" smtClean="0"/>
+              <a:t>Directories.wxs</a:t>
+            </a:r>
+            <a:endParaRPr lang="en-US" dirty="0" smtClean="0"/>
+          </a:p>
+          <a:p>
+            <a:pPr>
+              <a:lnSpc>
+                <a:spcPct val="150000"/>
+              </a:lnSpc>
+            </a:pPr>
+            <a:r>
+              <a:rPr lang="en-US" dirty="0" smtClean="0">
+                <a:solidFill>
+                  <a:schemeClr val="accent1">
+                    <a:lumMod val="75000"/>
+                  </a:schemeClr>
+                </a:solidFill>
+              </a:rPr>
+              <a:t>COMPONENTS</a:t>
+            </a:r>
+          </a:p>
+          <a:p>
+            <a:pPr lvl="1">
+              <a:lnSpc>
+                <a:spcPct val="150000"/>
+              </a:lnSpc>
+            </a:pPr>
+            <a:r>
               <a:rPr lang="en-US" dirty="0" smtClean="0"/>
-              <a:t>Use comments</a:t>
-            </a:r>
-          </a:p>
-        </p:txBody>
-      </p:sp>
-      <p:sp>
-        <p:nvSpPr>
-          <p:cNvPr id="5" name="Прямоугольник 4"/>
-          <p:cNvSpPr/>
-          <p:nvPr/>
-        </p:nvSpPr>
-        <p:spPr>
-          <a:xfrm>
-            <a:off x="2262161" y="1893332"/>
-            <a:ext cx="2146998" cy="369332"/>
-          </a:xfrm>
-          <a:prstGeom prst="rect">
-            <a:avLst/>
-          </a:prstGeom>
-        </p:spPr>
-        <p:txBody>
-          <a:bodyPr wrap="none">
-            <a:spAutoFit/>
-          </a:bodyPr>
-          <a:lstStyle/>
-          <a:p>
+              <a:t>Component1.wxs</a:t>
+            </a:r>
+          </a:p>
+          <a:p>
+            <a:pPr lvl="1">
+              <a:lnSpc>
+                <a:spcPct val="150000"/>
+              </a:lnSpc>
+            </a:pPr>
             <a:r>
               <a:rPr lang="en-US" dirty="0" smtClean="0"/>
-              <a:t>Recommendations:</a:t>
-            </a:r>
-            <a:endParaRPr lang="ru-RU" dirty="0"/>
+              <a:t>Component1.wxs</a:t>
+            </a:r>
+            <a:endParaRPr lang="en-US" dirty="0"/>
+          </a:p>
+          <a:p>
+            <a:pPr>
+              <a:lnSpc>
+                <a:spcPct val="150000"/>
+              </a:lnSpc>
+            </a:pPr>
+            <a:r>
+              <a:rPr lang="en-US" dirty="0" smtClean="0">
+                <a:solidFill>
+                  <a:schemeClr val="accent1">
+                    <a:lumMod val="75000"/>
+                  </a:schemeClr>
+                </a:solidFill>
+              </a:rPr>
+              <a:t>DIALOGS</a:t>
+            </a:r>
+          </a:p>
+          <a:p>
+            <a:pPr lvl="1">
+              <a:lnSpc>
+                <a:spcPct val="150000"/>
+              </a:lnSpc>
+            </a:pPr>
+            <a:r>
+              <a:rPr lang="en-US" dirty="0" smtClean="0"/>
+              <a:t>Dialog1.wxs</a:t>
+            </a:r>
+          </a:p>
+          <a:p>
+            <a:pPr lvl="1">
+              <a:lnSpc>
+                <a:spcPct val="150000"/>
+              </a:lnSpc>
+            </a:pPr>
+            <a:r>
+              <a:rPr lang="en-US" dirty="0" smtClean="0"/>
+              <a:t>Dialog2.wxs</a:t>
+            </a:r>
+          </a:p>
+          <a:p>
+            <a:pPr>
+              <a:lnSpc>
+                <a:spcPct val="150000"/>
+              </a:lnSpc>
+            </a:pPr>
+            <a:r>
+              <a:rPr lang="en-US" dirty="0" smtClean="0">
+                <a:solidFill>
+                  <a:schemeClr val="accent1">
+                    <a:lumMod val="75000"/>
+                  </a:schemeClr>
+                </a:solidFill>
+              </a:rPr>
+              <a:t>RESOURCES</a:t>
+            </a:r>
+          </a:p>
+          <a:p>
+            <a:pPr marL="457200" lvl="2">
+              <a:lnSpc>
+                <a:spcPct val="150000"/>
+              </a:lnSpc>
+            </a:pPr>
+            <a:r>
+              <a:rPr lang="en-US" dirty="0" smtClean="0"/>
+              <a:t>Banner.png</a:t>
+            </a:r>
+          </a:p>
+          <a:p>
+            <a:pPr marL="457200" lvl="2">
+              <a:lnSpc>
+                <a:spcPct val="150000"/>
+              </a:lnSpc>
+            </a:pPr>
+            <a:r>
+              <a:rPr lang="en-US" dirty="0" smtClean="0"/>
+              <a:t>License.txt</a:t>
+            </a:r>
           </a:p>
         </p:txBody>
       </p:sp>
     </p:spTree>
     <p:extLst>
       <p:ext uri="{BB962C8B-B14F-4D97-AF65-F5344CB8AC3E}">
-        <p14:creationId xmlns:p14="http://schemas.microsoft.com/office/powerpoint/2010/main" val="913546643"/>
+        <p14:creationId xmlns:p14="http://schemas.microsoft.com/office/powerpoint/2010/main" val="344078220"/>
       </p:ext>
     </p:extLst>
   </p:cSld>

</xml_diff>

<commit_message>
Updated part 1 presentation. Added base installer for app part 2.
</commit_message>
<xml_diff>
--- a/Part 1/WiX Part 1.pptx
+++ b/Part 1/WiX Part 1.pptx
@@ -7560,6 +7560,13 @@
   <p:clrMapOvr>
     <a:masterClrMapping/>
   </p:clrMapOvr>
+  <p:timing>
+    <p:tnLst>
+      <p:par>
+        <p:cTn id="1" dur="indefinite" restart="never" nodeType="tmRoot"/>
+      </p:par>
+    </p:tnLst>
+  </p:timing>
 </p:sld>
 </file>
 
@@ -7698,6 +7705,232 @@
   <p:clrMapOvr>
     <a:masterClrMapping/>
   </p:clrMapOvr>
+  <p:timing>
+    <p:tnLst>
+      <p:par>
+        <p:cTn id="1" dur="indefinite" restart="never" nodeType="tmRoot">
+          <p:childTnLst>
+            <p:seq concurrent="1" nextAc="seek">
+              <p:cTn id="2" dur="indefinite" nodeType="mainSeq">
+                <p:childTnLst>
+                  <p:par>
+                    <p:cTn id="3" fill="hold">
+                      <p:stCondLst>
+                        <p:cond delay="indefinite"/>
+                      </p:stCondLst>
+                      <p:childTnLst>
+                        <p:par>
+                          <p:cTn id="4" fill="hold">
+                            <p:stCondLst>
+                              <p:cond delay="0"/>
+                            </p:stCondLst>
+                            <p:childTnLst>
+                              <p:par>
+                                <p:cTn id="5" presetID="1" presetClass="entr" presetSubtype="0" fill="hold" nodeType="clickEffect">
+                                  <p:stCondLst>
+                                    <p:cond delay="0"/>
+                                  </p:stCondLst>
+                                  <p:childTnLst>
+                                    <p:set>
+                                      <p:cBhvr>
+                                        <p:cTn id="6" dur="1" fill="hold">
+                                          <p:stCondLst>
+                                            <p:cond delay="0"/>
+                                          </p:stCondLst>
+                                        </p:cTn>
+                                        <p:tgtEl>
+                                          <p:spTgt spid="7">
+                                            <p:txEl>
+                                              <p:pRg st="0" end="0"/>
+                                            </p:txEl>
+                                          </p:spTgt>
+                                        </p:tgtEl>
+                                        <p:attrNameLst>
+                                          <p:attrName>style.visibility</p:attrName>
+                                        </p:attrNameLst>
+                                      </p:cBhvr>
+                                      <p:to>
+                                        <p:strVal val="visible"/>
+                                      </p:to>
+                                    </p:set>
+                                  </p:childTnLst>
+                                </p:cTn>
+                              </p:par>
+                            </p:childTnLst>
+                          </p:cTn>
+                        </p:par>
+                      </p:childTnLst>
+                    </p:cTn>
+                  </p:par>
+                  <p:par>
+                    <p:cTn id="7" fill="hold">
+                      <p:stCondLst>
+                        <p:cond delay="indefinite"/>
+                      </p:stCondLst>
+                      <p:childTnLst>
+                        <p:par>
+                          <p:cTn id="8" fill="hold">
+                            <p:stCondLst>
+                              <p:cond delay="0"/>
+                            </p:stCondLst>
+                            <p:childTnLst>
+                              <p:par>
+                                <p:cTn id="9" presetID="1" presetClass="entr" presetSubtype="0" fill="hold" nodeType="clickEffect">
+                                  <p:stCondLst>
+                                    <p:cond delay="0"/>
+                                  </p:stCondLst>
+                                  <p:childTnLst>
+                                    <p:set>
+                                      <p:cBhvr>
+                                        <p:cTn id="10" dur="1" fill="hold">
+                                          <p:stCondLst>
+                                            <p:cond delay="0"/>
+                                          </p:stCondLst>
+                                        </p:cTn>
+                                        <p:tgtEl>
+                                          <p:spTgt spid="7">
+                                            <p:txEl>
+                                              <p:pRg st="1" end="1"/>
+                                            </p:txEl>
+                                          </p:spTgt>
+                                        </p:tgtEl>
+                                        <p:attrNameLst>
+                                          <p:attrName>style.visibility</p:attrName>
+                                        </p:attrNameLst>
+                                      </p:cBhvr>
+                                      <p:to>
+                                        <p:strVal val="visible"/>
+                                      </p:to>
+                                    </p:set>
+                                  </p:childTnLst>
+                                </p:cTn>
+                              </p:par>
+                            </p:childTnLst>
+                          </p:cTn>
+                        </p:par>
+                      </p:childTnLst>
+                    </p:cTn>
+                  </p:par>
+                  <p:par>
+                    <p:cTn id="11" fill="hold">
+                      <p:stCondLst>
+                        <p:cond delay="indefinite"/>
+                      </p:stCondLst>
+                      <p:childTnLst>
+                        <p:par>
+                          <p:cTn id="12" fill="hold">
+                            <p:stCondLst>
+                              <p:cond delay="0"/>
+                            </p:stCondLst>
+                            <p:childTnLst>
+                              <p:par>
+                                <p:cTn id="13" presetID="1" presetClass="entr" presetSubtype="0" fill="hold" nodeType="clickEffect">
+                                  <p:stCondLst>
+                                    <p:cond delay="0"/>
+                                  </p:stCondLst>
+                                  <p:childTnLst>
+                                    <p:set>
+                                      <p:cBhvr>
+                                        <p:cTn id="14" dur="1" fill="hold">
+                                          <p:stCondLst>
+                                            <p:cond delay="0"/>
+                                          </p:stCondLst>
+                                        </p:cTn>
+                                        <p:tgtEl>
+                                          <p:spTgt spid="7">
+                                            <p:txEl>
+                                              <p:pRg st="2" end="2"/>
+                                            </p:txEl>
+                                          </p:spTgt>
+                                        </p:tgtEl>
+                                        <p:attrNameLst>
+                                          <p:attrName>style.visibility</p:attrName>
+                                        </p:attrNameLst>
+                                      </p:cBhvr>
+                                      <p:to>
+                                        <p:strVal val="visible"/>
+                                      </p:to>
+                                    </p:set>
+                                  </p:childTnLst>
+                                </p:cTn>
+                              </p:par>
+                            </p:childTnLst>
+                          </p:cTn>
+                        </p:par>
+                      </p:childTnLst>
+                    </p:cTn>
+                  </p:par>
+                  <p:par>
+                    <p:cTn id="15" fill="hold">
+                      <p:stCondLst>
+                        <p:cond delay="indefinite"/>
+                      </p:stCondLst>
+                      <p:childTnLst>
+                        <p:par>
+                          <p:cTn id="16" fill="hold">
+                            <p:stCondLst>
+                              <p:cond delay="0"/>
+                            </p:stCondLst>
+                            <p:childTnLst>
+                              <p:par>
+                                <p:cTn id="17" presetID="1" presetClass="entr" presetSubtype="0" fill="hold" nodeType="clickEffect">
+                                  <p:stCondLst>
+                                    <p:cond delay="0"/>
+                                  </p:stCondLst>
+                                  <p:childTnLst>
+                                    <p:set>
+                                      <p:cBhvr>
+                                        <p:cTn id="18" dur="1" fill="hold">
+                                          <p:stCondLst>
+                                            <p:cond delay="0"/>
+                                          </p:stCondLst>
+                                        </p:cTn>
+                                        <p:tgtEl>
+                                          <p:spTgt spid="7">
+                                            <p:txEl>
+                                              <p:pRg st="3" end="3"/>
+                                            </p:txEl>
+                                          </p:spTgt>
+                                        </p:tgtEl>
+                                        <p:attrNameLst>
+                                          <p:attrName>style.visibility</p:attrName>
+                                        </p:attrNameLst>
+                                      </p:cBhvr>
+                                      <p:to>
+                                        <p:strVal val="visible"/>
+                                      </p:to>
+                                    </p:set>
+                                  </p:childTnLst>
+                                </p:cTn>
+                              </p:par>
+                            </p:childTnLst>
+                          </p:cTn>
+                        </p:par>
+                      </p:childTnLst>
+                    </p:cTn>
+                  </p:par>
+                </p:childTnLst>
+              </p:cTn>
+              <p:prevCondLst>
+                <p:cond evt="onPrev" delay="0">
+                  <p:tgtEl>
+                    <p:sldTgt/>
+                  </p:tgtEl>
+                </p:cond>
+              </p:prevCondLst>
+              <p:nextCondLst>
+                <p:cond evt="onNext" delay="0">
+                  <p:tgtEl>
+                    <p:sldTgt/>
+                  </p:tgtEl>
+                </p:cond>
+              </p:nextCondLst>
+            </p:seq>
+          </p:childTnLst>
+        </p:cTn>
+      </p:par>
+    </p:tnLst>
+  </p:timing>
 </p:sld>
 </file>
 
@@ -7850,6 +8083,13 @@
   <p:clrMapOvr>
     <a:masterClrMapping/>
   </p:clrMapOvr>
+  <p:timing>
+    <p:tnLst>
+      <p:par>
+        <p:cTn id="1" dur="indefinite" restart="never" nodeType="tmRoot"/>
+      </p:par>
+    </p:tnLst>
+  </p:timing>
 </p:sld>
 </file>
 
@@ -8309,6 +8549,13 @@
   <p:clrMapOvr>
     <a:masterClrMapping/>
   </p:clrMapOvr>
+  <p:timing>
+    <p:tnLst>
+      <p:par>
+        <p:cTn id="1" dur="indefinite" restart="never" nodeType="tmRoot"/>
+      </p:par>
+    </p:tnLst>
+  </p:timing>
 </p:sld>
 </file>
 
@@ -8477,6 +8724,13 @@
   <p:clrMapOvr>
     <a:masterClrMapping/>
   </p:clrMapOvr>
+  <p:timing>
+    <p:tnLst>
+      <p:par>
+        <p:cTn id="1" dur="indefinite" restart="never" nodeType="tmRoot"/>
+      </p:par>
+    </p:tnLst>
+  </p:timing>
 </p:sld>
 </file>
 
@@ -8573,6 +8827,13 @@
   <p:clrMapOvr>
     <a:masterClrMapping/>
   </p:clrMapOvr>
+  <p:timing>
+    <p:tnLst>
+      <p:par>
+        <p:cTn id="1" dur="indefinite" restart="never" nodeType="tmRoot"/>
+      </p:par>
+    </p:tnLst>
+  </p:timing>
 </p:sld>
 </file>
 
@@ -8825,6 +9086,323 @@
   <p:clrMapOvr>
     <a:masterClrMapping/>
   </p:clrMapOvr>
+  <p:timing>
+    <p:tnLst>
+      <p:par>
+        <p:cTn id="1" dur="indefinite" restart="never" nodeType="tmRoot">
+          <p:childTnLst>
+            <p:seq concurrent="1" nextAc="seek">
+              <p:cTn id="2" dur="indefinite" nodeType="mainSeq">
+                <p:childTnLst>
+                  <p:par>
+                    <p:cTn id="3" fill="hold">
+                      <p:stCondLst>
+                        <p:cond delay="indefinite"/>
+                      </p:stCondLst>
+                      <p:childTnLst>
+                        <p:par>
+                          <p:cTn id="4" fill="hold">
+                            <p:stCondLst>
+                              <p:cond delay="0"/>
+                            </p:stCondLst>
+                            <p:childTnLst>
+                              <p:par>
+                                <p:cTn id="5" presetID="1" presetClass="entr" presetSubtype="0" fill="hold" grpId="0" nodeType="clickEffect">
+                                  <p:stCondLst>
+                                    <p:cond delay="0"/>
+                                  </p:stCondLst>
+                                  <p:childTnLst>
+                                    <p:set>
+                                      <p:cBhvr>
+                                        <p:cTn id="6" dur="1" fill="hold">
+                                          <p:stCondLst>
+                                            <p:cond delay="0"/>
+                                          </p:stCondLst>
+                                        </p:cTn>
+                                        <p:tgtEl>
+                                          <p:spTgt spid="5"/>
+                                        </p:tgtEl>
+                                        <p:attrNameLst>
+                                          <p:attrName>style.visibility</p:attrName>
+                                        </p:attrNameLst>
+                                      </p:cBhvr>
+                                      <p:to>
+                                        <p:strVal val="visible"/>
+                                      </p:to>
+                                    </p:set>
+                                  </p:childTnLst>
+                                </p:cTn>
+                              </p:par>
+                            </p:childTnLst>
+                          </p:cTn>
+                        </p:par>
+                      </p:childTnLst>
+                    </p:cTn>
+                  </p:par>
+                  <p:par>
+                    <p:cTn id="7" fill="hold">
+                      <p:stCondLst>
+                        <p:cond delay="indefinite"/>
+                      </p:stCondLst>
+                      <p:childTnLst>
+                        <p:par>
+                          <p:cTn id="8" fill="hold">
+                            <p:stCondLst>
+                              <p:cond delay="0"/>
+                            </p:stCondLst>
+                            <p:childTnLst>
+                              <p:par>
+                                <p:cTn id="9" presetID="1" presetClass="entr" presetSubtype="0" fill="hold" grpId="0" nodeType="clickEffect">
+                                  <p:stCondLst>
+                                    <p:cond delay="0"/>
+                                  </p:stCondLst>
+                                  <p:childTnLst>
+                                    <p:set>
+                                      <p:cBhvr>
+                                        <p:cTn id="10" dur="1" fill="hold">
+                                          <p:stCondLst>
+                                            <p:cond delay="0"/>
+                                          </p:stCondLst>
+                                        </p:cTn>
+                                        <p:tgtEl>
+                                          <p:spTgt spid="6"/>
+                                        </p:tgtEl>
+                                        <p:attrNameLst>
+                                          <p:attrName>style.visibility</p:attrName>
+                                        </p:attrNameLst>
+                                      </p:cBhvr>
+                                      <p:to>
+                                        <p:strVal val="visible"/>
+                                      </p:to>
+                                    </p:set>
+                                  </p:childTnLst>
+                                </p:cTn>
+                              </p:par>
+                            </p:childTnLst>
+                          </p:cTn>
+                        </p:par>
+                      </p:childTnLst>
+                    </p:cTn>
+                  </p:par>
+                  <p:par>
+                    <p:cTn id="11" fill="hold">
+                      <p:stCondLst>
+                        <p:cond delay="indefinite"/>
+                      </p:stCondLst>
+                      <p:childTnLst>
+                        <p:par>
+                          <p:cTn id="12" fill="hold">
+                            <p:stCondLst>
+                              <p:cond delay="0"/>
+                            </p:stCondLst>
+                            <p:childTnLst>
+                              <p:par>
+                                <p:cTn id="13" presetID="1" presetClass="entr" presetSubtype="0" fill="hold" grpId="0" nodeType="clickEffect">
+                                  <p:stCondLst>
+                                    <p:cond delay="0"/>
+                                  </p:stCondLst>
+                                  <p:childTnLst>
+                                    <p:set>
+                                      <p:cBhvr>
+                                        <p:cTn id="14" dur="1" fill="hold">
+                                          <p:stCondLst>
+                                            <p:cond delay="0"/>
+                                          </p:stCondLst>
+                                        </p:cTn>
+                                        <p:tgtEl>
+                                          <p:spTgt spid="8"/>
+                                        </p:tgtEl>
+                                        <p:attrNameLst>
+                                          <p:attrName>style.visibility</p:attrName>
+                                        </p:attrNameLst>
+                                      </p:cBhvr>
+                                      <p:to>
+                                        <p:strVal val="visible"/>
+                                      </p:to>
+                                    </p:set>
+                                  </p:childTnLst>
+                                </p:cTn>
+                              </p:par>
+                            </p:childTnLst>
+                          </p:cTn>
+                        </p:par>
+                      </p:childTnLst>
+                    </p:cTn>
+                  </p:par>
+                  <p:par>
+                    <p:cTn id="15" fill="hold">
+                      <p:stCondLst>
+                        <p:cond delay="indefinite"/>
+                      </p:stCondLst>
+                      <p:childTnLst>
+                        <p:par>
+                          <p:cTn id="16" fill="hold">
+                            <p:stCondLst>
+                              <p:cond delay="0"/>
+                            </p:stCondLst>
+                            <p:childTnLst>
+                              <p:par>
+                                <p:cTn id="17" presetID="1" presetClass="entr" presetSubtype="0" fill="hold" nodeType="clickEffect">
+                                  <p:stCondLst>
+                                    <p:cond delay="0"/>
+                                  </p:stCondLst>
+                                  <p:childTnLst>
+                                    <p:set>
+                                      <p:cBhvr>
+                                        <p:cTn id="18" dur="1" fill="hold">
+                                          <p:stCondLst>
+                                            <p:cond delay="0"/>
+                                          </p:stCondLst>
+                                        </p:cTn>
+                                        <p:tgtEl>
+                                          <p:spTgt spid="7">
+                                            <p:txEl>
+                                              <p:pRg st="0" end="0"/>
+                                            </p:txEl>
+                                          </p:spTgt>
+                                        </p:tgtEl>
+                                        <p:attrNameLst>
+                                          <p:attrName>style.visibility</p:attrName>
+                                        </p:attrNameLst>
+                                      </p:cBhvr>
+                                      <p:to>
+                                        <p:strVal val="visible"/>
+                                      </p:to>
+                                    </p:set>
+                                  </p:childTnLst>
+                                </p:cTn>
+                              </p:par>
+                            </p:childTnLst>
+                          </p:cTn>
+                        </p:par>
+                      </p:childTnLst>
+                    </p:cTn>
+                  </p:par>
+                  <p:par>
+                    <p:cTn id="19" fill="hold">
+                      <p:stCondLst>
+                        <p:cond delay="indefinite"/>
+                      </p:stCondLst>
+                      <p:childTnLst>
+                        <p:par>
+                          <p:cTn id="20" fill="hold">
+                            <p:stCondLst>
+                              <p:cond delay="0"/>
+                            </p:stCondLst>
+                            <p:childTnLst>
+                              <p:par>
+                                <p:cTn id="21" presetID="1" presetClass="entr" presetSubtype="0" fill="hold" nodeType="clickEffect">
+                                  <p:stCondLst>
+                                    <p:cond delay="0"/>
+                                  </p:stCondLst>
+                                  <p:childTnLst>
+                                    <p:set>
+                                      <p:cBhvr>
+                                        <p:cTn id="22" dur="1" fill="hold">
+                                          <p:stCondLst>
+                                            <p:cond delay="0"/>
+                                          </p:stCondLst>
+                                        </p:cTn>
+                                        <p:tgtEl>
+                                          <p:spTgt spid="7">
+                                            <p:txEl>
+                                              <p:pRg st="1" end="1"/>
+                                            </p:txEl>
+                                          </p:spTgt>
+                                        </p:tgtEl>
+                                        <p:attrNameLst>
+                                          <p:attrName>style.visibility</p:attrName>
+                                        </p:attrNameLst>
+                                      </p:cBhvr>
+                                      <p:to>
+                                        <p:strVal val="visible"/>
+                                      </p:to>
+                                    </p:set>
+                                  </p:childTnLst>
+                                </p:cTn>
+                              </p:par>
+                            </p:childTnLst>
+                          </p:cTn>
+                        </p:par>
+                      </p:childTnLst>
+                    </p:cTn>
+                  </p:par>
+                  <p:par>
+                    <p:cTn id="23" fill="hold">
+                      <p:stCondLst>
+                        <p:cond delay="indefinite"/>
+                      </p:stCondLst>
+                      <p:childTnLst>
+                        <p:par>
+                          <p:cTn id="24" fill="hold">
+                            <p:stCondLst>
+                              <p:cond delay="0"/>
+                            </p:stCondLst>
+                            <p:childTnLst>
+                              <p:par>
+                                <p:cTn id="25" presetID="1" presetClass="entr" presetSubtype="0" fill="hold" nodeType="clickEffect">
+                                  <p:stCondLst>
+                                    <p:cond delay="0"/>
+                                  </p:stCondLst>
+                                  <p:childTnLst>
+                                    <p:set>
+                                      <p:cBhvr>
+                                        <p:cTn id="26" dur="1" fill="hold">
+                                          <p:stCondLst>
+                                            <p:cond delay="0"/>
+                                          </p:stCondLst>
+                                        </p:cTn>
+                                        <p:tgtEl>
+                                          <p:spTgt spid="7">
+                                            <p:txEl>
+                                              <p:pRg st="2" end="2"/>
+                                            </p:txEl>
+                                          </p:spTgt>
+                                        </p:tgtEl>
+                                        <p:attrNameLst>
+                                          <p:attrName>style.visibility</p:attrName>
+                                        </p:attrNameLst>
+                                      </p:cBhvr>
+                                      <p:to>
+                                        <p:strVal val="visible"/>
+                                      </p:to>
+                                    </p:set>
+                                  </p:childTnLst>
+                                </p:cTn>
+                              </p:par>
+                            </p:childTnLst>
+                          </p:cTn>
+                        </p:par>
+                      </p:childTnLst>
+                    </p:cTn>
+                  </p:par>
+                </p:childTnLst>
+              </p:cTn>
+              <p:prevCondLst>
+                <p:cond evt="onPrev" delay="0">
+                  <p:tgtEl>
+                    <p:sldTgt/>
+                  </p:tgtEl>
+                </p:cond>
+              </p:prevCondLst>
+              <p:nextCondLst>
+                <p:cond evt="onNext" delay="0">
+                  <p:tgtEl>
+                    <p:sldTgt/>
+                  </p:tgtEl>
+                </p:cond>
+              </p:nextCondLst>
+            </p:seq>
+          </p:childTnLst>
+        </p:cTn>
+      </p:par>
+    </p:tnLst>
+    <p:bldLst>
+      <p:bldP spid="5" grpId="0"/>
+      <p:bldP spid="6" grpId="0"/>
+      <p:bldP spid="8" grpId="0"/>
+    </p:bldLst>
+  </p:timing>
 </p:sld>
 </file>
 
@@ -9050,6 +9628,575 @@
   <p:clrMapOvr>
     <a:masterClrMapping/>
   </p:clrMapOvr>
+  <p:timing>
+    <p:tnLst>
+      <p:par>
+        <p:cTn id="1" dur="indefinite" restart="never" nodeType="tmRoot">
+          <p:childTnLst>
+            <p:seq concurrent="1" nextAc="seek">
+              <p:cTn id="2" dur="indefinite" nodeType="mainSeq">
+                <p:childTnLst>
+                  <p:par>
+                    <p:cTn id="3" fill="hold">
+                      <p:stCondLst>
+                        <p:cond delay="indefinite"/>
+                      </p:stCondLst>
+                      <p:childTnLst>
+                        <p:par>
+                          <p:cTn id="4" fill="hold">
+                            <p:stCondLst>
+                              <p:cond delay="0"/>
+                            </p:stCondLst>
+                            <p:childTnLst>
+                              <p:par>
+                                <p:cTn id="5" presetID="1" presetClass="entr" presetSubtype="0" fill="hold" nodeType="clickEffect">
+                                  <p:stCondLst>
+                                    <p:cond delay="0"/>
+                                  </p:stCondLst>
+                                  <p:childTnLst>
+                                    <p:set>
+                                      <p:cBhvr>
+                                        <p:cTn id="6" dur="1" fill="hold">
+                                          <p:stCondLst>
+                                            <p:cond delay="0"/>
+                                          </p:stCondLst>
+                                        </p:cTn>
+                                        <p:tgtEl>
+                                          <p:spTgt spid="5">
+                                            <p:txEl>
+                                              <p:pRg st="0" end="0"/>
+                                            </p:txEl>
+                                          </p:spTgt>
+                                        </p:tgtEl>
+                                        <p:attrNameLst>
+                                          <p:attrName>style.visibility</p:attrName>
+                                        </p:attrNameLst>
+                                      </p:cBhvr>
+                                      <p:to>
+                                        <p:strVal val="visible"/>
+                                      </p:to>
+                                    </p:set>
+                                  </p:childTnLst>
+                                </p:cTn>
+                              </p:par>
+                            </p:childTnLst>
+                          </p:cTn>
+                        </p:par>
+                      </p:childTnLst>
+                    </p:cTn>
+                  </p:par>
+                  <p:par>
+                    <p:cTn id="7" fill="hold">
+                      <p:stCondLst>
+                        <p:cond delay="indefinite"/>
+                      </p:stCondLst>
+                      <p:childTnLst>
+                        <p:par>
+                          <p:cTn id="8" fill="hold">
+                            <p:stCondLst>
+                              <p:cond delay="0"/>
+                            </p:stCondLst>
+                            <p:childTnLst>
+                              <p:par>
+                                <p:cTn id="9" presetID="1" presetClass="entr" presetSubtype="0" fill="hold" nodeType="clickEffect">
+                                  <p:stCondLst>
+                                    <p:cond delay="0"/>
+                                  </p:stCondLst>
+                                  <p:childTnLst>
+                                    <p:set>
+                                      <p:cBhvr>
+                                        <p:cTn id="10" dur="1" fill="hold">
+                                          <p:stCondLst>
+                                            <p:cond delay="0"/>
+                                          </p:stCondLst>
+                                        </p:cTn>
+                                        <p:tgtEl>
+                                          <p:spTgt spid="5">
+                                            <p:txEl>
+                                              <p:pRg st="1" end="1"/>
+                                            </p:txEl>
+                                          </p:spTgt>
+                                        </p:tgtEl>
+                                        <p:attrNameLst>
+                                          <p:attrName>style.visibility</p:attrName>
+                                        </p:attrNameLst>
+                                      </p:cBhvr>
+                                      <p:to>
+                                        <p:strVal val="visible"/>
+                                      </p:to>
+                                    </p:set>
+                                  </p:childTnLst>
+                                </p:cTn>
+                              </p:par>
+                            </p:childTnLst>
+                          </p:cTn>
+                        </p:par>
+                      </p:childTnLst>
+                    </p:cTn>
+                  </p:par>
+                  <p:par>
+                    <p:cTn id="11" fill="hold">
+                      <p:stCondLst>
+                        <p:cond delay="indefinite"/>
+                      </p:stCondLst>
+                      <p:childTnLst>
+                        <p:par>
+                          <p:cTn id="12" fill="hold">
+                            <p:stCondLst>
+                              <p:cond delay="0"/>
+                            </p:stCondLst>
+                            <p:childTnLst>
+                              <p:par>
+                                <p:cTn id="13" presetID="1" presetClass="entr" presetSubtype="0" fill="hold" nodeType="clickEffect">
+                                  <p:stCondLst>
+                                    <p:cond delay="0"/>
+                                  </p:stCondLst>
+                                  <p:childTnLst>
+                                    <p:set>
+                                      <p:cBhvr>
+                                        <p:cTn id="14" dur="1" fill="hold">
+                                          <p:stCondLst>
+                                            <p:cond delay="0"/>
+                                          </p:stCondLst>
+                                        </p:cTn>
+                                        <p:tgtEl>
+                                          <p:spTgt spid="5">
+                                            <p:txEl>
+                                              <p:pRg st="2" end="2"/>
+                                            </p:txEl>
+                                          </p:spTgt>
+                                        </p:tgtEl>
+                                        <p:attrNameLst>
+                                          <p:attrName>style.visibility</p:attrName>
+                                        </p:attrNameLst>
+                                      </p:cBhvr>
+                                      <p:to>
+                                        <p:strVal val="visible"/>
+                                      </p:to>
+                                    </p:set>
+                                  </p:childTnLst>
+                                </p:cTn>
+                              </p:par>
+                            </p:childTnLst>
+                          </p:cTn>
+                        </p:par>
+                      </p:childTnLst>
+                    </p:cTn>
+                  </p:par>
+                  <p:par>
+                    <p:cTn id="15" fill="hold">
+                      <p:stCondLst>
+                        <p:cond delay="indefinite"/>
+                      </p:stCondLst>
+                      <p:childTnLst>
+                        <p:par>
+                          <p:cTn id="16" fill="hold">
+                            <p:stCondLst>
+                              <p:cond delay="0"/>
+                            </p:stCondLst>
+                            <p:childTnLst>
+                              <p:par>
+                                <p:cTn id="17" presetID="1" presetClass="entr" presetSubtype="0" fill="hold" nodeType="clickEffect">
+                                  <p:stCondLst>
+                                    <p:cond delay="0"/>
+                                  </p:stCondLst>
+                                  <p:childTnLst>
+                                    <p:set>
+                                      <p:cBhvr>
+                                        <p:cTn id="18" dur="1" fill="hold">
+                                          <p:stCondLst>
+                                            <p:cond delay="0"/>
+                                          </p:stCondLst>
+                                        </p:cTn>
+                                        <p:tgtEl>
+                                          <p:spTgt spid="5">
+                                            <p:txEl>
+                                              <p:pRg st="3" end="3"/>
+                                            </p:txEl>
+                                          </p:spTgt>
+                                        </p:tgtEl>
+                                        <p:attrNameLst>
+                                          <p:attrName>style.visibility</p:attrName>
+                                        </p:attrNameLst>
+                                      </p:cBhvr>
+                                      <p:to>
+                                        <p:strVal val="visible"/>
+                                      </p:to>
+                                    </p:set>
+                                  </p:childTnLst>
+                                </p:cTn>
+                              </p:par>
+                            </p:childTnLst>
+                          </p:cTn>
+                        </p:par>
+                      </p:childTnLst>
+                    </p:cTn>
+                  </p:par>
+                  <p:par>
+                    <p:cTn id="19" fill="hold">
+                      <p:stCondLst>
+                        <p:cond delay="indefinite"/>
+                      </p:stCondLst>
+                      <p:childTnLst>
+                        <p:par>
+                          <p:cTn id="20" fill="hold">
+                            <p:stCondLst>
+                              <p:cond delay="0"/>
+                            </p:stCondLst>
+                            <p:childTnLst>
+                              <p:par>
+                                <p:cTn id="21" presetID="1" presetClass="entr" presetSubtype="0" fill="hold" nodeType="clickEffect">
+                                  <p:stCondLst>
+                                    <p:cond delay="0"/>
+                                  </p:stCondLst>
+                                  <p:childTnLst>
+                                    <p:set>
+                                      <p:cBhvr>
+                                        <p:cTn id="22" dur="1" fill="hold">
+                                          <p:stCondLst>
+                                            <p:cond delay="0"/>
+                                          </p:stCondLst>
+                                        </p:cTn>
+                                        <p:tgtEl>
+                                          <p:spTgt spid="5">
+                                            <p:txEl>
+                                              <p:pRg st="4" end="4"/>
+                                            </p:txEl>
+                                          </p:spTgt>
+                                        </p:tgtEl>
+                                        <p:attrNameLst>
+                                          <p:attrName>style.visibility</p:attrName>
+                                        </p:attrNameLst>
+                                      </p:cBhvr>
+                                      <p:to>
+                                        <p:strVal val="visible"/>
+                                      </p:to>
+                                    </p:set>
+                                  </p:childTnLst>
+                                </p:cTn>
+                              </p:par>
+                            </p:childTnLst>
+                          </p:cTn>
+                        </p:par>
+                      </p:childTnLst>
+                    </p:cTn>
+                  </p:par>
+                  <p:par>
+                    <p:cTn id="23" fill="hold">
+                      <p:stCondLst>
+                        <p:cond delay="indefinite"/>
+                      </p:stCondLst>
+                      <p:childTnLst>
+                        <p:par>
+                          <p:cTn id="24" fill="hold">
+                            <p:stCondLst>
+                              <p:cond delay="0"/>
+                            </p:stCondLst>
+                            <p:childTnLst>
+                              <p:par>
+                                <p:cTn id="25" presetID="1" presetClass="entr" presetSubtype="0" fill="hold" nodeType="clickEffect">
+                                  <p:stCondLst>
+                                    <p:cond delay="0"/>
+                                  </p:stCondLst>
+                                  <p:childTnLst>
+                                    <p:set>
+                                      <p:cBhvr>
+                                        <p:cTn id="26" dur="1" fill="hold">
+                                          <p:stCondLst>
+                                            <p:cond delay="0"/>
+                                          </p:stCondLst>
+                                        </p:cTn>
+                                        <p:tgtEl>
+                                          <p:spTgt spid="5">
+                                            <p:txEl>
+                                              <p:pRg st="5" end="5"/>
+                                            </p:txEl>
+                                          </p:spTgt>
+                                        </p:tgtEl>
+                                        <p:attrNameLst>
+                                          <p:attrName>style.visibility</p:attrName>
+                                        </p:attrNameLst>
+                                      </p:cBhvr>
+                                      <p:to>
+                                        <p:strVal val="visible"/>
+                                      </p:to>
+                                    </p:set>
+                                  </p:childTnLst>
+                                </p:cTn>
+                              </p:par>
+                            </p:childTnLst>
+                          </p:cTn>
+                        </p:par>
+                      </p:childTnLst>
+                    </p:cTn>
+                  </p:par>
+                  <p:par>
+                    <p:cTn id="27" fill="hold">
+                      <p:stCondLst>
+                        <p:cond delay="indefinite"/>
+                      </p:stCondLst>
+                      <p:childTnLst>
+                        <p:par>
+                          <p:cTn id="28" fill="hold">
+                            <p:stCondLst>
+                              <p:cond delay="0"/>
+                            </p:stCondLst>
+                            <p:childTnLst>
+                              <p:par>
+                                <p:cTn id="29" presetID="1" presetClass="entr" presetSubtype="0" fill="hold" nodeType="clickEffect">
+                                  <p:stCondLst>
+                                    <p:cond delay="0"/>
+                                  </p:stCondLst>
+                                  <p:childTnLst>
+                                    <p:set>
+                                      <p:cBhvr>
+                                        <p:cTn id="30" dur="1" fill="hold">
+                                          <p:stCondLst>
+                                            <p:cond delay="0"/>
+                                          </p:stCondLst>
+                                        </p:cTn>
+                                        <p:tgtEl>
+                                          <p:spTgt spid="5">
+                                            <p:txEl>
+                                              <p:pRg st="6" end="6"/>
+                                            </p:txEl>
+                                          </p:spTgt>
+                                        </p:tgtEl>
+                                        <p:attrNameLst>
+                                          <p:attrName>style.visibility</p:attrName>
+                                        </p:attrNameLst>
+                                      </p:cBhvr>
+                                      <p:to>
+                                        <p:strVal val="visible"/>
+                                      </p:to>
+                                    </p:set>
+                                  </p:childTnLst>
+                                </p:cTn>
+                              </p:par>
+                            </p:childTnLst>
+                          </p:cTn>
+                        </p:par>
+                      </p:childTnLst>
+                    </p:cTn>
+                  </p:par>
+                  <p:par>
+                    <p:cTn id="31" fill="hold">
+                      <p:stCondLst>
+                        <p:cond delay="indefinite"/>
+                      </p:stCondLst>
+                      <p:childTnLst>
+                        <p:par>
+                          <p:cTn id="32" fill="hold">
+                            <p:stCondLst>
+                              <p:cond delay="0"/>
+                            </p:stCondLst>
+                            <p:childTnLst>
+                              <p:par>
+                                <p:cTn id="33" presetID="1" presetClass="entr" presetSubtype="0" fill="hold" nodeType="clickEffect">
+                                  <p:stCondLst>
+                                    <p:cond delay="0"/>
+                                  </p:stCondLst>
+                                  <p:childTnLst>
+                                    <p:set>
+                                      <p:cBhvr>
+                                        <p:cTn id="34" dur="1" fill="hold">
+                                          <p:stCondLst>
+                                            <p:cond delay="0"/>
+                                          </p:stCondLst>
+                                        </p:cTn>
+                                        <p:tgtEl>
+                                          <p:spTgt spid="5">
+                                            <p:txEl>
+                                              <p:pRg st="7" end="7"/>
+                                            </p:txEl>
+                                          </p:spTgt>
+                                        </p:tgtEl>
+                                        <p:attrNameLst>
+                                          <p:attrName>style.visibility</p:attrName>
+                                        </p:attrNameLst>
+                                      </p:cBhvr>
+                                      <p:to>
+                                        <p:strVal val="visible"/>
+                                      </p:to>
+                                    </p:set>
+                                  </p:childTnLst>
+                                </p:cTn>
+                              </p:par>
+                            </p:childTnLst>
+                          </p:cTn>
+                        </p:par>
+                      </p:childTnLst>
+                    </p:cTn>
+                  </p:par>
+                  <p:par>
+                    <p:cTn id="35" fill="hold">
+                      <p:stCondLst>
+                        <p:cond delay="indefinite"/>
+                      </p:stCondLst>
+                      <p:childTnLst>
+                        <p:par>
+                          <p:cTn id="36" fill="hold">
+                            <p:stCondLst>
+                              <p:cond delay="0"/>
+                            </p:stCondLst>
+                            <p:childTnLst>
+                              <p:par>
+                                <p:cTn id="37" presetID="1" presetClass="entr" presetSubtype="0" fill="hold" nodeType="clickEffect">
+                                  <p:stCondLst>
+                                    <p:cond delay="0"/>
+                                  </p:stCondLst>
+                                  <p:childTnLst>
+                                    <p:set>
+                                      <p:cBhvr>
+                                        <p:cTn id="38" dur="1" fill="hold">
+                                          <p:stCondLst>
+                                            <p:cond delay="0"/>
+                                          </p:stCondLst>
+                                        </p:cTn>
+                                        <p:tgtEl>
+                                          <p:spTgt spid="5">
+                                            <p:txEl>
+                                              <p:pRg st="8" end="8"/>
+                                            </p:txEl>
+                                          </p:spTgt>
+                                        </p:tgtEl>
+                                        <p:attrNameLst>
+                                          <p:attrName>style.visibility</p:attrName>
+                                        </p:attrNameLst>
+                                      </p:cBhvr>
+                                      <p:to>
+                                        <p:strVal val="visible"/>
+                                      </p:to>
+                                    </p:set>
+                                  </p:childTnLst>
+                                </p:cTn>
+                              </p:par>
+                            </p:childTnLst>
+                          </p:cTn>
+                        </p:par>
+                      </p:childTnLst>
+                    </p:cTn>
+                  </p:par>
+                  <p:par>
+                    <p:cTn id="39" fill="hold">
+                      <p:stCondLst>
+                        <p:cond delay="indefinite"/>
+                      </p:stCondLst>
+                      <p:childTnLst>
+                        <p:par>
+                          <p:cTn id="40" fill="hold">
+                            <p:stCondLst>
+                              <p:cond delay="0"/>
+                            </p:stCondLst>
+                            <p:childTnLst>
+                              <p:par>
+                                <p:cTn id="41" presetID="1" presetClass="entr" presetSubtype="0" fill="hold" nodeType="clickEffect">
+                                  <p:stCondLst>
+                                    <p:cond delay="0"/>
+                                  </p:stCondLst>
+                                  <p:childTnLst>
+                                    <p:set>
+                                      <p:cBhvr>
+                                        <p:cTn id="42" dur="1" fill="hold">
+                                          <p:stCondLst>
+                                            <p:cond delay="0"/>
+                                          </p:stCondLst>
+                                        </p:cTn>
+                                        <p:tgtEl>
+                                          <p:spTgt spid="5">
+                                            <p:txEl>
+                                              <p:pRg st="9" end="9"/>
+                                            </p:txEl>
+                                          </p:spTgt>
+                                        </p:tgtEl>
+                                        <p:attrNameLst>
+                                          <p:attrName>style.visibility</p:attrName>
+                                        </p:attrNameLst>
+                                      </p:cBhvr>
+                                      <p:to>
+                                        <p:strVal val="visible"/>
+                                      </p:to>
+                                    </p:set>
+                                  </p:childTnLst>
+                                </p:cTn>
+                              </p:par>
+                            </p:childTnLst>
+                          </p:cTn>
+                        </p:par>
+                      </p:childTnLst>
+                    </p:cTn>
+                  </p:par>
+                  <p:par>
+                    <p:cTn id="43" fill="hold">
+                      <p:stCondLst>
+                        <p:cond delay="indefinite"/>
+                      </p:stCondLst>
+                      <p:childTnLst>
+                        <p:par>
+                          <p:cTn id="44" fill="hold">
+                            <p:stCondLst>
+                              <p:cond delay="0"/>
+                            </p:stCondLst>
+                            <p:childTnLst>
+                              <p:par>
+                                <p:cTn id="45" presetID="1" presetClass="entr" presetSubtype="0" fill="hold" nodeType="clickEffect">
+                                  <p:stCondLst>
+                                    <p:cond delay="0"/>
+                                  </p:stCondLst>
+                                  <p:childTnLst>
+                                    <p:set>
+                                      <p:cBhvr>
+                                        <p:cTn id="46" dur="1" fill="hold">
+                                          <p:stCondLst>
+                                            <p:cond delay="0"/>
+                                          </p:stCondLst>
+                                        </p:cTn>
+                                        <p:tgtEl>
+                                          <p:spTgt spid="5">
+                                            <p:txEl>
+                                              <p:pRg st="10" end="10"/>
+                                            </p:txEl>
+                                          </p:spTgt>
+                                        </p:tgtEl>
+                                        <p:attrNameLst>
+                                          <p:attrName>style.visibility</p:attrName>
+                                        </p:attrNameLst>
+                                      </p:cBhvr>
+                                      <p:to>
+                                        <p:strVal val="visible"/>
+                                      </p:to>
+                                    </p:set>
+                                  </p:childTnLst>
+                                </p:cTn>
+                              </p:par>
+                            </p:childTnLst>
+                          </p:cTn>
+                        </p:par>
+                      </p:childTnLst>
+                    </p:cTn>
+                  </p:par>
+                </p:childTnLst>
+              </p:cTn>
+              <p:prevCondLst>
+                <p:cond evt="onPrev" delay="0">
+                  <p:tgtEl>
+                    <p:sldTgt/>
+                  </p:tgtEl>
+                </p:cond>
+              </p:prevCondLst>
+              <p:nextCondLst>
+                <p:cond evt="onNext" delay="0">
+                  <p:tgtEl>
+                    <p:sldTgt/>
+                  </p:tgtEl>
+                </p:cond>
+              </p:nextCondLst>
+            </p:seq>
+          </p:childTnLst>
+        </p:cTn>
+      </p:par>
+    </p:tnLst>
+  </p:timing>
 </p:sld>
 </file>
 
@@ -9251,11 +10398,7 @@
             </a:pPr>
             <a:r>
               <a:rPr lang="en-US" dirty="0" smtClean="0"/>
-              <a:t>Large </a:t>
-            </a:r>
-            <a:r>
-              <a:rPr lang="en-US" dirty="0" smtClean="0"/>
-              <a:t>community</a:t>
+              <a:t>Large community</a:t>
             </a:r>
           </a:p>
           <a:p>
@@ -9306,6 +10449,575 @@
   <p:clrMapOvr>
     <a:masterClrMapping/>
   </p:clrMapOvr>
+  <p:timing>
+    <p:tnLst>
+      <p:par>
+        <p:cTn id="1" dur="indefinite" restart="never" nodeType="tmRoot">
+          <p:childTnLst>
+            <p:seq concurrent="1" nextAc="seek">
+              <p:cTn id="2" dur="indefinite" nodeType="mainSeq">
+                <p:childTnLst>
+                  <p:par>
+                    <p:cTn id="3" fill="hold">
+                      <p:stCondLst>
+                        <p:cond delay="indefinite"/>
+                      </p:stCondLst>
+                      <p:childTnLst>
+                        <p:par>
+                          <p:cTn id="4" fill="hold">
+                            <p:stCondLst>
+                              <p:cond delay="0"/>
+                            </p:stCondLst>
+                            <p:childTnLst>
+                              <p:par>
+                                <p:cTn id="5" presetID="1" presetClass="entr" presetSubtype="0" fill="hold" nodeType="clickEffect">
+                                  <p:stCondLst>
+                                    <p:cond delay="0"/>
+                                  </p:stCondLst>
+                                  <p:childTnLst>
+                                    <p:set>
+                                      <p:cBhvr>
+                                        <p:cTn id="6" dur="1" fill="hold">
+                                          <p:stCondLst>
+                                            <p:cond delay="0"/>
+                                          </p:stCondLst>
+                                        </p:cTn>
+                                        <p:tgtEl>
+                                          <p:spTgt spid="5">
+                                            <p:txEl>
+                                              <p:pRg st="0" end="0"/>
+                                            </p:txEl>
+                                          </p:spTgt>
+                                        </p:tgtEl>
+                                        <p:attrNameLst>
+                                          <p:attrName>style.visibility</p:attrName>
+                                        </p:attrNameLst>
+                                      </p:cBhvr>
+                                      <p:to>
+                                        <p:strVal val="visible"/>
+                                      </p:to>
+                                    </p:set>
+                                  </p:childTnLst>
+                                </p:cTn>
+                              </p:par>
+                            </p:childTnLst>
+                          </p:cTn>
+                        </p:par>
+                      </p:childTnLst>
+                    </p:cTn>
+                  </p:par>
+                  <p:par>
+                    <p:cTn id="7" fill="hold">
+                      <p:stCondLst>
+                        <p:cond delay="indefinite"/>
+                      </p:stCondLst>
+                      <p:childTnLst>
+                        <p:par>
+                          <p:cTn id="8" fill="hold">
+                            <p:stCondLst>
+                              <p:cond delay="0"/>
+                            </p:stCondLst>
+                            <p:childTnLst>
+                              <p:par>
+                                <p:cTn id="9" presetID="1" presetClass="entr" presetSubtype="0" fill="hold" nodeType="clickEffect">
+                                  <p:stCondLst>
+                                    <p:cond delay="0"/>
+                                  </p:stCondLst>
+                                  <p:childTnLst>
+                                    <p:set>
+                                      <p:cBhvr>
+                                        <p:cTn id="10" dur="1" fill="hold">
+                                          <p:stCondLst>
+                                            <p:cond delay="0"/>
+                                          </p:stCondLst>
+                                        </p:cTn>
+                                        <p:tgtEl>
+                                          <p:spTgt spid="5">
+                                            <p:txEl>
+                                              <p:pRg st="1" end="1"/>
+                                            </p:txEl>
+                                          </p:spTgt>
+                                        </p:tgtEl>
+                                        <p:attrNameLst>
+                                          <p:attrName>style.visibility</p:attrName>
+                                        </p:attrNameLst>
+                                      </p:cBhvr>
+                                      <p:to>
+                                        <p:strVal val="visible"/>
+                                      </p:to>
+                                    </p:set>
+                                  </p:childTnLst>
+                                </p:cTn>
+                              </p:par>
+                            </p:childTnLst>
+                          </p:cTn>
+                        </p:par>
+                      </p:childTnLst>
+                    </p:cTn>
+                  </p:par>
+                  <p:par>
+                    <p:cTn id="11" fill="hold">
+                      <p:stCondLst>
+                        <p:cond delay="indefinite"/>
+                      </p:stCondLst>
+                      <p:childTnLst>
+                        <p:par>
+                          <p:cTn id="12" fill="hold">
+                            <p:stCondLst>
+                              <p:cond delay="0"/>
+                            </p:stCondLst>
+                            <p:childTnLst>
+                              <p:par>
+                                <p:cTn id="13" presetID="1" presetClass="entr" presetSubtype="0" fill="hold" nodeType="clickEffect">
+                                  <p:stCondLst>
+                                    <p:cond delay="0"/>
+                                  </p:stCondLst>
+                                  <p:childTnLst>
+                                    <p:set>
+                                      <p:cBhvr>
+                                        <p:cTn id="14" dur="1" fill="hold">
+                                          <p:stCondLst>
+                                            <p:cond delay="0"/>
+                                          </p:stCondLst>
+                                        </p:cTn>
+                                        <p:tgtEl>
+                                          <p:spTgt spid="5">
+                                            <p:txEl>
+                                              <p:pRg st="2" end="2"/>
+                                            </p:txEl>
+                                          </p:spTgt>
+                                        </p:tgtEl>
+                                        <p:attrNameLst>
+                                          <p:attrName>style.visibility</p:attrName>
+                                        </p:attrNameLst>
+                                      </p:cBhvr>
+                                      <p:to>
+                                        <p:strVal val="visible"/>
+                                      </p:to>
+                                    </p:set>
+                                  </p:childTnLst>
+                                </p:cTn>
+                              </p:par>
+                            </p:childTnLst>
+                          </p:cTn>
+                        </p:par>
+                      </p:childTnLst>
+                    </p:cTn>
+                  </p:par>
+                  <p:par>
+                    <p:cTn id="15" fill="hold">
+                      <p:stCondLst>
+                        <p:cond delay="indefinite"/>
+                      </p:stCondLst>
+                      <p:childTnLst>
+                        <p:par>
+                          <p:cTn id="16" fill="hold">
+                            <p:stCondLst>
+                              <p:cond delay="0"/>
+                            </p:stCondLst>
+                            <p:childTnLst>
+                              <p:par>
+                                <p:cTn id="17" presetID="1" presetClass="entr" presetSubtype="0" fill="hold" nodeType="clickEffect">
+                                  <p:stCondLst>
+                                    <p:cond delay="0"/>
+                                  </p:stCondLst>
+                                  <p:childTnLst>
+                                    <p:set>
+                                      <p:cBhvr>
+                                        <p:cTn id="18" dur="1" fill="hold">
+                                          <p:stCondLst>
+                                            <p:cond delay="0"/>
+                                          </p:stCondLst>
+                                        </p:cTn>
+                                        <p:tgtEl>
+                                          <p:spTgt spid="5">
+                                            <p:txEl>
+                                              <p:pRg st="3" end="3"/>
+                                            </p:txEl>
+                                          </p:spTgt>
+                                        </p:tgtEl>
+                                        <p:attrNameLst>
+                                          <p:attrName>style.visibility</p:attrName>
+                                        </p:attrNameLst>
+                                      </p:cBhvr>
+                                      <p:to>
+                                        <p:strVal val="visible"/>
+                                      </p:to>
+                                    </p:set>
+                                  </p:childTnLst>
+                                </p:cTn>
+                              </p:par>
+                            </p:childTnLst>
+                          </p:cTn>
+                        </p:par>
+                      </p:childTnLst>
+                    </p:cTn>
+                  </p:par>
+                  <p:par>
+                    <p:cTn id="19" fill="hold">
+                      <p:stCondLst>
+                        <p:cond delay="indefinite"/>
+                      </p:stCondLst>
+                      <p:childTnLst>
+                        <p:par>
+                          <p:cTn id="20" fill="hold">
+                            <p:stCondLst>
+                              <p:cond delay="0"/>
+                            </p:stCondLst>
+                            <p:childTnLst>
+                              <p:par>
+                                <p:cTn id="21" presetID="1" presetClass="entr" presetSubtype="0" fill="hold" nodeType="clickEffect">
+                                  <p:stCondLst>
+                                    <p:cond delay="0"/>
+                                  </p:stCondLst>
+                                  <p:childTnLst>
+                                    <p:set>
+                                      <p:cBhvr>
+                                        <p:cTn id="22" dur="1" fill="hold">
+                                          <p:stCondLst>
+                                            <p:cond delay="0"/>
+                                          </p:stCondLst>
+                                        </p:cTn>
+                                        <p:tgtEl>
+                                          <p:spTgt spid="5">
+                                            <p:txEl>
+                                              <p:pRg st="4" end="4"/>
+                                            </p:txEl>
+                                          </p:spTgt>
+                                        </p:tgtEl>
+                                        <p:attrNameLst>
+                                          <p:attrName>style.visibility</p:attrName>
+                                        </p:attrNameLst>
+                                      </p:cBhvr>
+                                      <p:to>
+                                        <p:strVal val="visible"/>
+                                      </p:to>
+                                    </p:set>
+                                  </p:childTnLst>
+                                </p:cTn>
+                              </p:par>
+                            </p:childTnLst>
+                          </p:cTn>
+                        </p:par>
+                      </p:childTnLst>
+                    </p:cTn>
+                  </p:par>
+                  <p:par>
+                    <p:cTn id="23" fill="hold">
+                      <p:stCondLst>
+                        <p:cond delay="indefinite"/>
+                      </p:stCondLst>
+                      <p:childTnLst>
+                        <p:par>
+                          <p:cTn id="24" fill="hold">
+                            <p:stCondLst>
+                              <p:cond delay="0"/>
+                            </p:stCondLst>
+                            <p:childTnLst>
+                              <p:par>
+                                <p:cTn id="25" presetID="1" presetClass="entr" presetSubtype="0" fill="hold" nodeType="clickEffect">
+                                  <p:stCondLst>
+                                    <p:cond delay="0"/>
+                                  </p:stCondLst>
+                                  <p:childTnLst>
+                                    <p:set>
+                                      <p:cBhvr>
+                                        <p:cTn id="26" dur="1" fill="hold">
+                                          <p:stCondLst>
+                                            <p:cond delay="0"/>
+                                          </p:stCondLst>
+                                        </p:cTn>
+                                        <p:tgtEl>
+                                          <p:spTgt spid="5">
+                                            <p:txEl>
+                                              <p:pRg st="5" end="5"/>
+                                            </p:txEl>
+                                          </p:spTgt>
+                                        </p:tgtEl>
+                                        <p:attrNameLst>
+                                          <p:attrName>style.visibility</p:attrName>
+                                        </p:attrNameLst>
+                                      </p:cBhvr>
+                                      <p:to>
+                                        <p:strVal val="visible"/>
+                                      </p:to>
+                                    </p:set>
+                                  </p:childTnLst>
+                                </p:cTn>
+                              </p:par>
+                            </p:childTnLst>
+                          </p:cTn>
+                        </p:par>
+                      </p:childTnLst>
+                    </p:cTn>
+                  </p:par>
+                  <p:par>
+                    <p:cTn id="27" fill="hold">
+                      <p:stCondLst>
+                        <p:cond delay="indefinite"/>
+                      </p:stCondLst>
+                      <p:childTnLst>
+                        <p:par>
+                          <p:cTn id="28" fill="hold">
+                            <p:stCondLst>
+                              <p:cond delay="0"/>
+                            </p:stCondLst>
+                            <p:childTnLst>
+                              <p:par>
+                                <p:cTn id="29" presetID="1" presetClass="entr" presetSubtype="0" fill="hold" nodeType="clickEffect">
+                                  <p:stCondLst>
+                                    <p:cond delay="0"/>
+                                  </p:stCondLst>
+                                  <p:childTnLst>
+                                    <p:set>
+                                      <p:cBhvr>
+                                        <p:cTn id="30" dur="1" fill="hold">
+                                          <p:stCondLst>
+                                            <p:cond delay="0"/>
+                                          </p:stCondLst>
+                                        </p:cTn>
+                                        <p:tgtEl>
+                                          <p:spTgt spid="5">
+                                            <p:txEl>
+                                              <p:pRg st="6" end="6"/>
+                                            </p:txEl>
+                                          </p:spTgt>
+                                        </p:tgtEl>
+                                        <p:attrNameLst>
+                                          <p:attrName>style.visibility</p:attrName>
+                                        </p:attrNameLst>
+                                      </p:cBhvr>
+                                      <p:to>
+                                        <p:strVal val="visible"/>
+                                      </p:to>
+                                    </p:set>
+                                  </p:childTnLst>
+                                </p:cTn>
+                              </p:par>
+                            </p:childTnLst>
+                          </p:cTn>
+                        </p:par>
+                      </p:childTnLst>
+                    </p:cTn>
+                  </p:par>
+                  <p:par>
+                    <p:cTn id="31" fill="hold">
+                      <p:stCondLst>
+                        <p:cond delay="indefinite"/>
+                      </p:stCondLst>
+                      <p:childTnLst>
+                        <p:par>
+                          <p:cTn id="32" fill="hold">
+                            <p:stCondLst>
+                              <p:cond delay="0"/>
+                            </p:stCondLst>
+                            <p:childTnLst>
+                              <p:par>
+                                <p:cTn id="33" presetID="1" presetClass="entr" presetSubtype="0" fill="hold" nodeType="clickEffect">
+                                  <p:stCondLst>
+                                    <p:cond delay="0"/>
+                                  </p:stCondLst>
+                                  <p:childTnLst>
+                                    <p:set>
+                                      <p:cBhvr>
+                                        <p:cTn id="34" dur="1" fill="hold">
+                                          <p:stCondLst>
+                                            <p:cond delay="0"/>
+                                          </p:stCondLst>
+                                        </p:cTn>
+                                        <p:tgtEl>
+                                          <p:spTgt spid="5">
+                                            <p:txEl>
+                                              <p:pRg st="7" end="7"/>
+                                            </p:txEl>
+                                          </p:spTgt>
+                                        </p:tgtEl>
+                                        <p:attrNameLst>
+                                          <p:attrName>style.visibility</p:attrName>
+                                        </p:attrNameLst>
+                                      </p:cBhvr>
+                                      <p:to>
+                                        <p:strVal val="visible"/>
+                                      </p:to>
+                                    </p:set>
+                                  </p:childTnLst>
+                                </p:cTn>
+                              </p:par>
+                            </p:childTnLst>
+                          </p:cTn>
+                        </p:par>
+                      </p:childTnLst>
+                    </p:cTn>
+                  </p:par>
+                  <p:par>
+                    <p:cTn id="35" fill="hold">
+                      <p:stCondLst>
+                        <p:cond delay="indefinite"/>
+                      </p:stCondLst>
+                      <p:childTnLst>
+                        <p:par>
+                          <p:cTn id="36" fill="hold">
+                            <p:stCondLst>
+                              <p:cond delay="0"/>
+                            </p:stCondLst>
+                            <p:childTnLst>
+                              <p:par>
+                                <p:cTn id="37" presetID="1" presetClass="entr" presetSubtype="0" fill="hold" nodeType="clickEffect">
+                                  <p:stCondLst>
+                                    <p:cond delay="0"/>
+                                  </p:stCondLst>
+                                  <p:childTnLst>
+                                    <p:set>
+                                      <p:cBhvr>
+                                        <p:cTn id="38" dur="1" fill="hold">
+                                          <p:stCondLst>
+                                            <p:cond delay="0"/>
+                                          </p:stCondLst>
+                                        </p:cTn>
+                                        <p:tgtEl>
+                                          <p:spTgt spid="5">
+                                            <p:txEl>
+                                              <p:pRg st="8" end="8"/>
+                                            </p:txEl>
+                                          </p:spTgt>
+                                        </p:tgtEl>
+                                        <p:attrNameLst>
+                                          <p:attrName>style.visibility</p:attrName>
+                                        </p:attrNameLst>
+                                      </p:cBhvr>
+                                      <p:to>
+                                        <p:strVal val="visible"/>
+                                      </p:to>
+                                    </p:set>
+                                  </p:childTnLst>
+                                </p:cTn>
+                              </p:par>
+                            </p:childTnLst>
+                          </p:cTn>
+                        </p:par>
+                      </p:childTnLst>
+                    </p:cTn>
+                  </p:par>
+                  <p:par>
+                    <p:cTn id="39" fill="hold">
+                      <p:stCondLst>
+                        <p:cond delay="indefinite"/>
+                      </p:stCondLst>
+                      <p:childTnLst>
+                        <p:par>
+                          <p:cTn id="40" fill="hold">
+                            <p:stCondLst>
+                              <p:cond delay="0"/>
+                            </p:stCondLst>
+                            <p:childTnLst>
+                              <p:par>
+                                <p:cTn id="41" presetID="1" presetClass="entr" presetSubtype="0" fill="hold" nodeType="clickEffect">
+                                  <p:stCondLst>
+                                    <p:cond delay="0"/>
+                                  </p:stCondLst>
+                                  <p:childTnLst>
+                                    <p:set>
+                                      <p:cBhvr>
+                                        <p:cTn id="42" dur="1" fill="hold">
+                                          <p:stCondLst>
+                                            <p:cond delay="0"/>
+                                          </p:stCondLst>
+                                        </p:cTn>
+                                        <p:tgtEl>
+                                          <p:spTgt spid="5">
+                                            <p:txEl>
+                                              <p:pRg st="9" end="9"/>
+                                            </p:txEl>
+                                          </p:spTgt>
+                                        </p:tgtEl>
+                                        <p:attrNameLst>
+                                          <p:attrName>style.visibility</p:attrName>
+                                        </p:attrNameLst>
+                                      </p:cBhvr>
+                                      <p:to>
+                                        <p:strVal val="visible"/>
+                                      </p:to>
+                                    </p:set>
+                                  </p:childTnLst>
+                                </p:cTn>
+                              </p:par>
+                            </p:childTnLst>
+                          </p:cTn>
+                        </p:par>
+                      </p:childTnLst>
+                    </p:cTn>
+                  </p:par>
+                  <p:par>
+                    <p:cTn id="43" fill="hold">
+                      <p:stCondLst>
+                        <p:cond delay="indefinite"/>
+                      </p:stCondLst>
+                      <p:childTnLst>
+                        <p:par>
+                          <p:cTn id="44" fill="hold">
+                            <p:stCondLst>
+                              <p:cond delay="0"/>
+                            </p:stCondLst>
+                            <p:childTnLst>
+                              <p:par>
+                                <p:cTn id="45" presetID="1" presetClass="entr" presetSubtype="0" fill="hold" nodeType="clickEffect">
+                                  <p:stCondLst>
+                                    <p:cond delay="0"/>
+                                  </p:stCondLst>
+                                  <p:childTnLst>
+                                    <p:set>
+                                      <p:cBhvr>
+                                        <p:cTn id="46" dur="1" fill="hold">
+                                          <p:stCondLst>
+                                            <p:cond delay="0"/>
+                                          </p:stCondLst>
+                                        </p:cTn>
+                                        <p:tgtEl>
+                                          <p:spTgt spid="5">
+                                            <p:txEl>
+                                              <p:pRg st="10" end="10"/>
+                                            </p:txEl>
+                                          </p:spTgt>
+                                        </p:tgtEl>
+                                        <p:attrNameLst>
+                                          <p:attrName>style.visibility</p:attrName>
+                                        </p:attrNameLst>
+                                      </p:cBhvr>
+                                      <p:to>
+                                        <p:strVal val="visible"/>
+                                      </p:to>
+                                    </p:set>
+                                  </p:childTnLst>
+                                </p:cTn>
+                              </p:par>
+                            </p:childTnLst>
+                          </p:cTn>
+                        </p:par>
+                      </p:childTnLst>
+                    </p:cTn>
+                  </p:par>
+                </p:childTnLst>
+              </p:cTn>
+              <p:prevCondLst>
+                <p:cond evt="onPrev" delay="0">
+                  <p:tgtEl>
+                    <p:sldTgt/>
+                  </p:tgtEl>
+                </p:cond>
+              </p:prevCondLst>
+              <p:nextCondLst>
+                <p:cond evt="onNext" delay="0">
+                  <p:tgtEl>
+                    <p:sldTgt/>
+                  </p:tgtEl>
+                </p:cond>
+              </p:nextCondLst>
+            </p:seq>
+          </p:childTnLst>
+        </p:cTn>
+      </p:par>
+    </p:tnLst>
+  </p:timing>
 </p:sld>
 </file>
 
@@ -9869,6 +11581,507 @@
   <p:clrMapOvr>
     <a:masterClrMapping/>
   </p:clrMapOvr>
+  <p:timing>
+    <p:tnLst>
+      <p:par>
+        <p:cTn id="1" dur="indefinite" restart="never" nodeType="tmRoot">
+          <p:childTnLst>
+            <p:seq concurrent="1" nextAc="seek">
+              <p:cTn id="2" dur="indefinite" nodeType="mainSeq">
+                <p:childTnLst>
+                  <p:par>
+                    <p:cTn id="3" fill="hold">
+                      <p:stCondLst>
+                        <p:cond delay="indefinite"/>
+                      </p:stCondLst>
+                      <p:childTnLst>
+                        <p:par>
+                          <p:cTn id="4" fill="hold">
+                            <p:stCondLst>
+                              <p:cond delay="0"/>
+                            </p:stCondLst>
+                            <p:childTnLst>
+                              <p:par>
+                                <p:cTn id="5" presetID="1" presetClass="entr" presetSubtype="0" fill="hold" grpId="0" nodeType="clickEffect">
+                                  <p:stCondLst>
+                                    <p:cond delay="0"/>
+                                  </p:stCondLst>
+                                  <p:childTnLst>
+                                    <p:set>
+                                      <p:cBhvr>
+                                        <p:cTn id="6" dur="1" fill="hold">
+                                          <p:stCondLst>
+                                            <p:cond delay="0"/>
+                                          </p:stCondLst>
+                                        </p:cTn>
+                                        <p:tgtEl>
+                                          <p:spTgt spid="4"/>
+                                        </p:tgtEl>
+                                        <p:attrNameLst>
+                                          <p:attrName>style.visibility</p:attrName>
+                                        </p:attrNameLst>
+                                      </p:cBhvr>
+                                      <p:to>
+                                        <p:strVal val="visible"/>
+                                      </p:to>
+                                    </p:set>
+                                  </p:childTnLst>
+                                </p:cTn>
+                              </p:par>
+                            </p:childTnLst>
+                          </p:cTn>
+                        </p:par>
+                      </p:childTnLst>
+                    </p:cTn>
+                  </p:par>
+                  <p:par>
+                    <p:cTn id="7" fill="hold">
+                      <p:stCondLst>
+                        <p:cond delay="indefinite"/>
+                      </p:stCondLst>
+                      <p:childTnLst>
+                        <p:par>
+                          <p:cTn id="8" fill="hold">
+                            <p:stCondLst>
+                              <p:cond delay="0"/>
+                            </p:stCondLst>
+                            <p:childTnLst>
+                              <p:par>
+                                <p:cTn id="9" presetID="1" presetClass="entr" presetSubtype="0" fill="hold" grpId="0" nodeType="clickEffect">
+                                  <p:stCondLst>
+                                    <p:cond delay="0"/>
+                                  </p:stCondLst>
+                                  <p:childTnLst>
+                                    <p:set>
+                                      <p:cBhvr>
+                                        <p:cTn id="10" dur="1" fill="hold">
+                                          <p:stCondLst>
+                                            <p:cond delay="0"/>
+                                          </p:stCondLst>
+                                        </p:cTn>
+                                        <p:tgtEl>
+                                          <p:spTgt spid="9"/>
+                                        </p:tgtEl>
+                                        <p:attrNameLst>
+                                          <p:attrName>style.visibility</p:attrName>
+                                        </p:attrNameLst>
+                                      </p:cBhvr>
+                                      <p:to>
+                                        <p:strVal val="visible"/>
+                                      </p:to>
+                                    </p:set>
+                                  </p:childTnLst>
+                                </p:cTn>
+                              </p:par>
+                            </p:childTnLst>
+                          </p:cTn>
+                        </p:par>
+                      </p:childTnLst>
+                    </p:cTn>
+                  </p:par>
+                  <p:par>
+                    <p:cTn id="11" fill="hold">
+                      <p:stCondLst>
+                        <p:cond delay="indefinite"/>
+                      </p:stCondLst>
+                      <p:childTnLst>
+                        <p:par>
+                          <p:cTn id="12" fill="hold">
+                            <p:stCondLst>
+                              <p:cond delay="0"/>
+                            </p:stCondLst>
+                            <p:childTnLst>
+                              <p:par>
+                                <p:cTn id="13" presetID="1" presetClass="entr" presetSubtype="0" fill="hold" grpId="0" nodeType="clickEffect">
+                                  <p:stCondLst>
+                                    <p:cond delay="0"/>
+                                  </p:stCondLst>
+                                  <p:childTnLst>
+                                    <p:set>
+                                      <p:cBhvr>
+                                        <p:cTn id="14" dur="1" fill="hold">
+                                          <p:stCondLst>
+                                            <p:cond delay="0"/>
+                                          </p:stCondLst>
+                                        </p:cTn>
+                                        <p:tgtEl>
+                                          <p:spTgt spid="11"/>
+                                        </p:tgtEl>
+                                        <p:attrNameLst>
+                                          <p:attrName>style.visibility</p:attrName>
+                                        </p:attrNameLst>
+                                      </p:cBhvr>
+                                      <p:to>
+                                        <p:strVal val="visible"/>
+                                      </p:to>
+                                    </p:set>
+                                  </p:childTnLst>
+                                </p:cTn>
+                              </p:par>
+                            </p:childTnLst>
+                          </p:cTn>
+                        </p:par>
+                      </p:childTnLst>
+                    </p:cTn>
+                  </p:par>
+                  <p:par>
+                    <p:cTn id="15" fill="hold">
+                      <p:stCondLst>
+                        <p:cond delay="indefinite"/>
+                      </p:stCondLst>
+                      <p:childTnLst>
+                        <p:par>
+                          <p:cTn id="16" fill="hold">
+                            <p:stCondLst>
+                              <p:cond delay="0"/>
+                            </p:stCondLst>
+                            <p:childTnLst>
+                              <p:par>
+                                <p:cTn id="17" presetID="1" presetClass="entr" presetSubtype="0" fill="hold" grpId="0" nodeType="clickEffect">
+                                  <p:stCondLst>
+                                    <p:cond delay="0"/>
+                                  </p:stCondLst>
+                                  <p:childTnLst>
+                                    <p:set>
+                                      <p:cBhvr>
+                                        <p:cTn id="18" dur="1" fill="hold">
+                                          <p:stCondLst>
+                                            <p:cond delay="0"/>
+                                          </p:stCondLst>
+                                        </p:cTn>
+                                        <p:tgtEl>
+                                          <p:spTgt spid="6"/>
+                                        </p:tgtEl>
+                                        <p:attrNameLst>
+                                          <p:attrName>style.visibility</p:attrName>
+                                        </p:attrNameLst>
+                                      </p:cBhvr>
+                                      <p:to>
+                                        <p:strVal val="visible"/>
+                                      </p:to>
+                                    </p:set>
+                                  </p:childTnLst>
+                                </p:cTn>
+                              </p:par>
+                            </p:childTnLst>
+                          </p:cTn>
+                        </p:par>
+                      </p:childTnLst>
+                    </p:cTn>
+                  </p:par>
+                  <p:par>
+                    <p:cTn id="19" fill="hold">
+                      <p:stCondLst>
+                        <p:cond delay="indefinite"/>
+                      </p:stCondLst>
+                      <p:childTnLst>
+                        <p:par>
+                          <p:cTn id="20" fill="hold">
+                            <p:stCondLst>
+                              <p:cond delay="0"/>
+                            </p:stCondLst>
+                            <p:childTnLst>
+                              <p:par>
+                                <p:cTn id="21" presetID="1" presetClass="entr" presetSubtype="0" fill="hold" grpId="0" nodeType="clickEffect">
+                                  <p:stCondLst>
+                                    <p:cond delay="0"/>
+                                  </p:stCondLst>
+                                  <p:childTnLst>
+                                    <p:set>
+                                      <p:cBhvr>
+                                        <p:cTn id="22" dur="1" fill="hold">
+                                          <p:stCondLst>
+                                            <p:cond delay="0"/>
+                                          </p:stCondLst>
+                                        </p:cTn>
+                                        <p:tgtEl>
+                                          <p:spTgt spid="13"/>
+                                        </p:tgtEl>
+                                        <p:attrNameLst>
+                                          <p:attrName>style.visibility</p:attrName>
+                                        </p:attrNameLst>
+                                      </p:cBhvr>
+                                      <p:to>
+                                        <p:strVal val="visible"/>
+                                      </p:to>
+                                    </p:set>
+                                  </p:childTnLst>
+                                </p:cTn>
+                              </p:par>
+                            </p:childTnLst>
+                          </p:cTn>
+                        </p:par>
+                      </p:childTnLst>
+                    </p:cTn>
+                  </p:par>
+                  <p:par>
+                    <p:cTn id="23" fill="hold">
+                      <p:stCondLst>
+                        <p:cond delay="indefinite"/>
+                      </p:stCondLst>
+                      <p:childTnLst>
+                        <p:par>
+                          <p:cTn id="24" fill="hold">
+                            <p:stCondLst>
+                              <p:cond delay="0"/>
+                            </p:stCondLst>
+                            <p:childTnLst>
+                              <p:par>
+                                <p:cTn id="25" presetID="1" presetClass="entr" presetSubtype="0" fill="hold" grpId="0" nodeType="clickEffect">
+                                  <p:stCondLst>
+                                    <p:cond delay="0"/>
+                                  </p:stCondLst>
+                                  <p:childTnLst>
+                                    <p:set>
+                                      <p:cBhvr>
+                                        <p:cTn id="26" dur="1" fill="hold">
+                                          <p:stCondLst>
+                                            <p:cond delay="0"/>
+                                          </p:stCondLst>
+                                        </p:cTn>
+                                        <p:tgtEl>
+                                          <p:spTgt spid="12"/>
+                                        </p:tgtEl>
+                                        <p:attrNameLst>
+                                          <p:attrName>style.visibility</p:attrName>
+                                        </p:attrNameLst>
+                                      </p:cBhvr>
+                                      <p:to>
+                                        <p:strVal val="visible"/>
+                                      </p:to>
+                                    </p:set>
+                                  </p:childTnLst>
+                                </p:cTn>
+                              </p:par>
+                            </p:childTnLst>
+                          </p:cTn>
+                        </p:par>
+                      </p:childTnLst>
+                    </p:cTn>
+                  </p:par>
+                  <p:par>
+                    <p:cTn id="27" fill="hold">
+                      <p:stCondLst>
+                        <p:cond delay="indefinite"/>
+                      </p:stCondLst>
+                      <p:childTnLst>
+                        <p:par>
+                          <p:cTn id="28" fill="hold">
+                            <p:stCondLst>
+                              <p:cond delay="0"/>
+                            </p:stCondLst>
+                            <p:childTnLst>
+                              <p:par>
+                                <p:cTn id="29" presetID="1" presetClass="entr" presetSubtype="0" fill="hold" grpId="0" nodeType="clickEffect">
+                                  <p:stCondLst>
+                                    <p:cond delay="0"/>
+                                  </p:stCondLst>
+                                  <p:childTnLst>
+                                    <p:set>
+                                      <p:cBhvr>
+                                        <p:cTn id="30" dur="1" fill="hold">
+                                          <p:stCondLst>
+                                            <p:cond delay="0"/>
+                                          </p:stCondLst>
+                                        </p:cTn>
+                                        <p:tgtEl>
+                                          <p:spTgt spid="15"/>
+                                        </p:tgtEl>
+                                        <p:attrNameLst>
+                                          <p:attrName>style.visibility</p:attrName>
+                                        </p:attrNameLst>
+                                      </p:cBhvr>
+                                      <p:to>
+                                        <p:strVal val="visible"/>
+                                      </p:to>
+                                    </p:set>
+                                  </p:childTnLst>
+                                </p:cTn>
+                              </p:par>
+                            </p:childTnLst>
+                          </p:cTn>
+                        </p:par>
+                      </p:childTnLst>
+                    </p:cTn>
+                  </p:par>
+                  <p:par>
+                    <p:cTn id="31" fill="hold">
+                      <p:stCondLst>
+                        <p:cond delay="indefinite"/>
+                      </p:stCondLst>
+                      <p:childTnLst>
+                        <p:par>
+                          <p:cTn id="32" fill="hold">
+                            <p:stCondLst>
+                              <p:cond delay="0"/>
+                            </p:stCondLst>
+                            <p:childTnLst>
+                              <p:par>
+                                <p:cTn id="33" presetID="1" presetClass="entr" presetSubtype="0" fill="hold" nodeType="clickEffect">
+                                  <p:stCondLst>
+                                    <p:cond delay="0"/>
+                                  </p:stCondLst>
+                                  <p:childTnLst>
+                                    <p:set>
+                                      <p:cBhvr>
+                                        <p:cTn id="34" dur="1" fill="hold">
+                                          <p:stCondLst>
+                                            <p:cond delay="0"/>
+                                          </p:stCondLst>
+                                        </p:cTn>
+                                        <p:tgtEl>
+                                          <p:spTgt spid="16">
+                                            <p:txEl>
+                                              <p:pRg st="0" end="0"/>
+                                            </p:txEl>
+                                          </p:spTgt>
+                                        </p:tgtEl>
+                                        <p:attrNameLst>
+                                          <p:attrName>style.visibility</p:attrName>
+                                        </p:attrNameLst>
+                                      </p:cBhvr>
+                                      <p:to>
+                                        <p:strVal val="visible"/>
+                                      </p:to>
+                                    </p:set>
+                                  </p:childTnLst>
+                                </p:cTn>
+                              </p:par>
+                            </p:childTnLst>
+                          </p:cTn>
+                        </p:par>
+                      </p:childTnLst>
+                    </p:cTn>
+                  </p:par>
+                  <p:par>
+                    <p:cTn id="35" fill="hold">
+                      <p:stCondLst>
+                        <p:cond delay="indefinite"/>
+                      </p:stCondLst>
+                      <p:childTnLst>
+                        <p:par>
+                          <p:cTn id="36" fill="hold">
+                            <p:stCondLst>
+                              <p:cond delay="0"/>
+                            </p:stCondLst>
+                            <p:childTnLst>
+                              <p:par>
+                                <p:cTn id="37" presetID="1" presetClass="entr" presetSubtype="0" fill="hold" nodeType="clickEffect">
+                                  <p:stCondLst>
+                                    <p:cond delay="0"/>
+                                  </p:stCondLst>
+                                  <p:childTnLst>
+                                    <p:set>
+                                      <p:cBhvr>
+                                        <p:cTn id="38" dur="1" fill="hold">
+                                          <p:stCondLst>
+                                            <p:cond delay="0"/>
+                                          </p:stCondLst>
+                                        </p:cTn>
+                                        <p:tgtEl>
+                                          <p:spTgt spid="16">
+                                            <p:txEl>
+                                              <p:pRg st="1" end="1"/>
+                                            </p:txEl>
+                                          </p:spTgt>
+                                        </p:tgtEl>
+                                        <p:attrNameLst>
+                                          <p:attrName>style.visibility</p:attrName>
+                                        </p:attrNameLst>
+                                      </p:cBhvr>
+                                      <p:to>
+                                        <p:strVal val="visible"/>
+                                      </p:to>
+                                    </p:set>
+                                  </p:childTnLst>
+                                </p:cTn>
+                              </p:par>
+                            </p:childTnLst>
+                          </p:cTn>
+                        </p:par>
+                      </p:childTnLst>
+                    </p:cTn>
+                  </p:par>
+                  <p:par>
+                    <p:cTn id="39" fill="hold">
+                      <p:stCondLst>
+                        <p:cond delay="indefinite"/>
+                      </p:stCondLst>
+                      <p:childTnLst>
+                        <p:par>
+                          <p:cTn id="40" fill="hold">
+                            <p:stCondLst>
+                              <p:cond delay="0"/>
+                            </p:stCondLst>
+                            <p:childTnLst>
+                              <p:par>
+                                <p:cTn id="41" presetID="1" presetClass="entr" presetSubtype="0" fill="hold" nodeType="clickEffect">
+                                  <p:stCondLst>
+                                    <p:cond delay="0"/>
+                                  </p:stCondLst>
+                                  <p:childTnLst>
+                                    <p:set>
+                                      <p:cBhvr>
+                                        <p:cTn id="42" dur="1" fill="hold">
+                                          <p:stCondLst>
+                                            <p:cond delay="0"/>
+                                          </p:stCondLst>
+                                        </p:cTn>
+                                        <p:tgtEl>
+                                          <p:spTgt spid="16">
+                                            <p:txEl>
+                                              <p:pRg st="2" end="2"/>
+                                            </p:txEl>
+                                          </p:spTgt>
+                                        </p:tgtEl>
+                                        <p:attrNameLst>
+                                          <p:attrName>style.visibility</p:attrName>
+                                        </p:attrNameLst>
+                                      </p:cBhvr>
+                                      <p:to>
+                                        <p:strVal val="visible"/>
+                                      </p:to>
+                                    </p:set>
+                                  </p:childTnLst>
+                                </p:cTn>
+                              </p:par>
+                            </p:childTnLst>
+                          </p:cTn>
+                        </p:par>
+                      </p:childTnLst>
+                    </p:cTn>
+                  </p:par>
+                </p:childTnLst>
+              </p:cTn>
+              <p:prevCondLst>
+                <p:cond evt="onPrev" delay="0">
+                  <p:tgtEl>
+                    <p:sldTgt/>
+                  </p:tgtEl>
+                </p:cond>
+              </p:prevCondLst>
+              <p:nextCondLst>
+                <p:cond evt="onNext" delay="0">
+                  <p:tgtEl>
+                    <p:sldTgt/>
+                  </p:tgtEl>
+                </p:cond>
+              </p:nextCondLst>
+            </p:seq>
+          </p:childTnLst>
+        </p:cTn>
+      </p:par>
+    </p:tnLst>
+    <p:bldLst>
+      <p:bldP spid="4" grpId="0" animBg="1"/>
+      <p:bldP spid="6" grpId="0" animBg="1"/>
+      <p:bldP spid="11" grpId="0" animBg="1"/>
+      <p:bldP spid="12" grpId="0" animBg="1"/>
+      <p:bldP spid="9" grpId="0" animBg="1"/>
+      <p:bldP spid="13" grpId="0" animBg="1"/>
+      <p:bldP spid="15" grpId="0"/>
+    </p:bldLst>
+  </p:timing>
 </p:sld>
 </file>
 
@@ -10293,6 +12506,642 @@
   <p:clrMapOvr>
     <a:masterClrMapping/>
   </p:clrMapOvr>
+  <p:timing>
+    <p:tnLst>
+      <p:par>
+        <p:cTn id="1" dur="indefinite" restart="never" nodeType="tmRoot">
+          <p:childTnLst>
+            <p:seq concurrent="1" nextAc="seek">
+              <p:cTn id="2" dur="indefinite" nodeType="mainSeq">
+                <p:childTnLst>
+                  <p:par>
+                    <p:cTn id="3" fill="hold">
+                      <p:stCondLst>
+                        <p:cond delay="indefinite"/>
+                      </p:stCondLst>
+                      <p:childTnLst>
+                        <p:par>
+                          <p:cTn id="4" fill="hold">
+                            <p:stCondLst>
+                              <p:cond delay="0"/>
+                            </p:stCondLst>
+                            <p:childTnLst>
+                              <p:par>
+                                <p:cTn id="5" presetID="1" presetClass="entr" presetSubtype="0" fill="hold" grpId="0" nodeType="clickEffect">
+                                  <p:stCondLst>
+                                    <p:cond delay="0"/>
+                                  </p:stCondLst>
+                                  <p:childTnLst>
+                                    <p:set>
+                                      <p:cBhvr>
+                                        <p:cTn id="6" dur="1" fill="hold">
+                                          <p:stCondLst>
+                                            <p:cond delay="0"/>
+                                          </p:stCondLst>
+                                        </p:cTn>
+                                        <p:tgtEl>
+                                          <p:spTgt spid="8"/>
+                                        </p:tgtEl>
+                                        <p:attrNameLst>
+                                          <p:attrName>style.visibility</p:attrName>
+                                        </p:attrNameLst>
+                                      </p:cBhvr>
+                                      <p:to>
+                                        <p:strVal val="visible"/>
+                                      </p:to>
+                                    </p:set>
+                                  </p:childTnLst>
+                                </p:cTn>
+                              </p:par>
+                              <p:par>
+                                <p:cTn id="7" presetID="1" presetClass="entr" presetSubtype="0" fill="hold" grpId="0" nodeType="withEffect">
+                                  <p:stCondLst>
+                                    <p:cond delay="0"/>
+                                  </p:stCondLst>
+                                  <p:childTnLst>
+                                    <p:set>
+                                      <p:cBhvr>
+                                        <p:cTn id="8" dur="1" fill="hold">
+                                          <p:stCondLst>
+                                            <p:cond delay="0"/>
+                                          </p:stCondLst>
+                                        </p:cTn>
+                                        <p:tgtEl>
+                                          <p:spTgt spid="9"/>
+                                        </p:tgtEl>
+                                        <p:attrNameLst>
+                                          <p:attrName>style.visibility</p:attrName>
+                                        </p:attrNameLst>
+                                      </p:cBhvr>
+                                      <p:to>
+                                        <p:strVal val="visible"/>
+                                      </p:to>
+                                    </p:set>
+                                  </p:childTnLst>
+                                </p:cTn>
+                              </p:par>
+                            </p:childTnLst>
+                          </p:cTn>
+                        </p:par>
+                      </p:childTnLst>
+                    </p:cTn>
+                  </p:par>
+                  <p:par>
+                    <p:cTn id="9" fill="hold">
+                      <p:stCondLst>
+                        <p:cond delay="indefinite"/>
+                      </p:stCondLst>
+                      <p:childTnLst>
+                        <p:par>
+                          <p:cTn id="10" fill="hold">
+                            <p:stCondLst>
+                              <p:cond delay="0"/>
+                            </p:stCondLst>
+                            <p:childTnLst>
+                              <p:par>
+                                <p:cTn id="11" presetID="1" presetClass="entr" presetSubtype="0" fill="hold" grpId="0" nodeType="clickEffect">
+                                  <p:stCondLst>
+                                    <p:cond delay="0"/>
+                                  </p:stCondLst>
+                                  <p:childTnLst>
+                                    <p:set>
+                                      <p:cBhvr>
+                                        <p:cTn id="12" dur="1" fill="hold">
+                                          <p:stCondLst>
+                                            <p:cond delay="0"/>
+                                          </p:stCondLst>
+                                        </p:cTn>
+                                        <p:tgtEl>
+                                          <p:spTgt spid="10"/>
+                                        </p:tgtEl>
+                                        <p:attrNameLst>
+                                          <p:attrName>style.visibility</p:attrName>
+                                        </p:attrNameLst>
+                                      </p:cBhvr>
+                                      <p:to>
+                                        <p:strVal val="visible"/>
+                                      </p:to>
+                                    </p:set>
+                                  </p:childTnLst>
+                                </p:cTn>
+                              </p:par>
+                            </p:childTnLst>
+                          </p:cTn>
+                        </p:par>
+                      </p:childTnLst>
+                    </p:cTn>
+                  </p:par>
+                  <p:par>
+                    <p:cTn id="13" fill="hold">
+                      <p:stCondLst>
+                        <p:cond delay="indefinite"/>
+                      </p:stCondLst>
+                      <p:childTnLst>
+                        <p:par>
+                          <p:cTn id="14" fill="hold">
+                            <p:stCondLst>
+                              <p:cond delay="0"/>
+                            </p:stCondLst>
+                            <p:childTnLst>
+                              <p:par>
+                                <p:cTn id="15" presetID="1" presetClass="entr" presetSubtype="0" fill="hold" grpId="0" nodeType="clickEffect">
+                                  <p:stCondLst>
+                                    <p:cond delay="0"/>
+                                  </p:stCondLst>
+                                  <p:childTnLst>
+                                    <p:set>
+                                      <p:cBhvr>
+                                        <p:cTn id="16" dur="1" fill="hold">
+                                          <p:stCondLst>
+                                            <p:cond delay="0"/>
+                                          </p:stCondLst>
+                                        </p:cTn>
+                                        <p:tgtEl>
+                                          <p:spTgt spid="11"/>
+                                        </p:tgtEl>
+                                        <p:attrNameLst>
+                                          <p:attrName>style.visibility</p:attrName>
+                                        </p:attrNameLst>
+                                      </p:cBhvr>
+                                      <p:to>
+                                        <p:strVal val="visible"/>
+                                      </p:to>
+                                    </p:set>
+                                  </p:childTnLst>
+                                </p:cTn>
+                              </p:par>
+                            </p:childTnLst>
+                          </p:cTn>
+                        </p:par>
+                      </p:childTnLst>
+                    </p:cTn>
+                  </p:par>
+                  <p:par>
+                    <p:cTn id="17" fill="hold">
+                      <p:stCondLst>
+                        <p:cond delay="indefinite"/>
+                      </p:stCondLst>
+                      <p:childTnLst>
+                        <p:par>
+                          <p:cTn id="18" fill="hold">
+                            <p:stCondLst>
+                              <p:cond delay="0"/>
+                            </p:stCondLst>
+                            <p:childTnLst>
+                              <p:par>
+                                <p:cTn id="19" presetID="1" presetClass="entr" presetSubtype="0" fill="hold" grpId="0" nodeType="clickEffect">
+                                  <p:stCondLst>
+                                    <p:cond delay="0"/>
+                                  </p:stCondLst>
+                                  <p:childTnLst>
+                                    <p:set>
+                                      <p:cBhvr>
+                                        <p:cTn id="20" dur="1" fill="hold">
+                                          <p:stCondLst>
+                                            <p:cond delay="0"/>
+                                          </p:stCondLst>
+                                        </p:cTn>
+                                        <p:tgtEl>
+                                          <p:spTgt spid="12"/>
+                                        </p:tgtEl>
+                                        <p:attrNameLst>
+                                          <p:attrName>style.visibility</p:attrName>
+                                        </p:attrNameLst>
+                                      </p:cBhvr>
+                                      <p:to>
+                                        <p:strVal val="visible"/>
+                                      </p:to>
+                                    </p:set>
+                                  </p:childTnLst>
+                                </p:cTn>
+                              </p:par>
+                            </p:childTnLst>
+                          </p:cTn>
+                        </p:par>
+                      </p:childTnLst>
+                    </p:cTn>
+                  </p:par>
+                  <p:par>
+                    <p:cTn id="21" fill="hold">
+                      <p:stCondLst>
+                        <p:cond delay="indefinite"/>
+                      </p:stCondLst>
+                      <p:childTnLst>
+                        <p:par>
+                          <p:cTn id="22" fill="hold">
+                            <p:stCondLst>
+                              <p:cond delay="0"/>
+                            </p:stCondLst>
+                            <p:childTnLst>
+                              <p:par>
+                                <p:cTn id="23" presetID="1" presetClass="entr" presetSubtype="0" fill="hold" nodeType="clickEffect">
+                                  <p:stCondLst>
+                                    <p:cond delay="0"/>
+                                  </p:stCondLst>
+                                  <p:childTnLst>
+                                    <p:set>
+                                      <p:cBhvr>
+                                        <p:cTn id="24" dur="1" fill="hold">
+                                          <p:stCondLst>
+                                            <p:cond delay="0"/>
+                                          </p:stCondLst>
+                                        </p:cTn>
+                                        <p:tgtEl>
+                                          <p:spTgt spid="13">
+                                            <p:txEl>
+                                              <p:pRg st="0" end="0"/>
+                                            </p:txEl>
+                                          </p:spTgt>
+                                        </p:tgtEl>
+                                        <p:attrNameLst>
+                                          <p:attrName>style.visibility</p:attrName>
+                                        </p:attrNameLst>
+                                      </p:cBhvr>
+                                      <p:to>
+                                        <p:strVal val="visible"/>
+                                      </p:to>
+                                    </p:set>
+                                  </p:childTnLst>
+                                </p:cTn>
+                              </p:par>
+                            </p:childTnLst>
+                          </p:cTn>
+                        </p:par>
+                      </p:childTnLst>
+                    </p:cTn>
+                  </p:par>
+                  <p:par>
+                    <p:cTn id="25" fill="hold">
+                      <p:stCondLst>
+                        <p:cond delay="indefinite"/>
+                      </p:stCondLst>
+                      <p:childTnLst>
+                        <p:par>
+                          <p:cTn id="26" fill="hold">
+                            <p:stCondLst>
+                              <p:cond delay="0"/>
+                            </p:stCondLst>
+                            <p:childTnLst>
+                              <p:par>
+                                <p:cTn id="27" presetID="1" presetClass="entr" presetSubtype="0" fill="hold" nodeType="clickEffect">
+                                  <p:stCondLst>
+                                    <p:cond delay="0"/>
+                                  </p:stCondLst>
+                                  <p:childTnLst>
+                                    <p:set>
+                                      <p:cBhvr>
+                                        <p:cTn id="28" dur="1" fill="hold">
+                                          <p:stCondLst>
+                                            <p:cond delay="0"/>
+                                          </p:stCondLst>
+                                        </p:cTn>
+                                        <p:tgtEl>
+                                          <p:spTgt spid="13">
+                                            <p:txEl>
+                                              <p:pRg st="2" end="2"/>
+                                            </p:txEl>
+                                          </p:spTgt>
+                                        </p:tgtEl>
+                                        <p:attrNameLst>
+                                          <p:attrName>style.visibility</p:attrName>
+                                        </p:attrNameLst>
+                                      </p:cBhvr>
+                                      <p:to>
+                                        <p:strVal val="visible"/>
+                                      </p:to>
+                                    </p:set>
+                                  </p:childTnLst>
+                                </p:cTn>
+                              </p:par>
+                            </p:childTnLst>
+                          </p:cTn>
+                        </p:par>
+                      </p:childTnLst>
+                    </p:cTn>
+                  </p:par>
+                  <p:par>
+                    <p:cTn id="29" fill="hold">
+                      <p:stCondLst>
+                        <p:cond delay="indefinite"/>
+                      </p:stCondLst>
+                      <p:childTnLst>
+                        <p:par>
+                          <p:cTn id="30" fill="hold">
+                            <p:stCondLst>
+                              <p:cond delay="0"/>
+                            </p:stCondLst>
+                            <p:childTnLst>
+                              <p:par>
+                                <p:cTn id="31" presetID="1" presetClass="entr" presetSubtype="0" fill="hold" nodeType="clickEffect">
+                                  <p:stCondLst>
+                                    <p:cond delay="0"/>
+                                  </p:stCondLst>
+                                  <p:childTnLst>
+                                    <p:set>
+                                      <p:cBhvr>
+                                        <p:cTn id="32" dur="1" fill="hold">
+                                          <p:stCondLst>
+                                            <p:cond delay="0"/>
+                                          </p:stCondLst>
+                                        </p:cTn>
+                                        <p:tgtEl>
+                                          <p:spTgt spid="13">
+                                            <p:txEl>
+                                              <p:pRg st="3" end="3"/>
+                                            </p:txEl>
+                                          </p:spTgt>
+                                        </p:tgtEl>
+                                        <p:attrNameLst>
+                                          <p:attrName>style.visibility</p:attrName>
+                                        </p:attrNameLst>
+                                      </p:cBhvr>
+                                      <p:to>
+                                        <p:strVal val="visible"/>
+                                      </p:to>
+                                    </p:set>
+                                  </p:childTnLst>
+                                </p:cTn>
+                              </p:par>
+                            </p:childTnLst>
+                          </p:cTn>
+                        </p:par>
+                      </p:childTnLst>
+                    </p:cTn>
+                  </p:par>
+                  <p:par>
+                    <p:cTn id="33" fill="hold">
+                      <p:stCondLst>
+                        <p:cond delay="indefinite"/>
+                      </p:stCondLst>
+                      <p:childTnLst>
+                        <p:par>
+                          <p:cTn id="34" fill="hold">
+                            <p:stCondLst>
+                              <p:cond delay="0"/>
+                            </p:stCondLst>
+                            <p:childTnLst>
+                              <p:par>
+                                <p:cTn id="35" presetID="1" presetClass="entr" presetSubtype="0" fill="hold" nodeType="clickEffect">
+                                  <p:stCondLst>
+                                    <p:cond delay="0"/>
+                                  </p:stCondLst>
+                                  <p:childTnLst>
+                                    <p:set>
+                                      <p:cBhvr>
+                                        <p:cTn id="36" dur="1" fill="hold">
+                                          <p:stCondLst>
+                                            <p:cond delay="0"/>
+                                          </p:stCondLst>
+                                        </p:cTn>
+                                        <p:tgtEl>
+                                          <p:spTgt spid="13">
+                                            <p:txEl>
+                                              <p:pRg st="4" end="4"/>
+                                            </p:txEl>
+                                          </p:spTgt>
+                                        </p:tgtEl>
+                                        <p:attrNameLst>
+                                          <p:attrName>style.visibility</p:attrName>
+                                        </p:attrNameLst>
+                                      </p:cBhvr>
+                                      <p:to>
+                                        <p:strVal val="visible"/>
+                                      </p:to>
+                                    </p:set>
+                                  </p:childTnLst>
+                                </p:cTn>
+                              </p:par>
+                            </p:childTnLst>
+                          </p:cTn>
+                        </p:par>
+                      </p:childTnLst>
+                    </p:cTn>
+                  </p:par>
+                  <p:par>
+                    <p:cTn id="37" fill="hold">
+                      <p:stCondLst>
+                        <p:cond delay="indefinite"/>
+                      </p:stCondLst>
+                      <p:childTnLst>
+                        <p:par>
+                          <p:cTn id="38" fill="hold">
+                            <p:stCondLst>
+                              <p:cond delay="0"/>
+                            </p:stCondLst>
+                            <p:childTnLst>
+                              <p:par>
+                                <p:cTn id="39" presetID="1" presetClass="entr" presetSubtype="0" fill="hold" nodeType="clickEffect">
+                                  <p:stCondLst>
+                                    <p:cond delay="0"/>
+                                  </p:stCondLst>
+                                  <p:childTnLst>
+                                    <p:set>
+                                      <p:cBhvr>
+                                        <p:cTn id="40" dur="1" fill="hold">
+                                          <p:stCondLst>
+                                            <p:cond delay="0"/>
+                                          </p:stCondLst>
+                                        </p:cTn>
+                                        <p:tgtEl>
+                                          <p:spTgt spid="13">
+                                            <p:txEl>
+                                              <p:pRg st="5" end="5"/>
+                                            </p:txEl>
+                                          </p:spTgt>
+                                        </p:tgtEl>
+                                        <p:attrNameLst>
+                                          <p:attrName>style.visibility</p:attrName>
+                                        </p:attrNameLst>
+                                      </p:cBhvr>
+                                      <p:to>
+                                        <p:strVal val="visible"/>
+                                      </p:to>
+                                    </p:set>
+                                  </p:childTnLst>
+                                </p:cTn>
+                              </p:par>
+                            </p:childTnLst>
+                          </p:cTn>
+                        </p:par>
+                      </p:childTnLst>
+                    </p:cTn>
+                  </p:par>
+                  <p:par>
+                    <p:cTn id="41" fill="hold">
+                      <p:stCondLst>
+                        <p:cond delay="indefinite"/>
+                      </p:stCondLst>
+                      <p:childTnLst>
+                        <p:par>
+                          <p:cTn id="42" fill="hold">
+                            <p:stCondLst>
+                              <p:cond delay="0"/>
+                            </p:stCondLst>
+                            <p:childTnLst>
+                              <p:par>
+                                <p:cTn id="43" presetID="1" presetClass="entr" presetSubtype="0" fill="hold" nodeType="clickEffect">
+                                  <p:stCondLst>
+                                    <p:cond delay="0"/>
+                                  </p:stCondLst>
+                                  <p:childTnLst>
+                                    <p:set>
+                                      <p:cBhvr>
+                                        <p:cTn id="44" dur="1" fill="hold">
+                                          <p:stCondLst>
+                                            <p:cond delay="0"/>
+                                          </p:stCondLst>
+                                        </p:cTn>
+                                        <p:tgtEl>
+                                          <p:spTgt spid="13">
+                                            <p:txEl>
+                                              <p:pRg st="6" end="6"/>
+                                            </p:txEl>
+                                          </p:spTgt>
+                                        </p:tgtEl>
+                                        <p:attrNameLst>
+                                          <p:attrName>style.visibility</p:attrName>
+                                        </p:attrNameLst>
+                                      </p:cBhvr>
+                                      <p:to>
+                                        <p:strVal val="visible"/>
+                                      </p:to>
+                                    </p:set>
+                                  </p:childTnLst>
+                                </p:cTn>
+                              </p:par>
+                            </p:childTnLst>
+                          </p:cTn>
+                        </p:par>
+                      </p:childTnLst>
+                    </p:cTn>
+                  </p:par>
+                  <p:par>
+                    <p:cTn id="45" fill="hold">
+                      <p:stCondLst>
+                        <p:cond delay="indefinite"/>
+                      </p:stCondLst>
+                      <p:childTnLst>
+                        <p:par>
+                          <p:cTn id="46" fill="hold">
+                            <p:stCondLst>
+                              <p:cond delay="0"/>
+                            </p:stCondLst>
+                            <p:childTnLst>
+                              <p:par>
+                                <p:cTn id="47" presetID="1" presetClass="entr" presetSubtype="0" fill="hold" nodeType="clickEffect">
+                                  <p:stCondLst>
+                                    <p:cond delay="0"/>
+                                  </p:stCondLst>
+                                  <p:childTnLst>
+                                    <p:set>
+                                      <p:cBhvr>
+                                        <p:cTn id="48" dur="1" fill="hold">
+                                          <p:stCondLst>
+                                            <p:cond delay="0"/>
+                                          </p:stCondLst>
+                                        </p:cTn>
+                                        <p:tgtEl>
+                                          <p:spTgt spid="13">
+                                            <p:txEl>
+                                              <p:pRg st="7" end="7"/>
+                                            </p:txEl>
+                                          </p:spTgt>
+                                        </p:tgtEl>
+                                        <p:attrNameLst>
+                                          <p:attrName>style.visibility</p:attrName>
+                                        </p:attrNameLst>
+                                      </p:cBhvr>
+                                      <p:to>
+                                        <p:strVal val="visible"/>
+                                      </p:to>
+                                    </p:set>
+                                  </p:childTnLst>
+                                </p:cTn>
+                              </p:par>
+                            </p:childTnLst>
+                          </p:cTn>
+                        </p:par>
+                      </p:childTnLst>
+                    </p:cTn>
+                  </p:par>
+                  <p:par>
+                    <p:cTn id="49" fill="hold">
+                      <p:stCondLst>
+                        <p:cond delay="indefinite"/>
+                      </p:stCondLst>
+                      <p:childTnLst>
+                        <p:par>
+                          <p:cTn id="50" fill="hold">
+                            <p:stCondLst>
+                              <p:cond delay="0"/>
+                            </p:stCondLst>
+                            <p:childTnLst>
+                              <p:par>
+                                <p:cTn id="51" presetID="1" presetClass="entr" presetSubtype="0" fill="hold" nodeType="clickEffect">
+                                  <p:stCondLst>
+                                    <p:cond delay="0"/>
+                                  </p:stCondLst>
+                                  <p:childTnLst>
+                                    <p:set>
+                                      <p:cBhvr>
+                                        <p:cTn id="52" dur="1" fill="hold">
+                                          <p:stCondLst>
+                                            <p:cond delay="0"/>
+                                          </p:stCondLst>
+                                        </p:cTn>
+                                        <p:tgtEl>
+                                          <p:spTgt spid="13">
+                                            <p:txEl>
+                                              <p:pRg st="8" end="8"/>
+                                            </p:txEl>
+                                          </p:spTgt>
+                                        </p:tgtEl>
+                                        <p:attrNameLst>
+                                          <p:attrName>style.visibility</p:attrName>
+                                        </p:attrNameLst>
+                                      </p:cBhvr>
+                                      <p:to>
+                                        <p:strVal val="visible"/>
+                                      </p:to>
+                                    </p:set>
+                                  </p:childTnLst>
+                                </p:cTn>
+                              </p:par>
+                            </p:childTnLst>
+                          </p:cTn>
+                        </p:par>
+                      </p:childTnLst>
+                    </p:cTn>
+                  </p:par>
+                </p:childTnLst>
+              </p:cTn>
+              <p:prevCondLst>
+                <p:cond evt="onPrev" delay="0">
+                  <p:tgtEl>
+                    <p:sldTgt/>
+                  </p:tgtEl>
+                </p:cond>
+              </p:prevCondLst>
+              <p:nextCondLst>
+                <p:cond evt="onNext" delay="0">
+                  <p:tgtEl>
+                    <p:sldTgt/>
+                  </p:tgtEl>
+                </p:cond>
+              </p:nextCondLst>
+            </p:seq>
+          </p:childTnLst>
+        </p:cTn>
+      </p:par>
+    </p:tnLst>
+    <p:bldLst>
+      <p:bldP spid="8" grpId="0" animBg="1"/>
+      <p:bldP spid="9" grpId="0"/>
+      <p:bldP spid="10" grpId="0" animBg="1"/>
+      <p:bldP spid="11" grpId="0" animBg="1"/>
+      <p:bldP spid="12" grpId="0" animBg="1"/>
+    </p:bldLst>
+  </p:timing>
 </p:sld>
 </file>
 
@@ -10454,6 +13303,330 @@
   <p:clrMapOvr>
     <a:masterClrMapping/>
   </p:clrMapOvr>
+  <p:timing>
+    <p:tnLst>
+      <p:par>
+        <p:cTn id="1" dur="indefinite" restart="never" nodeType="tmRoot">
+          <p:childTnLst>
+            <p:seq concurrent="1" nextAc="seek">
+              <p:cTn id="2" dur="indefinite" nodeType="mainSeq">
+                <p:childTnLst>
+                  <p:par>
+                    <p:cTn id="3" fill="hold">
+                      <p:stCondLst>
+                        <p:cond delay="indefinite"/>
+                      </p:stCondLst>
+                      <p:childTnLst>
+                        <p:par>
+                          <p:cTn id="4" fill="hold">
+                            <p:stCondLst>
+                              <p:cond delay="0"/>
+                            </p:stCondLst>
+                            <p:childTnLst>
+                              <p:par>
+                                <p:cTn id="5" presetID="1" presetClass="entr" presetSubtype="0" fill="hold" nodeType="clickEffect">
+                                  <p:stCondLst>
+                                    <p:cond delay="0"/>
+                                  </p:stCondLst>
+                                  <p:childTnLst>
+                                    <p:set>
+                                      <p:cBhvr>
+                                        <p:cTn id="6" dur="1" fill="hold">
+                                          <p:stCondLst>
+                                            <p:cond delay="0"/>
+                                          </p:stCondLst>
+                                        </p:cTn>
+                                        <p:tgtEl>
+                                          <p:spTgt spid="7">
+                                            <p:txEl>
+                                              <p:pRg st="0" end="0"/>
+                                            </p:txEl>
+                                          </p:spTgt>
+                                        </p:tgtEl>
+                                        <p:attrNameLst>
+                                          <p:attrName>style.visibility</p:attrName>
+                                        </p:attrNameLst>
+                                      </p:cBhvr>
+                                      <p:to>
+                                        <p:strVal val="visible"/>
+                                      </p:to>
+                                    </p:set>
+                                  </p:childTnLst>
+                                </p:cTn>
+                              </p:par>
+                            </p:childTnLst>
+                          </p:cTn>
+                        </p:par>
+                      </p:childTnLst>
+                    </p:cTn>
+                  </p:par>
+                  <p:par>
+                    <p:cTn id="7" fill="hold">
+                      <p:stCondLst>
+                        <p:cond delay="indefinite"/>
+                      </p:stCondLst>
+                      <p:childTnLst>
+                        <p:par>
+                          <p:cTn id="8" fill="hold">
+                            <p:stCondLst>
+                              <p:cond delay="0"/>
+                            </p:stCondLst>
+                            <p:childTnLst>
+                              <p:par>
+                                <p:cTn id="9" presetID="1" presetClass="entr" presetSubtype="0" fill="hold" nodeType="clickEffect">
+                                  <p:stCondLst>
+                                    <p:cond delay="0"/>
+                                  </p:stCondLst>
+                                  <p:childTnLst>
+                                    <p:set>
+                                      <p:cBhvr>
+                                        <p:cTn id="10" dur="1" fill="hold">
+                                          <p:stCondLst>
+                                            <p:cond delay="0"/>
+                                          </p:stCondLst>
+                                        </p:cTn>
+                                        <p:tgtEl>
+                                          <p:spTgt spid="7">
+                                            <p:txEl>
+                                              <p:pRg st="1" end="1"/>
+                                            </p:txEl>
+                                          </p:spTgt>
+                                        </p:tgtEl>
+                                        <p:attrNameLst>
+                                          <p:attrName>style.visibility</p:attrName>
+                                        </p:attrNameLst>
+                                      </p:cBhvr>
+                                      <p:to>
+                                        <p:strVal val="visible"/>
+                                      </p:to>
+                                    </p:set>
+                                  </p:childTnLst>
+                                </p:cTn>
+                              </p:par>
+                            </p:childTnLst>
+                          </p:cTn>
+                        </p:par>
+                      </p:childTnLst>
+                    </p:cTn>
+                  </p:par>
+                  <p:par>
+                    <p:cTn id="11" fill="hold">
+                      <p:stCondLst>
+                        <p:cond delay="indefinite"/>
+                      </p:stCondLst>
+                      <p:childTnLst>
+                        <p:par>
+                          <p:cTn id="12" fill="hold">
+                            <p:stCondLst>
+                              <p:cond delay="0"/>
+                            </p:stCondLst>
+                            <p:childTnLst>
+                              <p:par>
+                                <p:cTn id="13" presetID="1" presetClass="entr" presetSubtype="0" fill="hold" nodeType="clickEffect">
+                                  <p:stCondLst>
+                                    <p:cond delay="0"/>
+                                  </p:stCondLst>
+                                  <p:childTnLst>
+                                    <p:set>
+                                      <p:cBhvr>
+                                        <p:cTn id="14" dur="1" fill="hold">
+                                          <p:stCondLst>
+                                            <p:cond delay="0"/>
+                                          </p:stCondLst>
+                                        </p:cTn>
+                                        <p:tgtEl>
+                                          <p:spTgt spid="7">
+                                            <p:txEl>
+                                              <p:pRg st="2" end="2"/>
+                                            </p:txEl>
+                                          </p:spTgt>
+                                        </p:tgtEl>
+                                        <p:attrNameLst>
+                                          <p:attrName>style.visibility</p:attrName>
+                                        </p:attrNameLst>
+                                      </p:cBhvr>
+                                      <p:to>
+                                        <p:strVal val="visible"/>
+                                      </p:to>
+                                    </p:set>
+                                  </p:childTnLst>
+                                </p:cTn>
+                              </p:par>
+                            </p:childTnLst>
+                          </p:cTn>
+                        </p:par>
+                      </p:childTnLst>
+                    </p:cTn>
+                  </p:par>
+                  <p:par>
+                    <p:cTn id="15" fill="hold">
+                      <p:stCondLst>
+                        <p:cond delay="indefinite"/>
+                      </p:stCondLst>
+                      <p:childTnLst>
+                        <p:par>
+                          <p:cTn id="16" fill="hold">
+                            <p:stCondLst>
+                              <p:cond delay="0"/>
+                            </p:stCondLst>
+                            <p:childTnLst>
+                              <p:par>
+                                <p:cTn id="17" presetID="1" presetClass="entr" presetSubtype="0" fill="hold" nodeType="clickEffect">
+                                  <p:stCondLst>
+                                    <p:cond delay="0"/>
+                                  </p:stCondLst>
+                                  <p:childTnLst>
+                                    <p:set>
+                                      <p:cBhvr>
+                                        <p:cTn id="18" dur="1" fill="hold">
+                                          <p:stCondLst>
+                                            <p:cond delay="0"/>
+                                          </p:stCondLst>
+                                        </p:cTn>
+                                        <p:tgtEl>
+                                          <p:spTgt spid="7">
+                                            <p:txEl>
+                                              <p:pRg st="3" end="3"/>
+                                            </p:txEl>
+                                          </p:spTgt>
+                                        </p:tgtEl>
+                                        <p:attrNameLst>
+                                          <p:attrName>style.visibility</p:attrName>
+                                        </p:attrNameLst>
+                                      </p:cBhvr>
+                                      <p:to>
+                                        <p:strVal val="visible"/>
+                                      </p:to>
+                                    </p:set>
+                                  </p:childTnLst>
+                                </p:cTn>
+                              </p:par>
+                            </p:childTnLst>
+                          </p:cTn>
+                        </p:par>
+                      </p:childTnLst>
+                    </p:cTn>
+                  </p:par>
+                  <p:par>
+                    <p:cTn id="19" fill="hold">
+                      <p:stCondLst>
+                        <p:cond delay="indefinite"/>
+                      </p:stCondLst>
+                      <p:childTnLst>
+                        <p:par>
+                          <p:cTn id="20" fill="hold">
+                            <p:stCondLst>
+                              <p:cond delay="0"/>
+                            </p:stCondLst>
+                            <p:childTnLst>
+                              <p:par>
+                                <p:cTn id="21" presetID="1" presetClass="entr" presetSubtype="0" fill="hold" nodeType="clickEffect">
+                                  <p:stCondLst>
+                                    <p:cond delay="0"/>
+                                  </p:stCondLst>
+                                  <p:childTnLst>
+                                    <p:set>
+                                      <p:cBhvr>
+                                        <p:cTn id="22" dur="1" fill="hold">
+                                          <p:stCondLst>
+                                            <p:cond delay="0"/>
+                                          </p:stCondLst>
+                                        </p:cTn>
+                                        <p:tgtEl>
+                                          <p:spTgt spid="7">
+                                            <p:txEl>
+                                              <p:pRg st="4" end="4"/>
+                                            </p:txEl>
+                                          </p:spTgt>
+                                        </p:tgtEl>
+                                        <p:attrNameLst>
+                                          <p:attrName>style.visibility</p:attrName>
+                                        </p:attrNameLst>
+                                      </p:cBhvr>
+                                      <p:to>
+                                        <p:strVal val="visible"/>
+                                      </p:to>
+                                    </p:set>
+                                  </p:childTnLst>
+                                </p:cTn>
+                              </p:par>
+                            </p:childTnLst>
+                          </p:cTn>
+                        </p:par>
+                      </p:childTnLst>
+                    </p:cTn>
+                  </p:par>
+                  <p:par>
+                    <p:cTn id="23" fill="hold">
+                      <p:stCondLst>
+                        <p:cond delay="indefinite"/>
+                      </p:stCondLst>
+                      <p:childTnLst>
+                        <p:par>
+                          <p:cTn id="24" fill="hold">
+                            <p:stCondLst>
+                              <p:cond delay="0"/>
+                            </p:stCondLst>
+                            <p:childTnLst>
+                              <p:par>
+                                <p:cTn id="25" presetID="1" presetClass="entr" presetSubtype="0" fill="hold" nodeType="clickEffect">
+                                  <p:stCondLst>
+                                    <p:cond delay="0"/>
+                                  </p:stCondLst>
+                                  <p:childTnLst>
+                                    <p:set>
+                                      <p:cBhvr>
+                                        <p:cTn id="26" dur="1" fill="hold">
+                                          <p:stCondLst>
+                                            <p:cond delay="0"/>
+                                          </p:stCondLst>
+                                        </p:cTn>
+                                        <p:tgtEl>
+                                          <p:spTgt spid="7">
+                                            <p:txEl>
+                                              <p:pRg st="5" end="5"/>
+                                            </p:txEl>
+                                          </p:spTgt>
+                                        </p:tgtEl>
+                                        <p:attrNameLst>
+                                          <p:attrName>style.visibility</p:attrName>
+                                        </p:attrNameLst>
+                                      </p:cBhvr>
+                                      <p:to>
+                                        <p:strVal val="visible"/>
+                                      </p:to>
+                                    </p:set>
+                                  </p:childTnLst>
+                                </p:cTn>
+                              </p:par>
+                            </p:childTnLst>
+                          </p:cTn>
+                        </p:par>
+                      </p:childTnLst>
+                    </p:cTn>
+                  </p:par>
+                </p:childTnLst>
+              </p:cTn>
+              <p:prevCondLst>
+                <p:cond evt="onPrev" delay="0">
+                  <p:tgtEl>
+                    <p:sldTgt/>
+                  </p:tgtEl>
+                </p:cond>
+              </p:prevCondLst>
+              <p:nextCondLst>
+                <p:cond evt="onNext" delay="0">
+                  <p:tgtEl>
+                    <p:sldTgt/>
+                  </p:tgtEl>
+                </p:cond>
+              </p:nextCondLst>
+            </p:seq>
+          </p:childTnLst>
+        </p:cTn>
+      </p:par>
+    </p:tnLst>
+  </p:timing>
 </p:sld>
 </file>
 
@@ -10702,6 +13875,511 @@
   <p:clrMapOvr>
     <a:masterClrMapping/>
   </p:clrMapOvr>
+  <p:timing>
+    <p:tnLst>
+      <p:par>
+        <p:cTn id="1" dur="indefinite" restart="never" nodeType="tmRoot">
+          <p:childTnLst>
+            <p:seq concurrent="1" nextAc="seek">
+              <p:cTn id="2" dur="indefinite" nodeType="mainSeq">
+                <p:childTnLst>
+                  <p:par>
+                    <p:cTn id="3" fill="hold">
+                      <p:stCondLst>
+                        <p:cond delay="indefinite"/>
+                      </p:stCondLst>
+                      <p:childTnLst>
+                        <p:par>
+                          <p:cTn id="4" fill="hold">
+                            <p:stCondLst>
+                              <p:cond delay="0"/>
+                            </p:stCondLst>
+                            <p:childTnLst>
+                              <p:par>
+                                <p:cTn id="5" presetID="1" presetClass="entr" presetSubtype="0" fill="hold" nodeType="clickEffect">
+                                  <p:stCondLst>
+                                    <p:cond delay="0"/>
+                                  </p:stCondLst>
+                                  <p:childTnLst>
+                                    <p:set>
+                                      <p:cBhvr>
+                                        <p:cTn id="6" dur="1" fill="hold">
+                                          <p:stCondLst>
+                                            <p:cond delay="0"/>
+                                          </p:stCondLst>
+                                        </p:cTn>
+                                        <p:tgtEl>
+                                          <p:spTgt spid="5">
+                                            <p:txEl>
+                                              <p:pRg st="0" end="0"/>
+                                            </p:txEl>
+                                          </p:spTgt>
+                                        </p:tgtEl>
+                                        <p:attrNameLst>
+                                          <p:attrName>style.visibility</p:attrName>
+                                        </p:attrNameLst>
+                                      </p:cBhvr>
+                                      <p:to>
+                                        <p:strVal val="visible"/>
+                                      </p:to>
+                                    </p:set>
+                                  </p:childTnLst>
+                                </p:cTn>
+                              </p:par>
+                              <p:par>
+                                <p:cTn id="7" presetID="1" presetClass="entr" presetSubtype="0" fill="hold" nodeType="withEffect">
+                                  <p:stCondLst>
+                                    <p:cond delay="0"/>
+                                  </p:stCondLst>
+                                  <p:childTnLst>
+                                    <p:set>
+                                      <p:cBhvr>
+                                        <p:cTn id="8" dur="1" fill="hold">
+                                          <p:stCondLst>
+                                            <p:cond delay="0"/>
+                                          </p:stCondLst>
+                                        </p:cTn>
+                                        <p:tgtEl>
+                                          <p:spTgt spid="5">
+                                            <p:txEl>
+                                              <p:pRg st="1" end="1"/>
+                                            </p:txEl>
+                                          </p:spTgt>
+                                        </p:tgtEl>
+                                        <p:attrNameLst>
+                                          <p:attrName>style.visibility</p:attrName>
+                                        </p:attrNameLst>
+                                      </p:cBhvr>
+                                      <p:to>
+                                        <p:strVal val="visible"/>
+                                      </p:to>
+                                    </p:set>
+                                  </p:childTnLst>
+                                </p:cTn>
+                              </p:par>
+                              <p:par>
+                                <p:cTn id="9" presetID="1" presetClass="entr" presetSubtype="0" fill="hold" nodeType="withEffect">
+                                  <p:stCondLst>
+                                    <p:cond delay="0"/>
+                                  </p:stCondLst>
+                                  <p:childTnLst>
+                                    <p:set>
+                                      <p:cBhvr>
+                                        <p:cTn id="10" dur="1" fill="hold">
+                                          <p:stCondLst>
+                                            <p:cond delay="0"/>
+                                          </p:stCondLst>
+                                        </p:cTn>
+                                        <p:tgtEl>
+                                          <p:spTgt spid="5">
+                                            <p:txEl>
+                                              <p:pRg st="2" end="2"/>
+                                            </p:txEl>
+                                          </p:spTgt>
+                                        </p:tgtEl>
+                                        <p:attrNameLst>
+                                          <p:attrName>style.visibility</p:attrName>
+                                        </p:attrNameLst>
+                                      </p:cBhvr>
+                                      <p:to>
+                                        <p:strVal val="visible"/>
+                                      </p:to>
+                                    </p:set>
+                                  </p:childTnLst>
+                                </p:cTn>
+                              </p:par>
+                              <p:par>
+                                <p:cTn id="11" presetID="1" presetClass="entr" presetSubtype="0" fill="hold" nodeType="withEffect">
+                                  <p:stCondLst>
+                                    <p:cond delay="0"/>
+                                  </p:stCondLst>
+                                  <p:childTnLst>
+                                    <p:set>
+                                      <p:cBhvr>
+                                        <p:cTn id="12" dur="1" fill="hold">
+                                          <p:stCondLst>
+                                            <p:cond delay="0"/>
+                                          </p:stCondLst>
+                                        </p:cTn>
+                                        <p:tgtEl>
+                                          <p:spTgt spid="5">
+                                            <p:txEl>
+                                              <p:pRg st="3" end="3"/>
+                                            </p:txEl>
+                                          </p:spTgt>
+                                        </p:tgtEl>
+                                        <p:attrNameLst>
+                                          <p:attrName>style.visibility</p:attrName>
+                                        </p:attrNameLst>
+                                      </p:cBhvr>
+                                      <p:to>
+                                        <p:strVal val="visible"/>
+                                      </p:to>
+                                    </p:set>
+                                  </p:childTnLst>
+                                </p:cTn>
+                              </p:par>
+                            </p:childTnLst>
+                          </p:cTn>
+                        </p:par>
+                      </p:childTnLst>
+                    </p:cTn>
+                  </p:par>
+                  <p:par>
+                    <p:cTn id="13" fill="hold">
+                      <p:stCondLst>
+                        <p:cond delay="indefinite"/>
+                      </p:stCondLst>
+                      <p:childTnLst>
+                        <p:par>
+                          <p:cTn id="14" fill="hold">
+                            <p:stCondLst>
+                              <p:cond delay="0"/>
+                            </p:stCondLst>
+                            <p:childTnLst>
+                              <p:par>
+                                <p:cTn id="15" presetID="1" presetClass="entr" presetSubtype="0" fill="hold" nodeType="clickEffect">
+                                  <p:stCondLst>
+                                    <p:cond delay="0"/>
+                                  </p:stCondLst>
+                                  <p:childTnLst>
+                                    <p:set>
+                                      <p:cBhvr>
+                                        <p:cTn id="16" dur="1" fill="hold">
+                                          <p:stCondLst>
+                                            <p:cond delay="0"/>
+                                          </p:stCondLst>
+                                        </p:cTn>
+                                        <p:tgtEl>
+                                          <p:spTgt spid="5">
+                                            <p:txEl>
+                                              <p:pRg st="4" end="4"/>
+                                            </p:txEl>
+                                          </p:spTgt>
+                                        </p:tgtEl>
+                                        <p:attrNameLst>
+                                          <p:attrName>style.visibility</p:attrName>
+                                        </p:attrNameLst>
+                                      </p:cBhvr>
+                                      <p:to>
+                                        <p:strVal val="visible"/>
+                                      </p:to>
+                                    </p:set>
+                                  </p:childTnLst>
+                                </p:cTn>
+                              </p:par>
+                              <p:par>
+                                <p:cTn id="17" presetID="1" presetClass="entr" presetSubtype="0" fill="hold" nodeType="withEffect">
+                                  <p:stCondLst>
+                                    <p:cond delay="0"/>
+                                  </p:stCondLst>
+                                  <p:childTnLst>
+                                    <p:set>
+                                      <p:cBhvr>
+                                        <p:cTn id="18" dur="1" fill="hold">
+                                          <p:stCondLst>
+                                            <p:cond delay="0"/>
+                                          </p:stCondLst>
+                                        </p:cTn>
+                                        <p:tgtEl>
+                                          <p:spTgt spid="5">
+                                            <p:txEl>
+                                              <p:pRg st="5" end="5"/>
+                                            </p:txEl>
+                                          </p:spTgt>
+                                        </p:tgtEl>
+                                        <p:attrNameLst>
+                                          <p:attrName>style.visibility</p:attrName>
+                                        </p:attrNameLst>
+                                      </p:cBhvr>
+                                      <p:to>
+                                        <p:strVal val="visible"/>
+                                      </p:to>
+                                    </p:set>
+                                  </p:childTnLst>
+                                </p:cTn>
+                              </p:par>
+                              <p:par>
+                                <p:cTn id="19" presetID="1" presetClass="entr" presetSubtype="0" fill="hold" nodeType="withEffect">
+                                  <p:stCondLst>
+                                    <p:cond delay="0"/>
+                                  </p:stCondLst>
+                                  <p:childTnLst>
+                                    <p:set>
+                                      <p:cBhvr>
+                                        <p:cTn id="20" dur="1" fill="hold">
+                                          <p:stCondLst>
+                                            <p:cond delay="0"/>
+                                          </p:stCondLst>
+                                        </p:cTn>
+                                        <p:tgtEl>
+                                          <p:spTgt spid="5">
+                                            <p:txEl>
+                                              <p:pRg st="6" end="6"/>
+                                            </p:txEl>
+                                          </p:spTgt>
+                                        </p:tgtEl>
+                                        <p:attrNameLst>
+                                          <p:attrName>style.visibility</p:attrName>
+                                        </p:attrNameLst>
+                                      </p:cBhvr>
+                                      <p:to>
+                                        <p:strVal val="visible"/>
+                                      </p:to>
+                                    </p:set>
+                                  </p:childTnLst>
+                                </p:cTn>
+                              </p:par>
+                            </p:childTnLst>
+                          </p:cTn>
+                        </p:par>
+                      </p:childTnLst>
+                    </p:cTn>
+                  </p:par>
+                  <p:par>
+                    <p:cTn id="21" fill="hold">
+                      <p:stCondLst>
+                        <p:cond delay="indefinite"/>
+                      </p:stCondLst>
+                      <p:childTnLst>
+                        <p:par>
+                          <p:cTn id="22" fill="hold">
+                            <p:stCondLst>
+                              <p:cond delay="0"/>
+                            </p:stCondLst>
+                            <p:childTnLst>
+                              <p:par>
+                                <p:cTn id="23" presetID="1" presetClass="entr" presetSubtype="0" fill="hold" nodeType="clickEffect">
+                                  <p:stCondLst>
+                                    <p:cond delay="0"/>
+                                  </p:stCondLst>
+                                  <p:childTnLst>
+                                    <p:set>
+                                      <p:cBhvr>
+                                        <p:cTn id="24" dur="1" fill="hold">
+                                          <p:stCondLst>
+                                            <p:cond delay="0"/>
+                                          </p:stCondLst>
+                                        </p:cTn>
+                                        <p:tgtEl>
+                                          <p:spTgt spid="5">
+                                            <p:txEl>
+                                              <p:pRg st="7" end="7"/>
+                                            </p:txEl>
+                                          </p:spTgt>
+                                        </p:tgtEl>
+                                        <p:attrNameLst>
+                                          <p:attrName>style.visibility</p:attrName>
+                                        </p:attrNameLst>
+                                      </p:cBhvr>
+                                      <p:to>
+                                        <p:strVal val="visible"/>
+                                      </p:to>
+                                    </p:set>
+                                  </p:childTnLst>
+                                </p:cTn>
+                              </p:par>
+                              <p:par>
+                                <p:cTn id="25" presetID="1" presetClass="entr" presetSubtype="0" fill="hold" nodeType="withEffect">
+                                  <p:stCondLst>
+                                    <p:cond delay="0"/>
+                                  </p:stCondLst>
+                                  <p:childTnLst>
+                                    <p:set>
+                                      <p:cBhvr>
+                                        <p:cTn id="26" dur="1" fill="hold">
+                                          <p:stCondLst>
+                                            <p:cond delay="0"/>
+                                          </p:stCondLst>
+                                        </p:cTn>
+                                        <p:tgtEl>
+                                          <p:spTgt spid="5">
+                                            <p:txEl>
+                                              <p:pRg st="8" end="8"/>
+                                            </p:txEl>
+                                          </p:spTgt>
+                                        </p:tgtEl>
+                                        <p:attrNameLst>
+                                          <p:attrName>style.visibility</p:attrName>
+                                        </p:attrNameLst>
+                                      </p:cBhvr>
+                                      <p:to>
+                                        <p:strVal val="visible"/>
+                                      </p:to>
+                                    </p:set>
+                                  </p:childTnLst>
+                                </p:cTn>
+                              </p:par>
+                              <p:par>
+                                <p:cTn id="27" presetID="1" presetClass="entr" presetSubtype="0" fill="hold" nodeType="withEffect">
+                                  <p:stCondLst>
+                                    <p:cond delay="0"/>
+                                  </p:stCondLst>
+                                  <p:childTnLst>
+                                    <p:set>
+                                      <p:cBhvr>
+                                        <p:cTn id="28" dur="1" fill="hold">
+                                          <p:stCondLst>
+                                            <p:cond delay="0"/>
+                                          </p:stCondLst>
+                                        </p:cTn>
+                                        <p:tgtEl>
+                                          <p:spTgt spid="5">
+                                            <p:txEl>
+                                              <p:pRg st="9" end="9"/>
+                                            </p:txEl>
+                                          </p:spTgt>
+                                        </p:tgtEl>
+                                        <p:attrNameLst>
+                                          <p:attrName>style.visibility</p:attrName>
+                                        </p:attrNameLst>
+                                      </p:cBhvr>
+                                      <p:to>
+                                        <p:strVal val="visible"/>
+                                      </p:to>
+                                    </p:set>
+                                  </p:childTnLst>
+                                </p:cTn>
+                              </p:par>
+                            </p:childTnLst>
+                          </p:cTn>
+                        </p:par>
+                      </p:childTnLst>
+                    </p:cTn>
+                  </p:par>
+                  <p:par>
+                    <p:cTn id="29" fill="hold">
+                      <p:stCondLst>
+                        <p:cond delay="indefinite"/>
+                      </p:stCondLst>
+                      <p:childTnLst>
+                        <p:par>
+                          <p:cTn id="30" fill="hold">
+                            <p:stCondLst>
+                              <p:cond delay="0"/>
+                            </p:stCondLst>
+                            <p:childTnLst>
+                              <p:par>
+                                <p:cTn id="31" presetID="1" presetClass="entr" presetSubtype="0" fill="hold" nodeType="clickEffect">
+                                  <p:stCondLst>
+                                    <p:cond delay="0"/>
+                                  </p:stCondLst>
+                                  <p:childTnLst>
+                                    <p:set>
+                                      <p:cBhvr>
+                                        <p:cTn id="32" dur="1" fill="hold">
+                                          <p:stCondLst>
+                                            <p:cond delay="0"/>
+                                          </p:stCondLst>
+                                        </p:cTn>
+                                        <p:tgtEl>
+                                          <p:spTgt spid="5">
+                                            <p:txEl>
+                                              <p:pRg st="10" end="10"/>
+                                            </p:txEl>
+                                          </p:spTgt>
+                                        </p:tgtEl>
+                                        <p:attrNameLst>
+                                          <p:attrName>style.visibility</p:attrName>
+                                        </p:attrNameLst>
+                                      </p:cBhvr>
+                                      <p:to>
+                                        <p:strVal val="visible"/>
+                                      </p:to>
+                                    </p:set>
+                                  </p:childTnLst>
+                                </p:cTn>
+                              </p:par>
+                              <p:par>
+                                <p:cTn id="33" presetID="1" presetClass="entr" presetSubtype="0" fill="hold" nodeType="withEffect">
+                                  <p:stCondLst>
+                                    <p:cond delay="0"/>
+                                  </p:stCondLst>
+                                  <p:childTnLst>
+                                    <p:set>
+                                      <p:cBhvr>
+                                        <p:cTn id="34" dur="1" fill="hold">
+                                          <p:stCondLst>
+                                            <p:cond delay="0"/>
+                                          </p:stCondLst>
+                                        </p:cTn>
+                                        <p:tgtEl>
+                                          <p:spTgt spid="5">
+                                            <p:txEl>
+                                              <p:pRg st="11" end="11"/>
+                                            </p:txEl>
+                                          </p:spTgt>
+                                        </p:tgtEl>
+                                        <p:attrNameLst>
+                                          <p:attrName>style.visibility</p:attrName>
+                                        </p:attrNameLst>
+                                      </p:cBhvr>
+                                      <p:to>
+                                        <p:strVal val="visible"/>
+                                      </p:to>
+                                    </p:set>
+                                  </p:childTnLst>
+                                </p:cTn>
+                              </p:par>
+                              <p:par>
+                                <p:cTn id="35" presetID="1" presetClass="entr" presetSubtype="0" fill="hold" nodeType="withEffect">
+                                  <p:stCondLst>
+                                    <p:cond delay="0"/>
+                                  </p:stCondLst>
+                                  <p:childTnLst>
+                                    <p:set>
+                                      <p:cBhvr>
+                                        <p:cTn id="36" dur="1" fill="hold">
+                                          <p:stCondLst>
+                                            <p:cond delay="0"/>
+                                          </p:stCondLst>
+                                        </p:cTn>
+                                        <p:tgtEl>
+                                          <p:spTgt spid="5">
+                                            <p:txEl>
+                                              <p:pRg st="12" end="12"/>
+                                            </p:txEl>
+                                          </p:spTgt>
+                                        </p:tgtEl>
+                                        <p:attrNameLst>
+                                          <p:attrName>style.visibility</p:attrName>
+                                        </p:attrNameLst>
+                                      </p:cBhvr>
+                                      <p:to>
+                                        <p:strVal val="visible"/>
+                                      </p:to>
+                                    </p:set>
+                                  </p:childTnLst>
+                                </p:cTn>
+                              </p:par>
+                            </p:childTnLst>
+                          </p:cTn>
+                        </p:par>
+                      </p:childTnLst>
+                    </p:cTn>
+                  </p:par>
+                </p:childTnLst>
+              </p:cTn>
+              <p:prevCondLst>
+                <p:cond evt="onPrev" delay="0">
+                  <p:tgtEl>
+                    <p:sldTgt/>
+                  </p:tgtEl>
+                </p:cond>
+              </p:prevCondLst>
+              <p:nextCondLst>
+                <p:cond evt="onNext" delay="0">
+                  <p:tgtEl>
+                    <p:sldTgt/>
+                  </p:tgtEl>
+                </p:cond>
+              </p:nextCondLst>
+            </p:seq>
+          </p:childTnLst>
+        </p:cTn>
+      </p:par>
+    </p:tnLst>
+  </p:timing>
 </p:sld>
 </file>
 

</xml_diff>

<commit_message>
Changed logo and content.
</commit_message>
<xml_diff>
--- a/Part 1/WiX Part 1.pptx
+++ b/Part 1/WiX Part 1.pptx
@@ -215,7 +215,7 @@
           <a:p>
             <a:fld id="{BE6FE14A-16AB-4C40-A7D8-3F677DBFF089}" type="datetimeFigureOut">
               <a:rPr lang="ru-RU" smtClean="0"/>
-              <a:t>03.01.2016</a:t>
+              <a:t>06.01.2016</a:t>
             </a:fld>
             <a:endParaRPr lang="ru-RU" dirty="0"/>
           </a:p>
@@ -380,7 +380,7 @@
           <a:p>
             <a:fld id="{C15A5BB7-EDD2-4B8D-93DB-AF0055258AEF}" type="datetimeFigureOut">
               <a:rPr lang="ru-RU" smtClean="0"/>
-              <a:t>03.01.2016</a:t>
+              <a:t>06.01.2016</a:t>
             </a:fld>
             <a:endParaRPr lang="ru-RU" dirty="0"/>
           </a:p>
@@ -1717,7 +1717,7 @@
           <a:p>
             <a:fld id="{FF11F0EC-4F60-4544-9956-271209A740FE}" type="datetimeFigureOut">
               <a:rPr lang="ru-RU" smtClean="0"/>
-              <a:t>03.01.2016</a:t>
+              <a:t>06.01.2016</a:t>
             </a:fld>
             <a:endParaRPr lang="ru-RU" dirty="0"/>
           </a:p>
@@ -1968,7 +1968,7 @@
           <a:p>
             <a:fld id="{FF11F0EC-4F60-4544-9956-271209A740FE}" type="datetimeFigureOut">
               <a:rPr lang="ru-RU" smtClean="0"/>
-              <a:t>03.01.2016</a:t>
+              <a:t>06.01.2016</a:t>
             </a:fld>
             <a:endParaRPr lang="ru-RU" dirty="0"/>
           </a:p>
@@ -2219,7 +2219,7 @@
           <a:p>
             <a:fld id="{FF11F0EC-4F60-4544-9956-271209A740FE}" type="datetimeFigureOut">
               <a:rPr lang="ru-RU" smtClean="0"/>
-              <a:t>03.01.2016</a:t>
+              <a:t>06.01.2016</a:t>
             </a:fld>
             <a:endParaRPr lang="ru-RU" dirty="0"/>
           </a:p>
@@ -2797,7 +2797,7 @@
           <a:p>
             <a:fld id="{FF11F0EC-4F60-4544-9956-271209A740FE}" type="datetimeFigureOut">
               <a:rPr lang="ru-RU" smtClean="0"/>
-              <a:t>03.01.2016</a:t>
+              <a:t>06.01.2016</a:t>
             </a:fld>
             <a:endParaRPr lang="ru-RU" dirty="0"/>
           </a:p>
@@ -3048,7 +3048,7 @@
           <a:p>
             <a:fld id="{FF11F0EC-4F60-4544-9956-271209A740FE}" type="datetimeFigureOut">
               <a:rPr lang="ru-RU" smtClean="0"/>
-              <a:t>03.01.2016</a:t>
+              <a:t>06.01.2016</a:t>
             </a:fld>
             <a:endParaRPr lang="ru-RU" dirty="0"/>
           </a:p>
@@ -3626,7 +3626,7 @@
           <a:p>
             <a:fld id="{FF11F0EC-4F60-4544-9956-271209A740FE}" type="datetimeFigureOut">
               <a:rPr lang="ru-RU" smtClean="0"/>
-              <a:t>03.01.2016</a:t>
+              <a:t>06.01.2016</a:t>
             </a:fld>
             <a:endParaRPr lang="ru-RU" dirty="0"/>
           </a:p>
@@ -3856,7 +3856,7 @@
           <a:p>
             <a:fld id="{FF11F0EC-4F60-4544-9956-271209A740FE}" type="datetimeFigureOut">
               <a:rPr lang="ru-RU" smtClean="0"/>
-              <a:t>03.01.2016</a:t>
+              <a:t>06.01.2016</a:t>
             </a:fld>
             <a:endParaRPr lang="ru-RU" dirty="0"/>
           </a:p>
@@ -4036,7 +4036,7 @@
           <a:p>
             <a:fld id="{FF11F0EC-4F60-4544-9956-271209A740FE}" type="datetimeFigureOut">
               <a:rPr lang="ru-RU" smtClean="0"/>
-              <a:t>03.01.2016</a:t>
+              <a:t>06.01.2016</a:t>
             </a:fld>
             <a:endParaRPr lang="ru-RU" dirty="0"/>
           </a:p>
@@ -4212,7 +4212,7 @@
           <a:p>
             <a:fld id="{FF11F0EC-4F60-4544-9956-271209A740FE}" type="datetimeFigureOut">
               <a:rPr lang="ru-RU" smtClean="0"/>
-              <a:t>03.01.2016</a:t>
+              <a:t>06.01.2016</a:t>
             </a:fld>
             <a:endParaRPr lang="ru-RU" dirty="0"/>
           </a:p>
@@ -4459,7 +4459,7 @@
           <a:p>
             <a:fld id="{FF11F0EC-4F60-4544-9956-271209A740FE}" type="datetimeFigureOut">
               <a:rPr lang="ru-RU" smtClean="0"/>
-              <a:t>03.01.2016</a:t>
+              <a:t>06.01.2016</a:t>
             </a:fld>
             <a:endParaRPr lang="ru-RU" dirty="0"/>
           </a:p>
@@ -4691,7 +4691,7 @@
           <a:p>
             <a:fld id="{FF11F0EC-4F60-4544-9956-271209A740FE}" type="datetimeFigureOut">
               <a:rPr lang="ru-RU" smtClean="0"/>
-              <a:t>03.01.2016</a:t>
+              <a:t>06.01.2016</a:t>
             </a:fld>
             <a:endParaRPr lang="ru-RU" dirty="0"/>
           </a:p>
@@ -5065,7 +5065,7 @@
           <a:p>
             <a:fld id="{FF11F0EC-4F60-4544-9956-271209A740FE}" type="datetimeFigureOut">
               <a:rPr lang="ru-RU" smtClean="0"/>
-              <a:t>03.01.2016</a:t>
+              <a:t>06.01.2016</a:t>
             </a:fld>
             <a:endParaRPr lang="ru-RU" dirty="0"/>
           </a:p>
@@ -5188,7 +5188,7 @@
           <a:p>
             <a:fld id="{FF11F0EC-4F60-4544-9956-271209A740FE}" type="datetimeFigureOut">
               <a:rPr lang="ru-RU" smtClean="0"/>
-              <a:t>03.01.2016</a:t>
+              <a:t>06.01.2016</a:t>
             </a:fld>
             <a:endParaRPr lang="ru-RU" dirty="0"/>
           </a:p>
@@ -5283,7 +5283,7 @@
           <a:p>
             <a:fld id="{FF11F0EC-4F60-4544-9956-271209A740FE}" type="datetimeFigureOut">
               <a:rPr lang="ru-RU" smtClean="0"/>
-              <a:t>03.01.2016</a:t>
+              <a:t>06.01.2016</a:t>
             </a:fld>
             <a:endParaRPr lang="ru-RU" dirty="0"/>
           </a:p>
@@ -5538,7 +5538,7 @@
           <a:p>
             <a:fld id="{FF11F0EC-4F60-4544-9956-271209A740FE}" type="datetimeFigureOut">
               <a:rPr lang="ru-RU" smtClean="0"/>
-              <a:t>03.01.2016</a:t>
+              <a:t>06.01.2016</a:t>
             </a:fld>
             <a:endParaRPr lang="ru-RU" dirty="0"/>
           </a:p>
@@ -5801,7 +5801,7 @@
           <a:p>
             <a:fld id="{FF11F0EC-4F60-4544-9956-271209A740FE}" type="datetimeFigureOut">
               <a:rPr lang="ru-RU" smtClean="0"/>
-              <a:t>03.01.2016</a:t>
+              <a:t>06.01.2016</a:t>
             </a:fld>
             <a:endParaRPr lang="ru-RU" dirty="0"/>
           </a:p>
@@ -6885,7 +6885,7 @@
           <a:p>
             <a:fld id="{FF11F0EC-4F60-4544-9956-271209A740FE}" type="datetimeFigureOut">
               <a:rPr lang="ru-RU" smtClean="0"/>
-              <a:t>03.01.2016</a:t>
+              <a:t>06.01.2016</a:t>
             </a:fld>
             <a:endParaRPr lang="ru-RU" dirty="0"/>
           </a:p>
@@ -7409,48 +7409,6 @@
           <a:chExt cx="0" cy="0"/>
         </a:xfrm>
       </p:grpSpPr>
-      <p:pic>
-        <p:nvPicPr>
-          <p:cNvPr id="4" name="Picture 2" descr="http://ergindemirel.com/wp/wp-content/uploads/2013/05/wixlogolarge-300x133.jpg"/>
-          <p:cNvPicPr>
-            <a:picLocks noChangeAspect="1" noChangeArrowheads="1"/>
-          </p:cNvPicPr>
-          <p:nvPr/>
-        </p:nvPicPr>
-        <p:blipFill>
-          <a:blip r:embed="rId2">
-            <a:extLst>
-              <a:ext uri="{28A0092B-C50C-407E-A947-70E740481C1C}">
-                <a14:useLocalDpi xmlns:a14="http://schemas.microsoft.com/office/drawing/2010/main" val="0"/>
-              </a:ext>
-            </a:extLst>
-          </a:blip>
-          <a:srcRect/>
-          <a:stretch>
-            <a:fillRect/>
-          </a:stretch>
-        </p:blipFill>
-        <p:spPr bwMode="auto">
-          <a:xfrm>
-            <a:off x="3645758" y="1013216"/>
-            <a:ext cx="2857500" cy="1266826"/>
-          </a:xfrm>
-          <a:prstGeom prst="rect">
-            <a:avLst/>
-          </a:prstGeom>
-          <a:noFill/>
-          <a:effectLst/>
-          <a:extLst>
-            <a:ext uri="{909E8E84-426E-40DD-AFC4-6F175D3DCCD1}">
-              <a14:hiddenFill xmlns:a14="http://schemas.microsoft.com/office/drawing/2010/main">
-                <a:solidFill>
-                  <a:srgbClr val="FFFFFF"/>
-                </a:solidFill>
-              </a14:hiddenFill>
-            </a:ext>
-          </a:extLst>
-        </p:spPr>
-      </p:pic>
       <p:sp>
         <p:nvSpPr>
           <p:cNvPr id="6" name="TextBox 5"/>
@@ -7520,7 +7478,7 @@
           <p:nvPr/>
         </p:nvPicPr>
         <p:blipFill rotWithShape="1">
-          <a:blip r:embed="rId3">
+          <a:blip r:embed="rId2">
             <a:extLst>
               <a:ext uri="{28A0092B-C50C-407E-A947-70E740481C1C}">
                 <a14:useLocalDpi xmlns:a14="http://schemas.microsoft.com/office/drawing/2010/main" val="0"/>
@@ -7539,6 +7497,56 @@
             <a:avLst/>
           </a:prstGeom>
           <a:noFill/>
+          <a:extLst>
+            <a:ext uri="{909E8E84-426E-40DD-AFC4-6F175D3DCCD1}">
+              <a14:hiddenFill xmlns:a14="http://schemas.microsoft.com/office/drawing/2010/main">
+                <a:solidFill>
+                  <a:srgbClr val="FFFFFF"/>
+                </a:solidFill>
+              </a14:hiddenFill>
+            </a:ext>
+          </a:extLst>
+        </p:spPr>
+      </p:pic>
+      <p:pic>
+        <p:nvPicPr>
+          <p:cNvPr id="8" name="Picture 2" descr="http://wixtoolset.org/content/logo-black-hollow-md.png"/>
+          <p:cNvPicPr>
+            <a:picLocks noChangeAspect="1" noChangeArrowheads="1"/>
+          </p:cNvPicPr>
+          <p:nvPr/>
+        </p:nvPicPr>
+        <p:blipFill>
+          <a:blip r:embed="rId3">
+            <a:extLst>
+              <a:ext uri="{28A0092B-C50C-407E-A947-70E740481C1C}">
+                <a14:useLocalDpi xmlns:a14="http://schemas.microsoft.com/office/drawing/2010/main" val="0"/>
+              </a:ext>
+            </a:extLst>
+          </a:blip>
+          <a:srcRect/>
+          <a:stretch>
+            <a:fillRect/>
+          </a:stretch>
+        </p:blipFill>
+        <p:spPr bwMode="auto">
+          <a:xfrm>
+            <a:off x="2849389" y="694129"/>
+            <a:ext cx="3000375" cy="1905000"/>
+          </a:xfrm>
+          <a:prstGeom prst="rect">
+            <a:avLst/>
+          </a:prstGeom>
+          <a:ln>
+            <a:noFill/>
+          </a:ln>
+          <a:effectLst>
+            <a:outerShdw blurRad="127000" dist="38100" dir="8100000" sx="102000" sy="102000" algn="tr" rotWithShape="0">
+              <a:prstClr val="black">
+                <a:alpha val="70000"/>
+              </a:prstClr>
+            </a:outerShdw>
+          </a:effectLst>
           <a:extLst>
             <a:ext uri="{909E8E84-426E-40DD-AFC4-6F175D3DCCD1}">
               <a14:hiddenFill xmlns:a14="http://schemas.microsoft.com/office/drawing/2010/main">

</xml_diff>